<commit_message>
updated presentation with bootstrap explained
</commit_message>
<xml_diff>
--- a/presentation/pptx/04-Bagging, randomForests, and Boosting.pptx
+++ b/presentation/pptx/04-Bagging, randomForests, and Boosting.pptx
@@ -5,7 +5,7 @@
     <p:sldMasterId id="2147483840" r:id="rId1"/>
   </p:sldMasterIdLst>
   <p:notesMasterIdLst>
-    <p:notesMasterId r:id="rId24"/>
+    <p:notesMasterId r:id="rId29"/>
   </p:notesMasterIdLst>
   <p:sldIdLst>
     <p:sldId id="256" r:id="rId2"/>
@@ -18,18 +18,23 @@
     <p:sldId id="296" r:id="rId9"/>
     <p:sldId id="297" r:id="rId10"/>
     <p:sldId id="298" r:id="rId11"/>
-    <p:sldId id="299" r:id="rId12"/>
-    <p:sldId id="301" r:id="rId13"/>
-    <p:sldId id="302" r:id="rId14"/>
-    <p:sldId id="309" r:id="rId15"/>
-    <p:sldId id="303" r:id="rId16"/>
-    <p:sldId id="306" r:id="rId17"/>
-    <p:sldId id="307" r:id="rId18"/>
-    <p:sldId id="304" r:id="rId19"/>
-    <p:sldId id="305" r:id="rId20"/>
-    <p:sldId id="308" r:id="rId21"/>
-    <p:sldId id="310" r:id="rId22"/>
-    <p:sldId id="311" r:id="rId23"/>
+    <p:sldId id="303" r:id="rId12"/>
+    <p:sldId id="316" r:id="rId13"/>
+    <p:sldId id="299" r:id="rId14"/>
+    <p:sldId id="301" r:id="rId15"/>
+    <p:sldId id="315" r:id="rId16"/>
+    <p:sldId id="312" r:id="rId17"/>
+    <p:sldId id="314" r:id="rId18"/>
+    <p:sldId id="313" r:id="rId19"/>
+    <p:sldId id="302" r:id="rId20"/>
+    <p:sldId id="309" r:id="rId21"/>
+    <p:sldId id="306" r:id="rId22"/>
+    <p:sldId id="307" r:id="rId23"/>
+    <p:sldId id="304" r:id="rId24"/>
+    <p:sldId id="305" r:id="rId25"/>
+    <p:sldId id="308" r:id="rId26"/>
+    <p:sldId id="310" r:id="rId27"/>
+    <p:sldId id="311" r:id="rId28"/>
   </p:sldIdLst>
   <p:sldSz cx="12192000" cy="6858000"/>
   <p:notesSz cx="6858000" cy="9144000"/>
@@ -131,7 +136,7 @@
   <p:extLst>
     <p:ext uri="{EFAFB233-063F-42B5-8137-9DF3F51BA10A}">
       <p15:sldGuideLst xmlns:p15="http://schemas.microsoft.com/office/powerpoint/2012/main">
-        <p15:guide id="1" orient="horz" pos="1729" userDrawn="1">
+        <p15:guide id="1" orient="horz" pos="1752" userDrawn="1">
           <p15:clr>
             <a:srgbClr val="A4A3A4"/>
           </p15:clr>
@@ -234,7 +239,7 @@
           <a:p>
             <a:fld id="{5C93CA8F-50F8-44B5-B48F-4C4452AC4FCB}" type="datetimeFigureOut">
               <a:rPr lang="he-IL" smtClean="0"/>
-              <a:t>א'/אלול/תשע"ט</a:t>
+              <a:t>ב'/אלול/תשע"ט</a:t>
             </a:fld>
             <a:endParaRPr lang="he-IL"/>
           </a:p>
@@ -718,6 +723,148 @@
           <a:bodyPr/>
           <a:lstStyle/>
           <a:p>
+            <a:r>
+              <a:rPr lang="en-US" dirty="0"/>
+              <a:t>Add </a:t>
+            </a:r>
+            <a:r>
+              <a:rPr lang="en-US" dirty="0" err="1"/>
+              <a:t>Mentimeter</a:t>
+            </a:r>
+            <a:r>
+              <a:rPr lang="en-US" dirty="0"/>
+              <a:t>:</a:t>
+            </a:r>
+          </a:p>
+          <a:p>
+            <a:r>
+              <a:rPr lang="en-US" dirty="0"/>
+              <a:t>Out of the following, what would require bootstrap? (multiple choice)</a:t>
+            </a:r>
+          </a:p>
+          <a:p>
+            <a:pPr marL="228600" indent="-228600">
+              <a:buAutoNum type="alphaUcPeriod"/>
+            </a:pPr>
+            <a:r>
+              <a:rPr lang="en-US" dirty="0"/>
+              <a:t>The A1c value of a logistic regression</a:t>
+            </a:r>
+          </a:p>
+          <a:p>
+            <a:pPr marL="228600" indent="-228600">
+              <a:buAutoNum type="alphaUcPeriod"/>
+            </a:pPr>
+            <a:r>
+              <a:rPr lang="en-US" dirty="0"/>
+              <a:t>The distribution of an A1c of a logistic regression model</a:t>
+            </a:r>
+          </a:p>
+          <a:p>
+            <a:pPr marL="228600" indent="-228600">
+              <a:buAutoNum type="alphaUcPeriod"/>
+            </a:pPr>
+            <a:r>
+              <a:rPr lang="en-US" dirty="0"/>
+              <a:t>The p-value of logistic regression coefficients</a:t>
+            </a:r>
+          </a:p>
+          <a:p>
+            <a:pPr marL="228600" indent="-228600">
+              <a:buAutoNum type="alphaUcPeriod"/>
+            </a:pPr>
+            <a:r>
+              <a:rPr lang="en-US" dirty="0"/>
+              <a:t>All of </a:t>
+            </a:r>
+            <a:r>
+              <a:rPr lang="en-US"/>
+              <a:t>the above</a:t>
+            </a:r>
+            <a:endParaRPr lang="en-IL" dirty="0"/>
+          </a:p>
+        </p:txBody>
+      </p:sp>
+      <p:sp>
+        <p:nvSpPr>
+          <p:cNvPr id="4" name="Slide Number Placeholder 3"/>
+          <p:cNvSpPr>
+            <a:spLocks noGrp="1"/>
+          </p:cNvSpPr>
+          <p:nvPr>
+            <p:ph type="sldNum" sz="quarter" idx="5"/>
+          </p:nvPr>
+        </p:nvSpPr>
+        <p:spPr/>
+        <p:txBody>
+          <a:bodyPr/>
+          <a:lstStyle/>
+          <a:p>
+            <a:fld id="{C4276747-8356-4D8F-84BF-3C530C5DAF39}" type="slidenum">
+              <a:rPr lang="he-IL" smtClean="0"/>
+              <a:t>16</a:t>
+            </a:fld>
+            <a:endParaRPr lang="he-IL"/>
+          </a:p>
+        </p:txBody>
+      </p:sp>
+    </p:spTree>
+    <p:extLst>
+      <p:ext uri="{BB962C8B-B14F-4D97-AF65-F5344CB8AC3E}">
+        <p14:creationId xmlns:p14="http://schemas.microsoft.com/office/powerpoint/2010/main" val="209889028"/>
+      </p:ext>
+    </p:extLst>
+  </p:cSld>
+  <p:clrMapOvr>
+    <a:masterClrMapping/>
+  </p:clrMapOvr>
+</p:notes>
+</file>
+
+<file path=ppt/notesSlides/notesSlide4.xml><?xml version="1.0" encoding="utf-8"?>
+<p:notes xmlns:a="http://schemas.openxmlformats.org/drawingml/2006/main" xmlns:r="http://schemas.openxmlformats.org/officeDocument/2006/relationships" xmlns:p="http://schemas.openxmlformats.org/presentationml/2006/main">
+  <p:cSld>
+    <p:spTree>
+      <p:nvGrpSpPr>
+        <p:cNvPr id="1" name=""/>
+        <p:cNvGrpSpPr/>
+        <p:nvPr/>
+      </p:nvGrpSpPr>
+      <p:grpSpPr>
+        <a:xfrm>
+          <a:off x="0" y="0"/>
+          <a:ext cx="0" cy="0"/>
+          <a:chOff x="0" y="0"/>
+          <a:chExt cx="0" cy="0"/>
+        </a:xfrm>
+      </p:grpSpPr>
+      <p:sp>
+        <p:nvSpPr>
+          <p:cNvPr id="2" name="Slide Image Placeholder 1"/>
+          <p:cNvSpPr>
+            <a:spLocks noGrp="1" noRot="1" noChangeAspect="1"/>
+          </p:cNvSpPr>
+          <p:nvPr>
+            <p:ph type="sldImg"/>
+          </p:nvPr>
+        </p:nvSpPr>
+        <p:spPr/>
+      </p:sp>
+      <p:sp>
+        <p:nvSpPr>
+          <p:cNvPr id="3" name="Notes Placeholder 2"/>
+          <p:cNvSpPr>
+            <a:spLocks noGrp="1"/>
+          </p:cNvSpPr>
+          <p:nvPr>
+            <p:ph type="body" idx="1"/>
+          </p:nvPr>
+        </p:nvSpPr>
+        <p:spPr/>
+        <p:txBody>
+          <a:bodyPr/>
+          <a:lstStyle/>
+          <a:p>
             <a:endParaRPr lang="he-IL" dirty="0"/>
           </a:p>
         </p:txBody>
@@ -739,7 +886,7 @@
           <a:p>
             <a:fld id="{C4276747-8356-4D8F-84BF-3C530C5DAF39}" type="slidenum">
               <a:rPr lang="he-IL" smtClean="0"/>
-              <a:t>21</a:t>
+              <a:t>26</a:t>
             </a:fld>
             <a:endParaRPr lang="he-IL"/>
           </a:p>
@@ -6126,6 +6273,98 @@
           </a:fontRef>
         </p:style>
       </p:cxnSp>
+      <p:sp>
+        <p:nvSpPr>
+          <p:cNvPr id="29" name="Rounded Rectangle 53">
+            <a:extLst>
+              <a:ext uri="{FF2B5EF4-FFF2-40B4-BE49-F238E27FC236}">
+                <a16:creationId xmlns:a16="http://schemas.microsoft.com/office/drawing/2014/main" id="{7E92A08C-143E-4CF5-A6B1-D6E4FCE7BF25}"/>
+              </a:ext>
+            </a:extLst>
+          </p:cNvPr>
+          <p:cNvSpPr/>
+          <p:nvPr/>
+        </p:nvSpPr>
+        <p:spPr>
+          <a:xfrm>
+            <a:off x="1725178" y="5021471"/>
+            <a:ext cx="1410686" cy="623943"/>
+          </a:xfrm>
+          <a:prstGeom prst="roundRect">
+            <a:avLst/>
+          </a:prstGeom>
+        </p:spPr>
+        <p:style>
+          <a:lnRef idx="3">
+            <a:schemeClr val="lt1"/>
+          </a:lnRef>
+          <a:fillRef idx="1">
+            <a:schemeClr val="accent2"/>
+          </a:fillRef>
+          <a:effectRef idx="1">
+            <a:schemeClr val="accent2"/>
+          </a:effectRef>
+          <a:fontRef idx="minor">
+            <a:schemeClr val="lt1"/>
+          </a:fontRef>
+        </p:style>
+        <p:txBody>
+          <a:bodyPr rtlCol="1" anchor="ctr"/>
+          <a:lstStyle/>
+          <a:p>
+            <a:pPr algn="ctr"/>
+            <a:r>
+              <a:rPr lang="en-US" dirty="0"/>
+              <a:t>Bootstrap</a:t>
+            </a:r>
+            <a:endParaRPr lang="he-IL" dirty="0"/>
+          </a:p>
+        </p:txBody>
+      </p:sp>
+      <p:cxnSp>
+        <p:nvCxnSpPr>
+          <p:cNvPr id="10" name="Connector: Elbow 9">
+            <a:extLst>
+              <a:ext uri="{FF2B5EF4-FFF2-40B4-BE49-F238E27FC236}">
+                <a16:creationId xmlns:a16="http://schemas.microsoft.com/office/drawing/2014/main" id="{B51F9558-9AFF-4BD3-A489-8185D7902847}"/>
+              </a:ext>
+            </a:extLst>
+          </p:cNvPr>
+          <p:cNvCxnSpPr>
+            <a:stCxn id="29" idx="2"/>
+            <a:endCxn id="38" idx="2"/>
+          </p:cNvCxnSpPr>
+          <p:nvPr/>
+        </p:nvCxnSpPr>
+        <p:spPr>
+          <a:xfrm rot="16200000" flipH="1">
+            <a:off x="4676892" y="3399043"/>
+            <a:ext cx="1" cy="4492742"/>
+          </a:xfrm>
+          <a:prstGeom prst="bentConnector3">
+            <a:avLst>
+              <a:gd name="adj1" fmla="val 22860100000"/>
+            </a:avLst>
+          </a:prstGeom>
+          <a:ln>
+            <a:tailEnd type="triangle"/>
+          </a:ln>
+        </p:spPr>
+        <p:style>
+          <a:lnRef idx="1">
+            <a:schemeClr val="dk1"/>
+          </a:lnRef>
+          <a:fillRef idx="0">
+            <a:schemeClr val="dk1"/>
+          </a:fillRef>
+          <a:effectRef idx="0">
+            <a:schemeClr val="dk1"/>
+          </a:effectRef>
+          <a:fontRef idx="minor">
+            <a:schemeClr val="tx1"/>
+          </a:fontRef>
+        </p:style>
+      </p:cxnSp>
     </p:spTree>
     <p:extLst>
       <p:ext uri="{BB962C8B-B14F-4D97-AF65-F5344CB8AC3E}">
@@ -6179,14 +6418,7 @@
           <a:p>
             <a:r>
               <a:rPr lang="en-US" dirty="0"/>
-              <a:t>Bagging </a:t>
-            </a:r>
-            <a:br>
-              <a:rPr lang="en-US" dirty="0"/>
-            </a:br>
-            <a:r>
-              <a:rPr lang="en-US" dirty="0"/>
-              <a:t>(“bootstrap aggregation”)</a:t>
+              <a:t>Random Forests</a:t>
             </a:r>
             <a:endParaRPr lang="en-IL" dirty="0"/>
           </a:p>
@@ -6278,7 +6510,7 @@
     </p:spTree>
     <p:extLst>
       <p:ext uri="{BB962C8B-B14F-4D97-AF65-F5344CB8AC3E}">
-        <p14:creationId xmlns:p14="http://schemas.microsoft.com/office/powerpoint/2010/main" val="3979452649"/>
+        <p14:creationId xmlns:p14="http://schemas.microsoft.com/office/powerpoint/2010/main" val="2383884864"/>
       </p:ext>
     </p:extLst>
   </p:cSld>
@@ -6310,7 +6542,7 @@
           <p:cNvPr id="6" name="Title 5">
             <a:extLst>
               <a:ext uri="{FF2B5EF4-FFF2-40B4-BE49-F238E27FC236}">
-                <a16:creationId xmlns:a16="http://schemas.microsoft.com/office/drawing/2014/main" id="{36BD2C52-5C4B-4947-9CC2-A335E120D85B}"/>
+                <a16:creationId xmlns:a16="http://schemas.microsoft.com/office/drawing/2014/main" id="{F9410F38-6A76-423D-9DFF-59E988932E9B}"/>
               </a:ext>
             </a:extLst>
           </p:cNvPr>
@@ -6326,11 +6558,7 @@
           <a:bodyPr/>
           <a:lstStyle/>
           <a:p>
-            <a:r>
-              <a:rPr lang="en-US" dirty="0"/>
-              <a:t>What is Bootstrap?</a:t>
-            </a:r>
-            <a:endParaRPr lang="en-IL" dirty="0"/>
+            <a:endParaRPr lang="en-IL"/>
           </a:p>
         </p:txBody>
       </p:sp>
@@ -6339,7 +6567,7 @@
           <p:cNvPr id="7" name="Content Placeholder 6">
             <a:extLst>
               <a:ext uri="{FF2B5EF4-FFF2-40B4-BE49-F238E27FC236}">
-                <a16:creationId xmlns:a16="http://schemas.microsoft.com/office/drawing/2014/main" id="{9CFB131C-2DB8-4577-9245-AA8CF1C3E107}"/>
+                <a16:creationId xmlns:a16="http://schemas.microsoft.com/office/drawing/2014/main" id="{7E8A62C2-2DBC-4DA6-9B61-994A498BC5F8}"/>
               </a:ext>
             </a:extLst>
           </p:cNvPr>
@@ -6364,7 +6592,7 @@
           <p:cNvPr id="4" name="Footer Placeholder 3">
             <a:extLst>
               <a:ext uri="{FF2B5EF4-FFF2-40B4-BE49-F238E27FC236}">
-                <a16:creationId xmlns:a16="http://schemas.microsoft.com/office/drawing/2014/main" id="{EB937BFC-14FC-4A5E-9D60-51B0ABB4B33E}"/>
+                <a16:creationId xmlns:a16="http://schemas.microsoft.com/office/drawing/2014/main" id="{B26D5EE8-22A7-4AEA-8667-EBE567F5E08F}"/>
               </a:ext>
             </a:extLst>
           </p:cNvPr>
@@ -6393,7 +6621,7 @@
           <p:cNvPr id="5" name="Slide Number Placeholder 4">
             <a:extLst>
               <a:ext uri="{FF2B5EF4-FFF2-40B4-BE49-F238E27FC236}">
-                <a16:creationId xmlns:a16="http://schemas.microsoft.com/office/drawing/2014/main" id="{CB4D8187-BDB6-4794-897C-E3FA4F69747D}"/>
+                <a16:creationId xmlns:a16="http://schemas.microsoft.com/office/drawing/2014/main" id="{7487FBE2-1B4F-4DD6-80B3-C680726CAB51}"/>
               </a:ext>
             </a:extLst>
           </p:cNvPr>
@@ -6421,7 +6649,7 @@
     </p:spTree>
     <p:extLst>
       <p:ext uri="{BB962C8B-B14F-4D97-AF65-F5344CB8AC3E}">
-        <p14:creationId xmlns:p14="http://schemas.microsoft.com/office/powerpoint/2010/main" val="3495876869"/>
+        <p14:creationId xmlns:p14="http://schemas.microsoft.com/office/powerpoint/2010/main" val="2201374704"/>
       </p:ext>
     </p:extLst>
   </p:cSld>
@@ -6450,10 +6678,10 @@
       </p:grpSpPr>
       <p:sp>
         <p:nvSpPr>
-          <p:cNvPr id="2" name="Title 1">
+          <p:cNvPr id="6" name="Title 5">
             <a:extLst>
               <a:ext uri="{FF2B5EF4-FFF2-40B4-BE49-F238E27FC236}">
-                <a16:creationId xmlns:a16="http://schemas.microsoft.com/office/drawing/2014/main" id="{C45BA524-44F5-43AD-B56C-AECAEBF6D824}"/>
+                <a16:creationId xmlns:a16="http://schemas.microsoft.com/office/drawing/2014/main" id="{C1F7B72E-4181-4474-95E4-BB2F1AAE56AB}"/>
               </a:ext>
             </a:extLst>
           </p:cNvPr>
@@ -6471,7 +6699,14 @@
           <a:p>
             <a:r>
               <a:rPr lang="en-US" dirty="0"/>
-              <a:t>How is Bagging Related to Bootstrap?</a:t>
+              <a:t>Bagging </a:t>
+            </a:r>
+            <a:br>
+              <a:rPr lang="en-US" dirty="0"/>
+            </a:br>
+            <a:r>
+              <a:rPr lang="en-US" dirty="0"/>
+              <a:t>(“bootstrap aggregation”)</a:t>
             </a:r>
             <a:endParaRPr lang="en-IL" dirty="0"/>
           </a:p>
@@ -6479,10 +6714,10 @@
       </p:sp>
       <p:sp>
         <p:nvSpPr>
-          <p:cNvPr id="3" name="Content Placeholder 2">
+          <p:cNvPr id="7" name="Text Placeholder 6">
             <a:extLst>
               <a:ext uri="{FF2B5EF4-FFF2-40B4-BE49-F238E27FC236}">
-                <a16:creationId xmlns:a16="http://schemas.microsoft.com/office/drawing/2014/main" id="{245ABCF7-6AA1-4B82-A039-868FA8C73A68}"/>
+                <a16:creationId xmlns:a16="http://schemas.microsoft.com/office/drawing/2014/main" id="{238784AB-D712-48D1-9C66-80E2CB0000D6}"/>
               </a:ext>
             </a:extLst>
           </p:cNvPr>
@@ -6490,7 +6725,7 @@
             <a:spLocks noGrp="1"/>
           </p:cNvSpPr>
           <p:nvPr>
-            <p:ph idx="1"/>
+            <p:ph type="body" idx="1"/>
           </p:nvPr>
         </p:nvSpPr>
         <p:spPr/>
@@ -6498,7 +6733,7 @@
           <a:bodyPr/>
           <a:lstStyle/>
           <a:p>
-            <a:endParaRPr lang="en-IL" dirty="0"/>
+            <a:endParaRPr lang="en-IL"/>
           </a:p>
         </p:txBody>
       </p:sp>
@@ -6507,7 +6742,7 @@
           <p:cNvPr id="4" name="Footer Placeholder 3">
             <a:extLst>
               <a:ext uri="{FF2B5EF4-FFF2-40B4-BE49-F238E27FC236}">
-                <a16:creationId xmlns:a16="http://schemas.microsoft.com/office/drawing/2014/main" id="{59BC251F-11EB-4627-8494-805C22661042}"/>
+                <a16:creationId xmlns:a16="http://schemas.microsoft.com/office/drawing/2014/main" id="{5D6B13F2-2CB6-4E7C-B2BC-A0320D20AF69}"/>
               </a:ext>
             </a:extLst>
           </p:cNvPr>
@@ -6536,7 +6771,7 @@
           <p:cNvPr id="5" name="Slide Number Placeholder 4">
             <a:extLst>
               <a:ext uri="{FF2B5EF4-FFF2-40B4-BE49-F238E27FC236}">
-                <a16:creationId xmlns:a16="http://schemas.microsoft.com/office/drawing/2014/main" id="{021902A6-EB2E-499B-816B-6A5163807960}"/>
+                <a16:creationId xmlns:a16="http://schemas.microsoft.com/office/drawing/2014/main" id="{359322BB-D65C-4202-B889-3F05EDA02657}"/>
               </a:ext>
             </a:extLst>
           </p:cNvPr>
@@ -6563,7 +6798,7 @@
     </p:spTree>
     <p:extLst>
       <p:ext uri="{BB962C8B-B14F-4D97-AF65-F5344CB8AC3E}">
-        <p14:creationId xmlns:p14="http://schemas.microsoft.com/office/powerpoint/2010/main" val="1725775073"/>
+        <p14:creationId xmlns:p14="http://schemas.microsoft.com/office/powerpoint/2010/main" val="3979452649"/>
       </p:ext>
     </p:extLst>
   </p:cSld>
@@ -6592,10 +6827,10 @@
       </p:grpSpPr>
       <p:sp>
         <p:nvSpPr>
-          <p:cNvPr id="2" name="Title 1">
+          <p:cNvPr id="6" name="Title 5">
             <a:extLst>
               <a:ext uri="{FF2B5EF4-FFF2-40B4-BE49-F238E27FC236}">
-                <a16:creationId xmlns:a16="http://schemas.microsoft.com/office/drawing/2014/main" id="{C45BA524-44F5-43AD-B56C-AECAEBF6D824}"/>
+                <a16:creationId xmlns:a16="http://schemas.microsoft.com/office/drawing/2014/main" id="{36BD2C52-5C4B-4947-9CC2-A335E120D85B}"/>
               </a:ext>
             </a:extLst>
           </p:cNvPr>
@@ -6613,43 +6848,237 @@
           <a:p>
             <a:r>
               <a:rPr lang="en-US" dirty="0"/>
-              <a:t>Bagging Example</a:t>
+              <a:t>What is Bootstrap?</a:t>
             </a:r>
             <a:endParaRPr lang="en-IL" dirty="0"/>
           </a:p>
         </p:txBody>
       </p:sp>
-      <p:sp>
-        <p:nvSpPr>
-          <p:cNvPr id="3" name="Content Placeholder 2">
-            <a:extLst>
-              <a:ext uri="{FF2B5EF4-FFF2-40B4-BE49-F238E27FC236}">
-                <a16:creationId xmlns:a16="http://schemas.microsoft.com/office/drawing/2014/main" id="{245ABCF7-6AA1-4B82-A039-868FA8C73A68}"/>
-              </a:ext>
-            </a:extLst>
-          </p:cNvPr>
-          <p:cNvSpPr>
-            <a:spLocks noGrp="1"/>
-          </p:cNvSpPr>
-          <p:nvPr>
-            <p:ph idx="1"/>
-          </p:nvPr>
-        </p:nvSpPr>
-        <p:spPr/>
-        <p:txBody>
-          <a:bodyPr/>
-          <a:lstStyle/>
-          <a:p>
-            <a:endParaRPr lang="en-IL" dirty="0"/>
-          </a:p>
-        </p:txBody>
-      </p:sp>
+      <mc:AlternateContent xmlns:mc="http://schemas.openxmlformats.org/markup-compatibility/2006">
+        <mc:Choice xmlns:a14="http://schemas.microsoft.com/office/drawing/2010/main" Requires="a14">
+          <p:sp>
+            <p:nvSpPr>
+              <p:cNvPr id="7" name="Content Placeholder 6">
+                <a:extLst>
+                  <a:ext uri="{FF2B5EF4-FFF2-40B4-BE49-F238E27FC236}">
+                    <a16:creationId xmlns:a16="http://schemas.microsoft.com/office/drawing/2014/main" id="{9CFB131C-2DB8-4577-9245-AA8CF1C3E107}"/>
+                  </a:ext>
+                </a:extLst>
+              </p:cNvPr>
+              <p:cNvSpPr>
+                <a:spLocks noGrp="1"/>
+              </p:cNvSpPr>
+              <p:nvPr>
+                <p:ph idx="1"/>
+              </p:nvPr>
+            </p:nvSpPr>
+            <p:spPr/>
+            <p:txBody>
+              <a:bodyPr/>
+              <a:lstStyle/>
+              <a:p>
+                <a:pPr>
+                  <a:lnSpc>
+                    <a:spcPct val="100000"/>
+                  </a:lnSpc>
+                </a:pPr>
+                <a:r>
+                  <a:rPr lang="en-US" dirty="0"/>
+                  <a:t>Some statistics are “easily” (analytically) computed from a data set, e.g.:</a:t>
+                </a:r>
+              </a:p>
+              <a:p>
+                <a:pPr lvl="1">
+                  <a:lnSpc>
+                    <a:spcPct val="100000"/>
+                  </a:lnSpc>
+                </a:pPr>
+                <a:r>
+                  <a:rPr lang="en-US" dirty="0"/>
+                  <a:t>Average, Standard Deviation, The SE of linear regression coefficients, </a:t>
+                </a:r>
+                <a14:m>
+                  <m:oMath xmlns:m="http://schemas.openxmlformats.org/officeDocument/2006/math">
+                    <m:sSup>
+                      <m:sSupPr>
+                        <m:ctrlPr>
+                          <a:rPr lang="en-US" b="0" i="1" smtClean="0">
+                            <a:latin typeface="Cambria Math" panose="02040503050406030204" pitchFamily="18" charset="0"/>
+                          </a:rPr>
+                        </m:ctrlPr>
+                      </m:sSupPr>
+                      <m:e>
+                        <m:r>
+                          <a:rPr lang="en-US" b="0" i="1" smtClean="0">
+                            <a:latin typeface="Cambria Math" panose="02040503050406030204" pitchFamily="18" charset="0"/>
+                          </a:rPr>
+                          <m:t>𝑅</m:t>
+                        </m:r>
+                      </m:e>
+                      <m:sup>
+                        <m:r>
+                          <a:rPr lang="en-US" b="0" i="1" smtClean="0">
+                            <a:latin typeface="Cambria Math" panose="02040503050406030204" pitchFamily="18" charset="0"/>
+                          </a:rPr>
+                          <m:t>2</m:t>
+                        </m:r>
+                      </m:sup>
+                    </m:sSup>
+                  </m:oMath>
+                </a14:m>
+                <a:r>
+                  <a:rPr lang="en-US" dirty="0"/>
+                  <a:t>, etc.</a:t>
+                </a:r>
+              </a:p>
+              <a:p>
+                <a:pPr>
+                  <a:lnSpc>
+                    <a:spcPct val="100000"/>
+                  </a:lnSpc>
+                </a:pPr>
+                <a:r>
+                  <a:rPr lang="en-US" dirty="0"/>
+                  <a:t>Some statistics do not have a closed analytical form, e.g.:</a:t>
+                </a:r>
+              </a:p>
+              <a:p>
+                <a:pPr lvl="1">
+                  <a:lnSpc>
+                    <a:spcPct val="100000"/>
+                  </a:lnSpc>
+                </a:pPr>
+                <a:r>
+                  <a:rPr lang="en-US" dirty="0"/>
+                  <a:t>Distribution of a median, when normality doesn’t hold.</a:t>
+                </a:r>
+              </a:p>
+              <a:p>
+                <a:pPr lvl="1">
+                  <a:lnSpc>
+                    <a:spcPct val="100000"/>
+                  </a:lnSpc>
+                </a:pPr>
+                <a:r>
+                  <a:rPr lang="en-US" dirty="0"/>
+                  <a:t>The distribution of a model’s </a:t>
+                </a:r>
+                <a14:m>
+                  <m:oMath xmlns:m="http://schemas.openxmlformats.org/officeDocument/2006/math">
+                    <m:sSup>
+                      <m:sSupPr>
+                        <m:ctrlPr>
+                          <a:rPr lang="en-US" b="0" i="1" smtClean="0">
+                            <a:latin typeface="Cambria Math" panose="02040503050406030204" pitchFamily="18" charset="0"/>
+                          </a:rPr>
+                        </m:ctrlPr>
+                      </m:sSupPr>
+                      <m:e>
+                        <m:r>
+                          <a:rPr lang="en-US" b="0" i="1" smtClean="0">
+                            <a:latin typeface="Cambria Math" panose="02040503050406030204" pitchFamily="18" charset="0"/>
+                          </a:rPr>
+                          <m:t>𝑅</m:t>
+                        </m:r>
+                      </m:e>
+                      <m:sup>
+                        <m:r>
+                          <a:rPr lang="en-US" b="0" i="1" smtClean="0">
+                            <a:latin typeface="Cambria Math" panose="02040503050406030204" pitchFamily="18" charset="0"/>
+                          </a:rPr>
+                          <m:t>2</m:t>
+                        </m:r>
+                      </m:sup>
+                    </m:sSup>
+                  </m:oMath>
+                </a14:m>
+                <a:r>
+                  <a:rPr lang="en-US" dirty="0"/>
+                  <a:t> (confidence interval).</a:t>
+                </a:r>
+              </a:p>
+              <a:p>
+                <a:pPr lvl="1">
+                  <a:lnSpc>
+                    <a:spcPct val="100000"/>
+                  </a:lnSpc>
+                </a:pPr>
+                <a:r>
+                  <a:rPr lang="en-US" dirty="0"/>
+                  <a:t>The distribution of the variance of a statistic.</a:t>
+                </a:r>
+              </a:p>
+              <a:p>
+                <a:pPr lvl="1">
+                  <a:lnSpc>
+                    <a:spcPct val="100000"/>
+                  </a:lnSpc>
+                </a:pPr>
+                <a:r>
+                  <a:rPr lang="en-US" dirty="0"/>
+                  <a:t>Statistics computed via a complex process.</a:t>
+                </a:r>
+              </a:p>
+              <a:p>
+                <a:pPr>
+                  <a:lnSpc>
+                    <a:spcPct val="100000"/>
+                  </a:lnSpc>
+                </a:pPr>
+                <a:r>
+                  <a:rPr lang="en-US" dirty="0"/>
+                  <a:t>Bootstrap is a method used for estimating statistics from a dataset, which is useful when no closed analytical form is available.</a:t>
+                </a:r>
+              </a:p>
+            </p:txBody>
+          </p:sp>
+        </mc:Choice>
+        <mc:Fallback>
+          <p:sp>
+            <p:nvSpPr>
+              <p:cNvPr id="7" name="Content Placeholder 6">
+                <a:extLst>
+                  <a:ext uri="{FF2B5EF4-FFF2-40B4-BE49-F238E27FC236}">
+                    <a16:creationId xmlns:a16="http://schemas.microsoft.com/office/drawing/2014/main" id="{9CFB131C-2DB8-4577-9245-AA8CF1C3E107}"/>
+                  </a:ext>
+                </a:extLst>
+              </p:cNvPr>
+              <p:cNvSpPr>
+                <a:spLocks noGrp="1" noRot="1" noChangeAspect="1" noMove="1" noResize="1" noEditPoints="1" noAdjustHandles="1" noChangeArrowheads="1" noChangeShapeType="1" noTextEdit="1"/>
+              </p:cNvSpPr>
+              <p:nvPr>
+                <p:ph idx="1"/>
+              </p:nvPr>
+            </p:nvSpPr>
+            <p:spPr>
+              <a:blipFill>
+                <a:blip r:embed="rId2"/>
+                <a:stretch>
+                  <a:fillRect l="-303" t="-752"/>
+                </a:stretch>
+              </a:blipFill>
+            </p:spPr>
+            <p:txBody>
+              <a:bodyPr/>
+              <a:lstStyle/>
+              <a:p>
+                <a:r>
+                  <a:rPr lang="en-IL">
+                    <a:noFill/>
+                  </a:rPr>
+                  <a:t> </a:t>
+                </a:r>
+              </a:p>
+            </p:txBody>
+          </p:sp>
+        </mc:Fallback>
+      </mc:AlternateContent>
       <p:sp>
         <p:nvSpPr>
           <p:cNvPr id="4" name="Footer Placeholder 3">
             <a:extLst>
               <a:ext uri="{FF2B5EF4-FFF2-40B4-BE49-F238E27FC236}">
-                <a16:creationId xmlns:a16="http://schemas.microsoft.com/office/drawing/2014/main" id="{59BC251F-11EB-4627-8494-805C22661042}"/>
+                <a16:creationId xmlns:a16="http://schemas.microsoft.com/office/drawing/2014/main" id="{EB937BFC-14FC-4A5E-9D60-51B0ABB4B33E}"/>
               </a:ext>
             </a:extLst>
           </p:cNvPr>
@@ -6678,7 +7107,7 @@
           <p:cNvPr id="5" name="Slide Number Placeholder 4">
             <a:extLst>
               <a:ext uri="{FF2B5EF4-FFF2-40B4-BE49-F238E27FC236}">
-                <a16:creationId xmlns:a16="http://schemas.microsoft.com/office/drawing/2014/main" id="{021902A6-EB2E-499B-816B-6A5163807960}"/>
+                <a16:creationId xmlns:a16="http://schemas.microsoft.com/office/drawing/2014/main" id="{CB4D8187-BDB6-4794-897C-E3FA4F69747D}"/>
               </a:ext>
             </a:extLst>
           </p:cNvPr>
@@ -6696,6 +7125,7 @@
           <a:p>
             <a:fld id="{4FAB73BC-B049-4115-A692-8D63A059BFB8}" type="slidenum">
               <a:rPr lang="en-US" smtClean="0"/>
+              <a:pPr/>
               <a:t>14</a:t>
             </a:fld>
             <a:endParaRPr lang="en-US" dirty="0"/>
@@ -6705,7 +7135,7 @@
     </p:spTree>
     <p:extLst>
       <p:ext uri="{BB962C8B-B14F-4D97-AF65-F5344CB8AC3E}">
-        <p14:creationId xmlns:p14="http://schemas.microsoft.com/office/powerpoint/2010/main" val="1895960918"/>
+        <p14:creationId xmlns:p14="http://schemas.microsoft.com/office/powerpoint/2010/main" val="3495876869"/>
       </p:ext>
     </p:extLst>
   </p:cSld>
@@ -6734,10 +7164,10 @@
       </p:grpSpPr>
       <p:sp>
         <p:nvSpPr>
-          <p:cNvPr id="6" name="Title 5">
+          <p:cNvPr id="2" name="Title 1">
             <a:extLst>
               <a:ext uri="{FF2B5EF4-FFF2-40B4-BE49-F238E27FC236}">
-                <a16:creationId xmlns:a16="http://schemas.microsoft.com/office/drawing/2014/main" id="{C1F7B72E-4181-4474-95E4-BB2F1AAE56AB}"/>
+                <a16:creationId xmlns:a16="http://schemas.microsoft.com/office/drawing/2014/main" id="{9F9D81F9-D566-4586-A510-7D9B0713A14C}"/>
               </a:ext>
             </a:extLst>
           </p:cNvPr>
@@ -6755,43 +7185,488 @@
           <a:p>
             <a:r>
               <a:rPr lang="en-US" dirty="0"/>
-              <a:t>Random Forests</a:t>
+              <a:t>How bootstrap works?</a:t>
             </a:r>
             <a:endParaRPr lang="en-IL" dirty="0"/>
           </a:p>
         </p:txBody>
       </p:sp>
-      <p:sp>
-        <p:nvSpPr>
-          <p:cNvPr id="7" name="Text Placeholder 6">
-            <a:extLst>
-              <a:ext uri="{FF2B5EF4-FFF2-40B4-BE49-F238E27FC236}">
-                <a16:creationId xmlns:a16="http://schemas.microsoft.com/office/drawing/2014/main" id="{238784AB-D712-48D1-9C66-80E2CB0000D6}"/>
-              </a:ext>
-            </a:extLst>
-          </p:cNvPr>
-          <p:cNvSpPr>
-            <a:spLocks noGrp="1"/>
-          </p:cNvSpPr>
-          <p:nvPr>
-            <p:ph type="body" idx="1"/>
-          </p:nvPr>
-        </p:nvSpPr>
-        <p:spPr/>
-        <p:txBody>
-          <a:bodyPr/>
-          <a:lstStyle/>
-          <a:p>
-            <a:endParaRPr lang="en-IL"/>
-          </a:p>
-        </p:txBody>
-      </p:sp>
+      <mc:AlternateContent xmlns:mc="http://schemas.openxmlformats.org/markup-compatibility/2006">
+        <mc:Choice xmlns:a14="http://schemas.microsoft.com/office/drawing/2010/main" Requires="a14">
+          <p:sp>
+            <p:nvSpPr>
+              <p:cNvPr id="3" name="Content Placeholder 2">
+                <a:extLst>
+                  <a:ext uri="{FF2B5EF4-FFF2-40B4-BE49-F238E27FC236}">
+                    <a16:creationId xmlns:a16="http://schemas.microsoft.com/office/drawing/2014/main" id="{3F8A31CC-E969-47DF-B693-1528E699079C}"/>
+                  </a:ext>
+                </a:extLst>
+              </p:cNvPr>
+              <p:cNvSpPr>
+                <a:spLocks noGrp="1"/>
+              </p:cNvSpPr>
+              <p:nvPr>
+                <p:ph idx="1"/>
+              </p:nvPr>
+            </p:nvSpPr>
+            <p:spPr/>
+            <p:txBody>
+              <a:bodyPr>
+                <a:normAutofit/>
+              </a:bodyPr>
+              <a:lstStyle/>
+              <a:p>
+                <a:pPr>
+                  <a:lnSpc>
+                    <a:spcPct val="100000"/>
+                  </a:lnSpc>
+                </a:pPr>
+                <a:r>
+                  <a:rPr lang="en-US" dirty="0"/>
+                  <a:t>Lets assume we have 100 random numbers between 0-1. You want to generate a normal random distribution. </a:t>
+                </a:r>
+                <a:r>
+                  <a:rPr lang="en-US" b="1" dirty="0"/>
+                  <a:t>What do you do?</a:t>
+                </a:r>
+              </a:p>
+              <a:p>
+                <a:pPr>
+                  <a:lnSpc>
+                    <a:spcPct val="100000"/>
+                  </a:lnSpc>
+                </a:pPr>
+                <a:r>
+                  <a:rPr lang="en-US" dirty="0"/>
+                  <a:t>Now, let </a:t>
+                </a:r>
+                <a14:m>
+                  <m:oMath xmlns:m="http://schemas.openxmlformats.org/officeDocument/2006/math">
+                    <m:acc>
+                      <m:accPr>
+                        <m:chr m:val="̂"/>
+                        <m:ctrlPr>
+                          <a:rPr lang="en-US" b="0" i="1" smtClean="0">
+                            <a:latin typeface="Cambria Math" panose="02040503050406030204" pitchFamily="18" charset="0"/>
+                          </a:rPr>
+                        </m:ctrlPr>
+                      </m:accPr>
+                      <m:e>
+                        <m:r>
+                          <a:rPr lang="en-US" b="0" i="1" smtClean="0">
+                            <a:latin typeface="Cambria Math" panose="02040503050406030204" pitchFamily="18" charset="0"/>
+                          </a:rPr>
+                          <m:t>𝑃</m:t>
+                        </m:r>
+                      </m:e>
+                    </m:acc>
+                  </m:oMath>
+                </a14:m>
+                <a:r>
+                  <a:rPr lang="en-US" dirty="0"/>
+                  <a:t>, the sample distribution, represent some unknown distribution </a:t>
+                </a:r>
+                <a14:m>
+                  <m:oMath xmlns:m="http://schemas.openxmlformats.org/officeDocument/2006/math">
+                    <m:r>
+                      <a:rPr lang="en-US" b="0" i="1" smtClean="0">
+                        <a:latin typeface="Cambria Math" panose="02040503050406030204" pitchFamily="18" charset="0"/>
+                      </a:rPr>
+                      <m:t>𝑃</m:t>
+                    </m:r>
+                  </m:oMath>
+                </a14:m>
+                <a:r>
+                  <a:rPr lang="en-US" dirty="0"/>
+                  <a:t> (related to the population from which the sample was drawn),</a:t>
+                </a:r>
+              </a:p>
+              <a:p>
+                <a:pPr>
+                  <a:lnSpc>
+                    <a:spcPct val="100000"/>
+                  </a:lnSpc>
+                </a:pPr>
+                <a:r>
+                  <a:rPr lang="en-US" dirty="0"/>
+                  <a:t>In other words, </a:t>
+                </a:r>
+                <a14:m>
+                  <m:oMath xmlns:m="http://schemas.openxmlformats.org/officeDocument/2006/math">
+                    <m:acc>
+                      <m:accPr>
+                        <m:chr m:val="̂"/>
+                        <m:ctrlPr>
+                          <a:rPr lang="en-US" b="0" i="1" smtClean="0">
+                            <a:latin typeface="Cambria Math" panose="02040503050406030204" pitchFamily="18" charset="0"/>
+                          </a:rPr>
+                        </m:ctrlPr>
+                      </m:accPr>
+                      <m:e>
+                        <m:r>
+                          <a:rPr lang="en-US" b="0" i="1" smtClean="0">
+                            <a:latin typeface="Cambria Math" panose="02040503050406030204" pitchFamily="18" charset="0"/>
+                          </a:rPr>
+                          <m:t>𝑃</m:t>
+                        </m:r>
+                      </m:e>
+                    </m:acc>
+                    <m:d>
+                      <m:dPr>
+                        <m:ctrlPr>
+                          <a:rPr lang="en-US" b="0" i="1" dirty="0" smtClean="0">
+                            <a:latin typeface="Cambria Math" panose="02040503050406030204" pitchFamily="18" charset="0"/>
+                          </a:rPr>
+                        </m:ctrlPr>
+                      </m:dPr>
+                      <m:e>
+                        <m:r>
+                          <a:rPr lang="en-US" b="0" i="1" dirty="0" smtClean="0">
+                            <a:latin typeface="Cambria Math" panose="02040503050406030204" pitchFamily="18" charset="0"/>
+                          </a:rPr>
+                          <m:t>𝑋</m:t>
+                        </m:r>
+                        <m:r>
+                          <a:rPr lang="en-US" b="0" i="1" dirty="0" smtClean="0">
+                            <a:latin typeface="Cambria Math" panose="02040503050406030204" pitchFamily="18" charset="0"/>
+                          </a:rPr>
+                          <m:t>=</m:t>
+                        </m:r>
+                        <m:r>
+                          <a:rPr lang="en-US" b="0" i="1" dirty="0" smtClean="0">
+                            <a:latin typeface="Cambria Math" panose="02040503050406030204" pitchFamily="18" charset="0"/>
+                          </a:rPr>
+                          <m:t>𝑡</m:t>
+                        </m:r>
+                      </m:e>
+                    </m:d>
+                    <m:r>
+                      <a:rPr lang="en-US" b="0" i="1" dirty="0" smtClean="0">
+                        <a:latin typeface="Cambria Math" panose="02040503050406030204" pitchFamily="18" charset="0"/>
+                      </a:rPr>
+                      <m:t>=</m:t>
+                    </m:r>
+                    <m:f>
+                      <m:fPr>
+                        <m:ctrlPr>
+                          <a:rPr lang="en-US" b="0" i="1" dirty="0" smtClean="0">
+                            <a:latin typeface="Cambria Math" panose="02040503050406030204" pitchFamily="18" charset="0"/>
+                          </a:rPr>
+                        </m:ctrlPr>
+                      </m:fPr>
+                      <m:num>
+                        <m:r>
+                          <a:rPr lang="en-US" b="0" i="1" dirty="0" smtClean="0">
+                            <a:latin typeface="Cambria Math" panose="02040503050406030204" pitchFamily="18" charset="0"/>
+                          </a:rPr>
+                          <m:t>1</m:t>
+                        </m:r>
+                      </m:num>
+                      <m:den>
+                        <m:r>
+                          <a:rPr lang="en-US" b="0" i="1" dirty="0" smtClean="0">
+                            <a:latin typeface="Cambria Math" panose="02040503050406030204" pitchFamily="18" charset="0"/>
+                          </a:rPr>
+                          <m:t>𝑛</m:t>
+                        </m:r>
+                      </m:den>
+                    </m:f>
+                    <m:r>
+                      <a:rPr lang="en-US" b="0" i="1" dirty="0" smtClean="0">
+                        <a:latin typeface="Cambria Math" panose="02040503050406030204" pitchFamily="18" charset="0"/>
+                      </a:rPr>
+                      <m:t>∑</m:t>
+                    </m:r>
+                    <m:sSub>
+                      <m:sSubPr>
+                        <m:ctrlPr>
+                          <a:rPr lang="en-US" b="0" i="0" dirty="0" smtClean="0">
+                            <a:latin typeface="Cambria Math" panose="02040503050406030204" pitchFamily="18" charset="0"/>
+                          </a:rPr>
+                        </m:ctrlPr>
+                      </m:sSubPr>
+                      <m:e>
+                        <m:r>
+                          <m:rPr>
+                            <m:sty m:val="p"/>
+                          </m:rPr>
+                          <a:rPr lang="en-US" b="0" i="0" dirty="0" smtClean="0">
+                            <a:latin typeface="Cambria Math" panose="02040503050406030204" pitchFamily="18" charset="0"/>
+                          </a:rPr>
+                          <m:t>I</m:t>
+                        </m:r>
+                      </m:e>
+                      <m:sub>
+                        <m:r>
+                          <a:rPr lang="en-US" b="0" i="1" dirty="0" smtClean="0">
+                            <a:latin typeface="Cambria Math" panose="02040503050406030204" pitchFamily="18" charset="0"/>
+                          </a:rPr>
+                          <m:t>𝑡</m:t>
+                        </m:r>
+                      </m:sub>
+                    </m:sSub>
+                    <m:r>
+                      <a:rPr lang="en-US" b="0" i="1" dirty="0" smtClean="0">
+                        <a:latin typeface="Cambria Math" panose="02040503050406030204" pitchFamily="18" charset="0"/>
+                      </a:rPr>
+                      <m:t>(</m:t>
+                    </m:r>
+                    <m:sSub>
+                      <m:sSubPr>
+                        <m:ctrlPr>
+                          <a:rPr lang="en-US" b="0" i="1" dirty="0" smtClean="0">
+                            <a:latin typeface="Cambria Math" panose="02040503050406030204" pitchFamily="18" charset="0"/>
+                          </a:rPr>
+                        </m:ctrlPr>
+                      </m:sSubPr>
+                      <m:e>
+                        <m:r>
+                          <a:rPr lang="en-US" b="0" i="1" dirty="0" smtClean="0">
+                            <a:latin typeface="Cambria Math" panose="02040503050406030204" pitchFamily="18" charset="0"/>
+                          </a:rPr>
+                          <m:t>𝑋</m:t>
+                        </m:r>
+                      </m:e>
+                      <m:sub>
+                        <m:r>
+                          <a:rPr lang="en-US" b="0" i="1" dirty="0" smtClean="0">
+                            <a:latin typeface="Cambria Math" panose="02040503050406030204" pitchFamily="18" charset="0"/>
+                          </a:rPr>
+                          <m:t>𝑖</m:t>
+                        </m:r>
+                      </m:sub>
+                    </m:sSub>
+                    <m:r>
+                      <a:rPr lang="en-US" b="0" i="1" dirty="0" smtClean="0">
+                        <a:latin typeface="Cambria Math" panose="02040503050406030204" pitchFamily="18" charset="0"/>
+                      </a:rPr>
+                      <m:t>)</m:t>
+                    </m:r>
+                  </m:oMath>
+                </a14:m>
+                <a:r>
+                  <a:rPr lang="en-US" dirty="0"/>
+                  <a:t>  (the sample of portion which is equal to </a:t>
+                </a:r>
+                <a:r>
+                  <a:rPr lang="en-US" i="1" dirty="0"/>
+                  <a:t>t</a:t>
+                </a:r>
+                <a:r>
+                  <a:rPr lang="en-US" dirty="0"/>
+                  <a:t>)</a:t>
+                </a:r>
+              </a:p>
+              <a:p>
+                <a:pPr>
+                  <a:lnSpc>
+                    <a:spcPct val="100000"/>
+                  </a:lnSpc>
+                </a:pPr>
+                <a:r>
+                  <a:rPr lang="en-US" dirty="0"/>
+                  <a:t>Generally, </a:t>
+                </a:r>
+                <a14:m>
+                  <m:oMath xmlns:m="http://schemas.openxmlformats.org/officeDocument/2006/math">
+                    <m:acc>
+                      <m:accPr>
+                        <m:chr m:val="̂"/>
+                        <m:ctrlPr>
+                          <a:rPr lang="en-US" b="0" i="1" smtClean="0">
+                            <a:latin typeface="Cambria Math" panose="02040503050406030204" pitchFamily="18" charset="0"/>
+                          </a:rPr>
+                        </m:ctrlPr>
+                      </m:accPr>
+                      <m:e>
+                        <m:r>
+                          <a:rPr lang="en-US" b="0" i="1" smtClean="0">
+                            <a:latin typeface="Cambria Math" panose="02040503050406030204" pitchFamily="18" charset="0"/>
+                          </a:rPr>
+                          <m:t>𝑃</m:t>
+                        </m:r>
+                      </m:e>
+                    </m:acc>
+                    <m:d>
+                      <m:dPr>
+                        <m:ctrlPr>
+                          <a:rPr lang="en-US" b="0" i="1" dirty="0" smtClean="0">
+                            <a:latin typeface="Cambria Math" panose="02040503050406030204" pitchFamily="18" charset="0"/>
+                          </a:rPr>
+                        </m:ctrlPr>
+                      </m:dPr>
+                      <m:e>
+                        <m:r>
+                          <a:rPr lang="en-US" b="0" i="1" dirty="0" smtClean="0">
+                            <a:latin typeface="Cambria Math" panose="02040503050406030204" pitchFamily="18" charset="0"/>
+                          </a:rPr>
+                          <m:t>𝐴</m:t>
+                        </m:r>
+                      </m:e>
+                    </m:d>
+                    <m:r>
+                      <a:rPr lang="en-US" b="0" i="1" dirty="0" smtClean="0">
+                        <a:latin typeface="Cambria Math" panose="02040503050406030204" pitchFamily="18" charset="0"/>
+                      </a:rPr>
+                      <m:t>=</m:t>
+                    </m:r>
+                    <m:f>
+                      <m:fPr>
+                        <m:ctrlPr>
+                          <a:rPr lang="en-US" b="0" i="1" dirty="0" smtClean="0">
+                            <a:latin typeface="Cambria Math" panose="02040503050406030204" pitchFamily="18" charset="0"/>
+                          </a:rPr>
+                        </m:ctrlPr>
+                      </m:fPr>
+                      <m:num>
+                        <m:r>
+                          <a:rPr lang="en-US" b="0" i="1" dirty="0" smtClean="0">
+                            <a:latin typeface="Cambria Math" panose="02040503050406030204" pitchFamily="18" charset="0"/>
+                          </a:rPr>
+                          <m:t>1</m:t>
+                        </m:r>
+                      </m:num>
+                      <m:den>
+                        <m:r>
+                          <a:rPr lang="en-US" b="0" i="1" dirty="0" smtClean="0">
+                            <a:latin typeface="Cambria Math" panose="02040503050406030204" pitchFamily="18" charset="0"/>
+                          </a:rPr>
+                          <m:t>𝑛</m:t>
+                        </m:r>
+                      </m:den>
+                    </m:f>
+                    <m:r>
+                      <a:rPr lang="en-US" b="0" i="1" dirty="0" smtClean="0">
+                        <a:latin typeface="Cambria Math" panose="02040503050406030204" pitchFamily="18" charset="0"/>
+                      </a:rPr>
+                      <m:t>∑</m:t>
+                    </m:r>
+                    <m:sSub>
+                      <m:sSubPr>
+                        <m:ctrlPr>
+                          <a:rPr lang="en-US" b="0" i="1" dirty="0" smtClean="0">
+                            <a:latin typeface="Cambria Math" panose="02040503050406030204" pitchFamily="18" charset="0"/>
+                          </a:rPr>
+                        </m:ctrlPr>
+                      </m:sSubPr>
+                      <m:e>
+                        <m:r>
+                          <a:rPr lang="en-US" b="0" i="1" dirty="0" smtClean="0">
+                            <a:latin typeface="Cambria Math" panose="02040503050406030204" pitchFamily="18" charset="0"/>
+                          </a:rPr>
+                          <m:t>𝐼</m:t>
+                        </m:r>
+                      </m:e>
+                      <m:sub>
+                        <m:r>
+                          <a:rPr lang="en-US" b="0" i="1" dirty="0" smtClean="0">
+                            <a:latin typeface="Cambria Math" panose="02040503050406030204" pitchFamily="18" charset="0"/>
+                          </a:rPr>
+                          <m:t>𝐴</m:t>
+                        </m:r>
+                      </m:sub>
+                    </m:sSub>
+                    <m:r>
+                      <a:rPr lang="en-US" b="0" i="1" dirty="0" smtClean="0">
+                        <a:latin typeface="Cambria Math" panose="02040503050406030204" pitchFamily="18" charset="0"/>
+                      </a:rPr>
+                      <m:t>(</m:t>
+                    </m:r>
+                    <m:sSub>
+                      <m:sSubPr>
+                        <m:ctrlPr>
+                          <a:rPr lang="en-US" b="0" i="1" dirty="0" smtClean="0">
+                            <a:latin typeface="Cambria Math" panose="02040503050406030204" pitchFamily="18" charset="0"/>
+                          </a:rPr>
+                        </m:ctrlPr>
+                      </m:sSubPr>
+                      <m:e>
+                        <m:r>
+                          <a:rPr lang="en-US" b="0" i="1" dirty="0" smtClean="0">
+                            <a:latin typeface="Cambria Math" panose="02040503050406030204" pitchFamily="18" charset="0"/>
+                          </a:rPr>
+                          <m:t>𝑋</m:t>
+                        </m:r>
+                      </m:e>
+                      <m:sub>
+                        <m:r>
+                          <a:rPr lang="en-US" b="0" i="1" dirty="0" smtClean="0">
+                            <a:latin typeface="Cambria Math" panose="02040503050406030204" pitchFamily="18" charset="0"/>
+                          </a:rPr>
+                          <m:t>𝑖</m:t>
+                        </m:r>
+                      </m:sub>
+                    </m:sSub>
+                    <m:r>
+                      <a:rPr lang="en-US" b="0" i="1" dirty="0" smtClean="0">
+                        <a:latin typeface="Cambria Math" panose="02040503050406030204" pitchFamily="18" charset="0"/>
+                      </a:rPr>
+                      <m:t>)</m:t>
+                    </m:r>
+                  </m:oMath>
+                </a14:m>
+                <a:r>
+                  <a:rPr lang="en-US" dirty="0"/>
+                  <a:t>   (i.e., </a:t>
+                </a:r>
+                <a:r>
+                  <a:rPr lang="en-US" i="1" dirty="0"/>
+                  <a:t>A</a:t>
+                </a:r>
+                <a:r>
+                  <a:rPr lang="en-US" dirty="0"/>
+                  <a:t> can be any “probabilistic event”)</a:t>
+                </a:r>
+              </a:p>
+            </p:txBody>
+          </p:sp>
+        </mc:Choice>
+        <mc:Fallback>
+          <p:sp>
+            <p:nvSpPr>
+              <p:cNvPr id="3" name="Content Placeholder 2">
+                <a:extLst>
+                  <a:ext uri="{FF2B5EF4-FFF2-40B4-BE49-F238E27FC236}">
+                    <a16:creationId xmlns:a16="http://schemas.microsoft.com/office/drawing/2014/main" id="{3F8A31CC-E969-47DF-B693-1528E699079C}"/>
+                  </a:ext>
+                </a:extLst>
+              </p:cNvPr>
+              <p:cNvSpPr>
+                <a:spLocks noGrp="1" noRot="1" noChangeAspect="1" noMove="1" noResize="1" noEditPoints="1" noAdjustHandles="1" noChangeArrowheads="1" noChangeShapeType="1" noTextEdit="1"/>
+              </p:cNvSpPr>
+              <p:nvPr>
+                <p:ph idx="1"/>
+              </p:nvPr>
+            </p:nvSpPr>
+            <p:spPr>
+              <a:blipFill>
+                <a:blip r:embed="rId2"/>
+                <a:stretch>
+                  <a:fillRect l="-303" t="-752"/>
+                </a:stretch>
+              </a:blipFill>
+            </p:spPr>
+            <p:txBody>
+              <a:bodyPr/>
+              <a:lstStyle/>
+              <a:p>
+                <a:r>
+                  <a:rPr lang="en-IL">
+                    <a:noFill/>
+                  </a:rPr>
+                  <a:t> </a:t>
+                </a:r>
+              </a:p>
+            </p:txBody>
+          </p:sp>
+        </mc:Fallback>
+      </mc:AlternateContent>
       <p:sp>
         <p:nvSpPr>
           <p:cNvPr id="4" name="Footer Placeholder 3">
             <a:extLst>
               <a:ext uri="{FF2B5EF4-FFF2-40B4-BE49-F238E27FC236}">
-                <a16:creationId xmlns:a16="http://schemas.microsoft.com/office/drawing/2014/main" id="{5D6B13F2-2CB6-4E7C-B2BC-A0320D20AF69}"/>
+                <a16:creationId xmlns:a16="http://schemas.microsoft.com/office/drawing/2014/main" id="{7EBBF761-ED26-4367-B8EE-D7ABAEB0F4D4}"/>
               </a:ext>
             </a:extLst>
           </p:cNvPr>
@@ -6820,7 +7695,7 @@
           <p:cNvPr id="5" name="Slide Number Placeholder 4">
             <a:extLst>
               <a:ext uri="{FF2B5EF4-FFF2-40B4-BE49-F238E27FC236}">
-                <a16:creationId xmlns:a16="http://schemas.microsoft.com/office/drawing/2014/main" id="{359322BB-D65C-4202-B889-3F05EDA02657}"/>
+                <a16:creationId xmlns:a16="http://schemas.microsoft.com/office/drawing/2014/main" id="{DE1DA5F8-F4F6-4C69-A038-F7CEB6B78ACA}"/>
               </a:ext>
             </a:extLst>
           </p:cNvPr>
@@ -6847,13 +7722,190 @@
     </p:spTree>
     <p:extLst>
       <p:ext uri="{BB962C8B-B14F-4D97-AF65-F5344CB8AC3E}">
-        <p14:creationId xmlns:p14="http://schemas.microsoft.com/office/powerpoint/2010/main" val="2383884864"/>
+        <p14:creationId xmlns:p14="http://schemas.microsoft.com/office/powerpoint/2010/main" val="2328267375"/>
       </p:ext>
     </p:extLst>
   </p:cSld>
   <p:clrMapOvr>
     <a:masterClrMapping/>
   </p:clrMapOvr>
+  <p:timing>
+    <p:tnLst>
+      <p:par>
+        <p:cTn id="1" dur="indefinite" restart="never" nodeType="tmRoot">
+          <p:childTnLst>
+            <p:seq concurrent="1" nextAc="seek">
+              <p:cTn id="2" dur="indefinite" nodeType="mainSeq">
+                <p:childTnLst>
+                  <p:par>
+                    <p:cTn id="3" fill="hold">
+                      <p:stCondLst>
+                        <p:cond delay="indefinite"/>
+                      </p:stCondLst>
+                      <p:childTnLst>
+                        <p:par>
+                          <p:cTn id="4" fill="hold">
+                            <p:stCondLst>
+                              <p:cond delay="0"/>
+                            </p:stCondLst>
+                            <p:childTnLst>
+                              <p:par>
+                                <p:cTn id="5" presetID="1" presetClass="entr" presetSubtype="0" fill="hold" nodeType="clickEffect">
+                                  <p:stCondLst>
+                                    <p:cond delay="0"/>
+                                  </p:stCondLst>
+                                  <p:childTnLst>
+                                    <p:set>
+                                      <p:cBhvr>
+                                        <p:cTn id="6" dur="1" fill="hold">
+                                          <p:stCondLst>
+                                            <p:cond delay="0"/>
+                                          </p:stCondLst>
+                                        </p:cTn>
+                                        <p:tgtEl>
+                                          <p:spTgt spid="3">
+                                            <p:txEl>
+                                              <p:pRg st="1" end="1"/>
+                                            </p:txEl>
+                                          </p:spTgt>
+                                        </p:tgtEl>
+                                        <p:attrNameLst>
+                                          <p:attrName>style.visibility</p:attrName>
+                                        </p:attrNameLst>
+                                      </p:cBhvr>
+                                      <p:to>
+                                        <p:strVal val="visible"/>
+                                      </p:to>
+                                    </p:set>
+                                  </p:childTnLst>
+                                </p:cTn>
+                              </p:par>
+                            </p:childTnLst>
+                          </p:cTn>
+                        </p:par>
+                      </p:childTnLst>
+                    </p:cTn>
+                  </p:par>
+                  <p:par>
+                    <p:cTn id="7" fill="hold">
+                      <p:stCondLst>
+                        <p:cond delay="indefinite"/>
+                      </p:stCondLst>
+                      <p:childTnLst>
+                        <p:par>
+                          <p:cTn id="8" fill="hold">
+                            <p:stCondLst>
+                              <p:cond delay="0"/>
+                            </p:stCondLst>
+                            <p:childTnLst>
+                              <p:par>
+                                <p:cTn id="9" presetID="1" presetClass="entr" presetSubtype="0" fill="hold" nodeType="clickEffect">
+                                  <p:stCondLst>
+                                    <p:cond delay="0"/>
+                                  </p:stCondLst>
+                                  <p:childTnLst>
+                                    <p:set>
+                                      <p:cBhvr>
+                                        <p:cTn id="10" dur="1" fill="hold">
+                                          <p:stCondLst>
+                                            <p:cond delay="0"/>
+                                          </p:stCondLst>
+                                        </p:cTn>
+                                        <p:tgtEl>
+                                          <p:spTgt spid="3">
+                                            <p:txEl>
+                                              <p:pRg st="2" end="2"/>
+                                            </p:txEl>
+                                          </p:spTgt>
+                                        </p:tgtEl>
+                                        <p:attrNameLst>
+                                          <p:attrName>style.visibility</p:attrName>
+                                        </p:attrNameLst>
+                                      </p:cBhvr>
+                                      <p:to>
+                                        <p:strVal val="visible"/>
+                                      </p:to>
+                                    </p:set>
+                                  </p:childTnLst>
+                                </p:cTn>
+                              </p:par>
+                            </p:childTnLst>
+                          </p:cTn>
+                        </p:par>
+                      </p:childTnLst>
+                    </p:cTn>
+                  </p:par>
+                  <p:par>
+                    <p:cTn id="11" fill="hold">
+                      <p:stCondLst>
+                        <p:cond delay="indefinite"/>
+                      </p:stCondLst>
+                      <p:childTnLst>
+                        <p:par>
+                          <p:cTn id="12" fill="hold">
+                            <p:stCondLst>
+                              <p:cond delay="0"/>
+                            </p:stCondLst>
+                            <p:childTnLst>
+                              <p:par>
+                                <p:cTn id="13" presetID="1" presetClass="entr" presetSubtype="0" fill="hold" nodeType="clickEffect">
+                                  <p:stCondLst>
+                                    <p:cond delay="0"/>
+                                  </p:stCondLst>
+                                  <p:childTnLst>
+                                    <p:set>
+                                      <p:cBhvr>
+                                        <p:cTn id="14" dur="1" fill="hold">
+                                          <p:stCondLst>
+                                            <p:cond delay="0"/>
+                                          </p:stCondLst>
+                                        </p:cTn>
+                                        <p:tgtEl>
+                                          <p:spTgt spid="3">
+                                            <p:txEl>
+                                              <p:pRg st="3" end="3"/>
+                                            </p:txEl>
+                                          </p:spTgt>
+                                        </p:tgtEl>
+                                        <p:attrNameLst>
+                                          <p:attrName>style.visibility</p:attrName>
+                                        </p:attrNameLst>
+                                      </p:cBhvr>
+                                      <p:to>
+                                        <p:strVal val="visible"/>
+                                      </p:to>
+                                    </p:set>
+                                  </p:childTnLst>
+                                </p:cTn>
+                              </p:par>
+                            </p:childTnLst>
+                          </p:cTn>
+                        </p:par>
+                      </p:childTnLst>
+                    </p:cTn>
+                  </p:par>
+                </p:childTnLst>
+              </p:cTn>
+              <p:prevCondLst>
+                <p:cond evt="onPrev" delay="0">
+                  <p:tgtEl>
+                    <p:sldTgt/>
+                  </p:tgtEl>
+                </p:cond>
+              </p:prevCondLst>
+              <p:nextCondLst>
+                <p:cond evt="onNext" delay="0">
+                  <p:tgtEl>
+                    <p:sldTgt/>
+                  </p:tgtEl>
+                </p:cond>
+              </p:nextCondLst>
+            </p:seq>
+          </p:childTnLst>
+        </p:cTn>
+      </p:par>
+    </p:tnLst>
+  </p:timing>
 </p:sld>
 </file>
 
@@ -6876,10 +7928,10 @@
       </p:grpSpPr>
       <p:sp>
         <p:nvSpPr>
-          <p:cNvPr id="8" name="Title 7">
+          <p:cNvPr id="2" name="Title 1">
             <a:extLst>
               <a:ext uri="{FF2B5EF4-FFF2-40B4-BE49-F238E27FC236}">
-                <a16:creationId xmlns:a16="http://schemas.microsoft.com/office/drawing/2014/main" id="{199DDFEB-C810-471D-9571-7EF7DB4FEFD3}"/>
+                <a16:creationId xmlns:a16="http://schemas.microsoft.com/office/drawing/2014/main" id="{9F9D81F9-D566-4586-A510-7D9B0713A14C}"/>
               </a:ext>
             </a:extLst>
           </p:cNvPr>
@@ -6897,43 +7949,293 @@
           <a:p>
             <a:r>
               <a:rPr lang="en-US" dirty="0"/>
-              <a:t>Random Forest Algorithm</a:t>
+              <a:t>How bootstrap works?</a:t>
             </a:r>
             <a:endParaRPr lang="en-IL" dirty="0"/>
           </a:p>
         </p:txBody>
       </p:sp>
-      <p:sp>
-        <p:nvSpPr>
-          <p:cNvPr id="9" name="Content Placeholder 8">
-            <a:extLst>
-              <a:ext uri="{FF2B5EF4-FFF2-40B4-BE49-F238E27FC236}">
-                <a16:creationId xmlns:a16="http://schemas.microsoft.com/office/drawing/2014/main" id="{9F36936E-36E1-41DD-9B1A-702A88BBAA36}"/>
-              </a:ext>
-            </a:extLst>
-          </p:cNvPr>
-          <p:cNvSpPr>
-            <a:spLocks noGrp="1"/>
-          </p:cNvSpPr>
-          <p:nvPr>
-            <p:ph idx="1"/>
-          </p:nvPr>
-        </p:nvSpPr>
-        <p:spPr/>
-        <p:txBody>
-          <a:bodyPr/>
-          <a:lstStyle/>
-          <a:p>
-            <a:endParaRPr lang="en-IL"/>
-          </a:p>
-        </p:txBody>
-      </p:sp>
+      <mc:AlternateContent xmlns:mc="http://schemas.openxmlformats.org/markup-compatibility/2006">
+        <mc:Choice xmlns:a14="http://schemas.microsoft.com/office/drawing/2010/main" Requires="a14">
+          <p:sp>
+            <p:nvSpPr>
+              <p:cNvPr id="3" name="Content Placeholder 2">
+                <a:extLst>
+                  <a:ext uri="{FF2B5EF4-FFF2-40B4-BE49-F238E27FC236}">
+                    <a16:creationId xmlns:a16="http://schemas.microsoft.com/office/drawing/2014/main" id="{3F8A31CC-E969-47DF-B693-1528E699079C}"/>
+                  </a:ext>
+                </a:extLst>
+              </p:cNvPr>
+              <p:cNvSpPr>
+                <a:spLocks noGrp="1"/>
+              </p:cNvSpPr>
+              <p:nvPr>
+                <p:ph idx="1"/>
+              </p:nvPr>
+            </p:nvSpPr>
+            <p:spPr/>
+            <p:txBody>
+              <a:bodyPr>
+                <a:normAutofit fontScale="85000" lnSpcReduction="10000"/>
+              </a:bodyPr>
+              <a:lstStyle/>
+              <a:p>
+                <a:pPr>
+                  <a:lnSpc>
+                    <a:spcPct val="150000"/>
+                  </a:lnSpc>
+                </a:pPr>
+                <a:r>
+                  <a:rPr lang="en-US" dirty="0"/>
+                  <a:t>Now we can use </a:t>
+                </a:r>
+                <a14:m>
+                  <m:oMath xmlns:m="http://schemas.openxmlformats.org/officeDocument/2006/math">
+                    <m:acc>
+                      <m:accPr>
+                        <m:chr m:val="̂"/>
+                        <m:ctrlPr>
+                          <a:rPr lang="en-US" b="0" i="1" smtClean="0">
+                            <a:latin typeface="Cambria Math" panose="02040503050406030204" pitchFamily="18" charset="0"/>
+                          </a:rPr>
+                        </m:ctrlPr>
+                      </m:accPr>
+                      <m:e>
+                        <m:r>
+                          <a:rPr lang="en-US" b="0" i="1" smtClean="0">
+                            <a:latin typeface="Cambria Math" panose="02040503050406030204" pitchFamily="18" charset="0"/>
+                          </a:rPr>
+                          <m:t>𝑃</m:t>
+                        </m:r>
+                      </m:e>
+                    </m:acc>
+                  </m:oMath>
+                </a14:m>
+                <a:r>
+                  <a:rPr lang="en-US" dirty="0"/>
+                  <a:t> to randomize a new sample “as if” we were sampling from </a:t>
+                </a:r>
+                <a14:m>
+                  <m:oMath xmlns:m="http://schemas.openxmlformats.org/officeDocument/2006/math">
+                    <m:r>
+                      <a:rPr lang="en-US" b="0" i="1" smtClean="0">
+                        <a:latin typeface="Cambria Math" panose="02040503050406030204" pitchFamily="18" charset="0"/>
+                      </a:rPr>
+                      <m:t>𝑃</m:t>
+                    </m:r>
+                  </m:oMath>
+                </a14:m>
+                <a:endParaRPr lang="en-US" dirty="0"/>
+              </a:p>
+              <a:p>
+                <a:pPr lvl="1">
+                  <a:lnSpc>
+                    <a:spcPct val="150000"/>
+                  </a:lnSpc>
+                </a:pPr>
+                <a:r>
+                  <a:rPr lang="en-US" dirty="0"/>
+                  <a:t>Use the existing data to create a new sample (with replacement)</a:t>
+                </a:r>
+              </a:p>
+              <a:p>
+                <a:pPr lvl="1">
+                  <a:lnSpc>
+                    <a:spcPct val="150000"/>
+                  </a:lnSpc>
+                </a:pPr>
+                <a:r>
+                  <a:rPr lang="en-US" dirty="0"/>
+                  <a:t>For each such sample compute the desired statistic (e.g. Median)</a:t>
+                </a:r>
+              </a:p>
+              <a:p>
+                <a:pPr lvl="1">
+                  <a:lnSpc>
+                    <a:spcPct val="150000"/>
+                  </a:lnSpc>
+                </a:pPr>
+                <a:r>
+                  <a:rPr lang="en-US" dirty="0"/>
+                  <a:t>Repeat this process </a:t>
+                </a:r>
+                <a:r>
+                  <a:rPr lang="en-US" i="1" dirty="0"/>
+                  <a:t>B</a:t>
+                </a:r>
+                <a:r>
+                  <a:rPr lang="en-US" dirty="0"/>
+                  <a:t> times (</a:t>
+                </a:r>
+                <a:r>
+                  <a:rPr lang="en-US" i="1" dirty="0"/>
+                  <a:t>B</a:t>
+                </a:r>
+                <a:r>
+                  <a:rPr lang="en-US" dirty="0"/>
+                  <a:t> samples)</a:t>
+                </a:r>
+              </a:p>
+              <a:p>
+                <a:pPr lvl="1">
+                  <a:lnSpc>
+                    <a:spcPct val="150000"/>
+                  </a:lnSpc>
+                </a:pPr>
+                <a:r>
+                  <a:rPr lang="en-US" dirty="0"/>
+                  <a:t>Compute the distribution of the statistic based on the </a:t>
+                </a:r>
+                <a:r>
+                  <a:rPr lang="en-US" i="1" dirty="0"/>
+                  <a:t>B</a:t>
+                </a:r>
+                <a:r>
+                  <a:rPr lang="en-US" dirty="0"/>
+                  <a:t> observations</a:t>
+                </a:r>
+              </a:p>
+              <a:p>
+                <a:pPr>
+                  <a:lnSpc>
+                    <a:spcPct val="150000"/>
+                  </a:lnSpc>
+                </a:pPr>
+                <a:r>
+                  <a:rPr lang="en-US" dirty="0"/>
+                  <a:t>For more theory: </a:t>
+                </a:r>
+              </a:p>
+              <a:p>
+                <a:pPr lvl="1">
+                  <a:lnSpc>
+                    <a:spcPct val="150000"/>
+                  </a:lnSpc>
+                </a:pPr>
+                <a:r>
+                  <a:rPr lang="en-US" dirty="0" err="1"/>
+                  <a:t>Efron</a:t>
+                </a:r>
+                <a:r>
+                  <a:rPr lang="en-US" dirty="0"/>
+                  <a:t>, B. and </a:t>
+                </a:r>
+                <a:r>
+                  <a:rPr lang="en-US" dirty="0" err="1"/>
+                  <a:t>Tibshirani</a:t>
+                </a:r>
+                <a:r>
+                  <a:rPr lang="en-US" dirty="0"/>
+                  <a:t>, R.J. (1993). An Introduction to the Bootstrap, Chapman &amp; Hall, New York.</a:t>
+                </a:r>
+              </a:p>
+              <a:p>
+                <a:pPr>
+                  <a:lnSpc>
+                    <a:spcPct val="150000"/>
+                  </a:lnSpc>
+                </a:pPr>
+                <a:r>
+                  <a:rPr lang="en-US" dirty="0"/>
+                  <a:t>In R, this can be facilitated by package </a:t>
+                </a:r>
+                <a:r>
+                  <a:rPr lang="en-US" dirty="0">
+                    <a:latin typeface="Courier New" panose="02070309020205020404" pitchFamily="49" charset="0"/>
+                    <a:cs typeface="Courier New" panose="02070309020205020404" pitchFamily="49" charset="0"/>
+                  </a:rPr>
+                  <a:t>boot </a:t>
+                </a:r>
+                <a:r>
+                  <a:rPr lang="en-US" dirty="0"/>
+                  <a:t>or</a:t>
+                </a:r>
+                <a:r>
+                  <a:rPr lang="en-US" dirty="0">
+                    <a:latin typeface="Courier New" panose="02070309020205020404" pitchFamily="49" charset="0"/>
+                    <a:cs typeface="Courier New" panose="02070309020205020404" pitchFamily="49" charset="0"/>
+                  </a:rPr>
+                  <a:t> </a:t>
+                </a:r>
+                <a:r>
+                  <a:rPr lang="en-US" u="sng" dirty="0" err="1">
+                    <a:latin typeface="Courier New" panose="02070309020205020404" pitchFamily="49" charset="0"/>
+                    <a:cs typeface="Courier New" panose="02070309020205020404" pitchFamily="49" charset="0"/>
+                  </a:rPr>
+                  <a:t>rsample</a:t>
+                </a:r>
+                <a:endParaRPr lang="en-US" u="sng" dirty="0">
+                  <a:latin typeface="Courier New" panose="02070309020205020404" pitchFamily="49" charset="0"/>
+                  <a:cs typeface="Courier New" panose="02070309020205020404" pitchFamily="49" charset="0"/>
+                </a:endParaRPr>
+              </a:p>
+              <a:p>
+                <a:pPr>
+                  <a:lnSpc>
+                    <a:spcPct val="150000"/>
+                  </a:lnSpc>
+                </a:pPr>
+                <a:r>
+                  <a:rPr lang="en-US" dirty="0">
+                    <a:latin typeface="Courier New" panose="02070309020205020404" pitchFamily="49" charset="0"/>
+                    <a:cs typeface="Courier New" panose="02070309020205020404" pitchFamily="49" charset="0"/>
+                  </a:rPr>
+                  <a:t>/class code/04-bootstrap_example.R</a:t>
+                </a:r>
+                <a:endParaRPr lang="en-IL" dirty="0">
+                  <a:latin typeface="Courier New" panose="02070309020205020404" pitchFamily="49" charset="0"/>
+                  <a:cs typeface="Courier New" panose="02070309020205020404" pitchFamily="49" charset="0"/>
+                </a:endParaRPr>
+              </a:p>
+            </p:txBody>
+          </p:sp>
+        </mc:Choice>
+        <mc:Fallback>
+          <p:sp>
+            <p:nvSpPr>
+              <p:cNvPr id="3" name="Content Placeholder 2">
+                <a:extLst>
+                  <a:ext uri="{FF2B5EF4-FFF2-40B4-BE49-F238E27FC236}">
+                    <a16:creationId xmlns:a16="http://schemas.microsoft.com/office/drawing/2014/main" id="{3F8A31CC-E969-47DF-B693-1528E699079C}"/>
+                  </a:ext>
+                </a:extLst>
+              </p:cNvPr>
+              <p:cNvSpPr>
+                <a:spLocks noGrp="1" noRot="1" noChangeAspect="1" noMove="1" noResize="1" noEditPoints="1" noAdjustHandles="1" noChangeArrowheads="1" noChangeShapeType="1" noTextEdit="1"/>
+              </p:cNvSpPr>
+              <p:nvPr>
+                <p:ph idx="1"/>
+              </p:nvPr>
+            </p:nvSpPr>
+            <p:spPr>
+              <a:blipFill>
+                <a:blip r:embed="rId3"/>
+                <a:stretch>
+                  <a:fillRect l="-121"/>
+                </a:stretch>
+              </a:blipFill>
+            </p:spPr>
+            <p:txBody>
+              <a:bodyPr/>
+              <a:lstStyle/>
+              <a:p>
+                <a:r>
+                  <a:rPr lang="en-IL">
+                    <a:noFill/>
+                  </a:rPr>
+                  <a:t> </a:t>
+                </a:r>
+              </a:p>
+            </p:txBody>
+          </p:sp>
+        </mc:Fallback>
+      </mc:AlternateContent>
       <p:sp>
         <p:nvSpPr>
           <p:cNvPr id="4" name="Footer Placeholder 3">
             <a:extLst>
               <a:ext uri="{FF2B5EF4-FFF2-40B4-BE49-F238E27FC236}">
-                <a16:creationId xmlns:a16="http://schemas.microsoft.com/office/drawing/2014/main" id="{B8E63889-BBE1-4DFC-B04D-7833103CB6A3}"/>
+                <a16:creationId xmlns:a16="http://schemas.microsoft.com/office/drawing/2014/main" id="{7EBBF761-ED26-4367-B8EE-D7ABAEB0F4D4}"/>
               </a:ext>
             </a:extLst>
           </p:cNvPr>
@@ -6962,7 +8264,7 @@
           <p:cNvPr id="5" name="Slide Number Placeholder 4">
             <a:extLst>
               <a:ext uri="{FF2B5EF4-FFF2-40B4-BE49-F238E27FC236}">
-                <a16:creationId xmlns:a16="http://schemas.microsoft.com/office/drawing/2014/main" id="{5273D10F-AB1B-47B0-80B3-96F2BF64E70A}"/>
+                <a16:creationId xmlns:a16="http://schemas.microsoft.com/office/drawing/2014/main" id="{DE1DA5F8-F4F6-4C69-A038-F7CEB6B78ACA}"/>
               </a:ext>
             </a:extLst>
           </p:cNvPr>
@@ -6980,17 +8282,46 @@
           <a:p>
             <a:fld id="{4FAB73BC-B049-4115-A692-8D63A059BFB8}" type="slidenum">
               <a:rPr lang="en-US" smtClean="0"/>
-              <a:pPr/>
               <a:t>16</a:t>
             </a:fld>
             <a:endParaRPr lang="en-US" dirty="0"/>
           </a:p>
         </p:txBody>
       </p:sp>
+      <p:pic>
+        <p:nvPicPr>
+          <p:cNvPr id="7" name="Picture 6">
+            <a:extLst>
+              <a:ext uri="{FF2B5EF4-FFF2-40B4-BE49-F238E27FC236}">
+                <a16:creationId xmlns:a16="http://schemas.microsoft.com/office/drawing/2014/main" id="{93955451-23DD-4DF0-9AD4-E649F03329E7}"/>
+              </a:ext>
+            </a:extLst>
+          </p:cNvPr>
+          <p:cNvPicPr>
+            <a:picLocks noChangeAspect="1"/>
+          </p:cNvPicPr>
+          <p:nvPr/>
+        </p:nvPicPr>
+        <p:blipFill>
+          <a:blip r:embed="rId4"/>
+          <a:stretch>
+            <a:fillRect/>
+          </a:stretch>
+        </p:blipFill>
+        <p:spPr>
+          <a:xfrm>
+            <a:off x="11122152" y="134461"/>
+            <a:ext cx="947614" cy="1102678"/>
+          </a:xfrm>
+          <a:prstGeom prst="rect">
+            <a:avLst/>
+          </a:prstGeom>
+        </p:spPr>
+      </p:pic>
     </p:spTree>
     <p:extLst>
       <p:ext uri="{BB962C8B-B14F-4D97-AF65-F5344CB8AC3E}">
-        <p14:creationId xmlns:p14="http://schemas.microsoft.com/office/powerpoint/2010/main" val="2493903139"/>
+        <p14:creationId xmlns:p14="http://schemas.microsoft.com/office/powerpoint/2010/main" val="3348148821"/>
       </p:ext>
     </p:extLst>
   </p:cSld>
@@ -7019,10 +8350,10 @@
       </p:grpSpPr>
       <p:sp>
         <p:nvSpPr>
-          <p:cNvPr id="8" name="Title 7">
+          <p:cNvPr id="2" name="Title 1">
             <a:extLst>
               <a:ext uri="{FF2B5EF4-FFF2-40B4-BE49-F238E27FC236}">
-                <a16:creationId xmlns:a16="http://schemas.microsoft.com/office/drawing/2014/main" id="{199DDFEB-C810-471D-9571-7EF7DB4FEFD3}"/>
+                <a16:creationId xmlns:a16="http://schemas.microsoft.com/office/drawing/2014/main" id="{C8D94AA1-340A-4BB5-BAAA-449CBA7FCA8D}"/>
               </a:ext>
             </a:extLst>
           </p:cNvPr>
@@ -7040,7 +8371,7 @@
           <a:p>
             <a:r>
               <a:rPr lang="en-US" dirty="0"/>
-              <a:t>Random Forest Example</a:t>
+              <a:t>Bagging (Bootstrap Aggregation)</a:t>
             </a:r>
             <a:endParaRPr lang="en-IL" dirty="0"/>
           </a:p>
@@ -7048,10 +8379,10 @@
       </p:sp>
       <p:sp>
         <p:nvSpPr>
-          <p:cNvPr id="9" name="Content Placeholder 8">
+          <p:cNvPr id="3" name="Content Placeholder 2">
             <a:extLst>
               <a:ext uri="{FF2B5EF4-FFF2-40B4-BE49-F238E27FC236}">
-                <a16:creationId xmlns:a16="http://schemas.microsoft.com/office/drawing/2014/main" id="{9F36936E-36E1-41DD-9B1A-702A88BBAA36}"/>
+                <a16:creationId xmlns:a16="http://schemas.microsoft.com/office/drawing/2014/main" id="{E964157B-FE0F-4D65-A77C-132BE3253AB7}"/>
               </a:ext>
             </a:extLst>
           </p:cNvPr>
@@ -7076,7 +8407,7 @@
           <p:cNvPr id="4" name="Footer Placeholder 3">
             <a:extLst>
               <a:ext uri="{FF2B5EF4-FFF2-40B4-BE49-F238E27FC236}">
-                <a16:creationId xmlns:a16="http://schemas.microsoft.com/office/drawing/2014/main" id="{B8E63889-BBE1-4DFC-B04D-7833103CB6A3}"/>
+                <a16:creationId xmlns:a16="http://schemas.microsoft.com/office/drawing/2014/main" id="{33C14BF4-9999-4602-AE2F-F03FA9A46596}"/>
               </a:ext>
             </a:extLst>
           </p:cNvPr>
@@ -7105,7 +8436,7 @@
           <p:cNvPr id="5" name="Slide Number Placeholder 4">
             <a:extLst>
               <a:ext uri="{FF2B5EF4-FFF2-40B4-BE49-F238E27FC236}">
-                <a16:creationId xmlns:a16="http://schemas.microsoft.com/office/drawing/2014/main" id="{5273D10F-AB1B-47B0-80B3-96F2BF64E70A}"/>
+                <a16:creationId xmlns:a16="http://schemas.microsoft.com/office/drawing/2014/main" id="{BEDC9B48-2A21-4DBB-9AD9-835D08278419}"/>
               </a:ext>
             </a:extLst>
           </p:cNvPr>
@@ -7123,7 +8454,6 @@
           <a:p>
             <a:fld id="{4FAB73BC-B049-4115-A692-8D63A059BFB8}" type="slidenum">
               <a:rPr lang="en-US" smtClean="0"/>
-              <a:pPr/>
               <a:t>17</a:t>
             </a:fld>
             <a:endParaRPr lang="en-US" dirty="0"/>
@@ -7133,7 +8463,7 @@
     </p:spTree>
     <p:extLst>
       <p:ext uri="{BB962C8B-B14F-4D97-AF65-F5344CB8AC3E}">
-        <p14:creationId xmlns:p14="http://schemas.microsoft.com/office/powerpoint/2010/main" val="3844348861"/>
+        <p14:creationId xmlns:p14="http://schemas.microsoft.com/office/powerpoint/2010/main" val="1952416764"/>
       </p:ext>
     </p:extLst>
   </p:cSld>
@@ -7162,10 +8492,10 @@
       </p:grpSpPr>
       <p:sp>
         <p:nvSpPr>
-          <p:cNvPr id="6" name="Title 5">
+          <p:cNvPr id="2" name="Title 1">
             <a:extLst>
               <a:ext uri="{FF2B5EF4-FFF2-40B4-BE49-F238E27FC236}">
-                <a16:creationId xmlns:a16="http://schemas.microsoft.com/office/drawing/2014/main" id="{C1F7B72E-4181-4474-95E4-BB2F1AAE56AB}"/>
+                <a16:creationId xmlns:a16="http://schemas.microsoft.com/office/drawing/2014/main" id="{DEA79A93-975D-489E-AED9-E70D2C394E45}"/>
               </a:ext>
             </a:extLst>
           </p:cNvPr>
@@ -7181,20 +8511,16 @@
           <a:bodyPr/>
           <a:lstStyle/>
           <a:p>
-            <a:r>
-              <a:rPr lang="en-US" dirty="0"/>
-              <a:t>Boosting</a:t>
-            </a:r>
             <a:endParaRPr lang="en-IL" dirty="0"/>
           </a:p>
         </p:txBody>
       </p:sp>
       <p:sp>
         <p:nvSpPr>
-          <p:cNvPr id="7" name="Text Placeholder 6">
+          <p:cNvPr id="3" name="Content Placeholder 2">
             <a:extLst>
               <a:ext uri="{FF2B5EF4-FFF2-40B4-BE49-F238E27FC236}">
-                <a16:creationId xmlns:a16="http://schemas.microsoft.com/office/drawing/2014/main" id="{238784AB-D712-48D1-9C66-80E2CB0000D6}"/>
+                <a16:creationId xmlns:a16="http://schemas.microsoft.com/office/drawing/2014/main" id="{5BA6EB24-11BD-4CA5-B6A1-EB1ECC5A3FDC}"/>
               </a:ext>
             </a:extLst>
           </p:cNvPr>
@@ -7202,7 +8528,7 @@
             <a:spLocks noGrp="1"/>
           </p:cNvSpPr>
           <p:nvPr>
-            <p:ph type="body" idx="1"/>
+            <p:ph idx="1"/>
           </p:nvPr>
         </p:nvSpPr>
         <p:spPr/>
@@ -7219,7 +8545,7 @@
           <p:cNvPr id="4" name="Footer Placeholder 3">
             <a:extLst>
               <a:ext uri="{FF2B5EF4-FFF2-40B4-BE49-F238E27FC236}">
-                <a16:creationId xmlns:a16="http://schemas.microsoft.com/office/drawing/2014/main" id="{5D6B13F2-2CB6-4E7C-B2BC-A0320D20AF69}"/>
+                <a16:creationId xmlns:a16="http://schemas.microsoft.com/office/drawing/2014/main" id="{DE04C2F2-5BE6-4022-8E43-73267C793844}"/>
               </a:ext>
             </a:extLst>
           </p:cNvPr>
@@ -7248,7 +8574,7 @@
           <p:cNvPr id="5" name="Slide Number Placeholder 4">
             <a:extLst>
               <a:ext uri="{FF2B5EF4-FFF2-40B4-BE49-F238E27FC236}">
-                <a16:creationId xmlns:a16="http://schemas.microsoft.com/office/drawing/2014/main" id="{359322BB-D65C-4202-B889-3F05EDA02657}"/>
+                <a16:creationId xmlns:a16="http://schemas.microsoft.com/office/drawing/2014/main" id="{C4A173A8-0616-495E-A338-B45631D742DA}"/>
               </a:ext>
             </a:extLst>
           </p:cNvPr>
@@ -7275,7 +8601,7 @@
     </p:spTree>
     <p:extLst>
       <p:ext uri="{BB962C8B-B14F-4D97-AF65-F5344CB8AC3E}">
-        <p14:creationId xmlns:p14="http://schemas.microsoft.com/office/powerpoint/2010/main" val="2864703264"/>
+        <p14:creationId xmlns:p14="http://schemas.microsoft.com/office/powerpoint/2010/main" val="3062051705"/>
       </p:ext>
     </p:extLst>
   </p:cSld>
@@ -7304,10 +8630,10 @@
       </p:grpSpPr>
       <p:sp>
         <p:nvSpPr>
-          <p:cNvPr id="8" name="Title 7">
+          <p:cNvPr id="2" name="Title 1">
             <a:extLst>
               <a:ext uri="{FF2B5EF4-FFF2-40B4-BE49-F238E27FC236}">
-                <a16:creationId xmlns:a16="http://schemas.microsoft.com/office/drawing/2014/main" id="{199DDFEB-C810-471D-9571-7EF7DB4FEFD3}"/>
+                <a16:creationId xmlns:a16="http://schemas.microsoft.com/office/drawing/2014/main" id="{C45BA524-44F5-43AD-B56C-AECAEBF6D824}"/>
               </a:ext>
             </a:extLst>
           </p:cNvPr>
@@ -7325,7 +8651,7 @@
           <a:p>
             <a:r>
               <a:rPr lang="en-US" dirty="0"/>
-              <a:t>Boosting Algorithm</a:t>
+              <a:t>How is Bagging Related to Bootstrap?</a:t>
             </a:r>
             <a:endParaRPr lang="en-IL" dirty="0"/>
           </a:p>
@@ -7333,10 +8659,10 @@
       </p:sp>
       <p:sp>
         <p:nvSpPr>
-          <p:cNvPr id="9" name="Content Placeholder 8">
+          <p:cNvPr id="3" name="Content Placeholder 2">
             <a:extLst>
               <a:ext uri="{FF2B5EF4-FFF2-40B4-BE49-F238E27FC236}">
-                <a16:creationId xmlns:a16="http://schemas.microsoft.com/office/drawing/2014/main" id="{9F36936E-36E1-41DD-9B1A-702A88BBAA36}"/>
+                <a16:creationId xmlns:a16="http://schemas.microsoft.com/office/drawing/2014/main" id="{245ABCF7-6AA1-4B82-A039-868FA8C73A68}"/>
               </a:ext>
             </a:extLst>
           </p:cNvPr>
@@ -7352,7 +8678,7 @@
           <a:bodyPr/>
           <a:lstStyle/>
           <a:p>
-            <a:endParaRPr lang="en-IL"/>
+            <a:endParaRPr lang="en-IL" dirty="0"/>
           </a:p>
         </p:txBody>
       </p:sp>
@@ -7361,7 +8687,7 @@
           <p:cNvPr id="4" name="Footer Placeholder 3">
             <a:extLst>
               <a:ext uri="{FF2B5EF4-FFF2-40B4-BE49-F238E27FC236}">
-                <a16:creationId xmlns:a16="http://schemas.microsoft.com/office/drawing/2014/main" id="{B8E63889-BBE1-4DFC-B04D-7833103CB6A3}"/>
+                <a16:creationId xmlns:a16="http://schemas.microsoft.com/office/drawing/2014/main" id="{59BC251F-11EB-4627-8494-805C22661042}"/>
               </a:ext>
             </a:extLst>
           </p:cNvPr>
@@ -7390,7 +8716,7 @@
           <p:cNvPr id="5" name="Slide Number Placeholder 4">
             <a:extLst>
               <a:ext uri="{FF2B5EF4-FFF2-40B4-BE49-F238E27FC236}">
-                <a16:creationId xmlns:a16="http://schemas.microsoft.com/office/drawing/2014/main" id="{5273D10F-AB1B-47B0-80B3-96F2BF64E70A}"/>
+                <a16:creationId xmlns:a16="http://schemas.microsoft.com/office/drawing/2014/main" id="{021902A6-EB2E-499B-816B-6A5163807960}"/>
               </a:ext>
             </a:extLst>
           </p:cNvPr>
@@ -7408,7 +8734,6 @@
           <a:p>
             <a:fld id="{4FAB73BC-B049-4115-A692-8D63A059BFB8}" type="slidenum">
               <a:rPr lang="en-US" smtClean="0"/>
-              <a:pPr/>
               <a:t>19</a:t>
             </a:fld>
             <a:endParaRPr lang="en-US" dirty="0"/>
@@ -7418,7 +8743,7 @@
     </p:spTree>
     <p:extLst>
       <p:ext uri="{BB962C8B-B14F-4D97-AF65-F5344CB8AC3E}">
-        <p14:creationId xmlns:p14="http://schemas.microsoft.com/office/powerpoint/2010/main" val="2136612770"/>
+        <p14:creationId xmlns:p14="http://schemas.microsoft.com/office/powerpoint/2010/main" val="1725775073"/>
       </p:ext>
     </p:extLst>
   </p:cSld>
@@ -7565,10 +8890,10 @@
       </p:grpSpPr>
       <p:sp>
         <p:nvSpPr>
-          <p:cNvPr id="8" name="Title 7">
+          <p:cNvPr id="2" name="Title 1">
             <a:extLst>
               <a:ext uri="{FF2B5EF4-FFF2-40B4-BE49-F238E27FC236}">
-                <a16:creationId xmlns:a16="http://schemas.microsoft.com/office/drawing/2014/main" id="{199DDFEB-C810-471D-9571-7EF7DB4FEFD3}"/>
+                <a16:creationId xmlns:a16="http://schemas.microsoft.com/office/drawing/2014/main" id="{C45BA524-44F5-43AD-B56C-AECAEBF6D824}"/>
               </a:ext>
             </a:extLst>
           </p:cNvPr>
@@ -7586,7 +8911,7 @@
           <a:p>
             <a:r>
               <a:rPr lang="en-US" dirty="0"/>
-              <a:t>Boosting Example</a:t>
+              <a:t>Bagging Example</a:t>
             </a:r>
             <a:endParaRPr lang="en-IL" dirty="0"/>
           </a:p>
@@ -7594,10 +8919,10 @@
       </p:sp>
       <p:sp>
         <p:nvSpPr>
-          <p:cNvPr id="9" name="Content Placeholder 8">
+          <p:cNvPr id="3" name="Content Placeholder 2">
             <a:extLst>
               <a:ext uri="{FF2B5EF4-FFF2-40B4-BE49-F238E27FC236}">
-                <a16:creationId xmlns:a16="http://schemas.microsoft.com/office/drawing/2014/main" id="{9F36936E-36E1-41DD-9B1A-702A88BBAA36}"/>
+                <a16:creationId xmlns:a16="http://schemas.microsoft.com/office/drawing/2014/main" id="{245ABCF7-6AA1-4B82-A039-868FA8C73A68}"/>
               </a:ext>
             </a:extLst>
           </p:cNvPr>
@@ -7613,7 +8938,7 @@
           <a:bodyPr/>
           <a:lstStyle/>
           <a:p>
-            <a:endParaRPr lang="en-IL"/>
+            <a:endParaRPr lang="en-IL" dirty="0"/>
           </a:p>
         </p:txBody>
       </p:sp>
@@ -7622,7 +8947,7 @@
           <p:cNvPr id="4" name="Footer Placeholder 3">
             <a:extLst>
               <a:ext uri="{FF2B5EF4-FFF2-40B4-BE49-F238E27FC236}">
-                <a16:creationId xmlns:a16="http://schemas.microsoft.com/office/drawing/2014/main" id="{B8E63889-BBE1-4DFC-B04D-7833103CB6A3}"/>
+                <a16:creationId xmlns:a16="http://schemas.microsoft.com/office/drawing/2014/main" id="{59BC251F-11EB-4627-8494-805C22661042}"/>
               </a:ext>
             </a:extLst>
           </p:cNvPr>
@@ -7651,7 +8976,7 @@
           <p:cNvPr id="5" name="Slide Number Placeholder 4">
             <a:extLst>
               <a:ext uri="{FF2B5EF4-FFF2-40B4-BE49-F238E27FC236}">
-                <a16:creationId xmlns:a16="http://schemas.microsoft.com/office/drawing/2014/main" id="{5273D10F-AB1B-47B0-80B3-96F2BF64E70A}"/>
+                <a16:creationId xmlns:a16="http://schemas.microsoft.com/office/drawing/2014/main" id="{021902A6-EB2E-499B-816B-6A5163807960}"/>
               </a:ext>
             </a:extLst>
           </p:cNvPr>
@@ -7669,7 +8994,6 @@
           <a:p>
             <a:fld id="{4FAB73BC-B049-4115-A692-8D63A059BFB8}" type="slidenum">
               <a:rPr lang="en-US" smtClean="0"/>
-              <a:pPr/>
               <a:t>20</a:t>
             </a:fld>
             <a:endParaRPr lang="en-US" dirty="0"/>
@@ -7679,7 +9003,7 @@
     </p:spTree>
     <p:extLst>
       <p:ext uri="{BB962C8B-B14F-4D97-AF65-F5344CB8AC3E}">
-        <p14:creationId xmlns:p14="http://schemas.microsoft.com/office/powerpoint/2010/main" val="4020124695"/>
+        <p14:creationId xmlns:p14="http://schemas.microsoft.com/office/powerpoint/2010/main" val="1895960918"/>
       </p:ext>
     </p:extLst>
   </p:cSld>
@@ -7708,6 +9032,720 @@
       </p:grpSpPr>
       <p:sp>
         <p:nvSpPr>
+          <p:cNvPr id="8" name="Title 7">
+            <a:extLst>
+              <a:ext uri="{FF2B5EF4-FFF2-40B4-BE49-F238E27FC236}">
+                <a16:creationId xmlns:a16="http://schemas.microsoft.com/office/drawing/2014/main" id="{199DDFEB-C810-471D-9571-7EF7DB4FEFD3}"/>
+              </a:ext>
+            </a:extLst>
+          </p:cNvPr>
+          <p:cNvSpPr>
+            <a:spLocks noGrp="1"/>
+          </p:cNvSpPr>
+          <p:nvPr>
+            <p:ph type="title"/>
+          </p:nvPr>
+        </p:nvSpPr>
+        <p:spPr/>
+        <p:txBody>
+          <a:bodyPr/>
+          <a:lstStyle/>
+          <a:p>
+            <a:r>
+              <a:rPr lang="en-US" dirty="0"/>
+              <a:t>Random Forest Algorithm</a:t>
+            </a:r>
+            <a:endParaRPr lang="en-IL" dirty="0"/>
+          </a:p>
+        </p:txBody>
+      </p:sp>
+      <p:sp>
+        <p:nvSpPr>
+          <p:cNvPr id="9" name="Content Placeholder 8">
+            <a:extLst>
+              <a:ext uri="{FF2B5EF4-FFF2-40B4-BE49-F238E27FC236}">
+                <a16:creationId xmlns:a16="http://schemas.microsoft.com/office/drawing/2014/main" id="{9F36936E-36E1-41DD-9B1A-702A88BBAA36}"/>
+              </a:ext>
+            </a:extLst>
+          </p:cNvPr>
+          <p:cNvSpPr>
+            <a:spLocks noGrp="1"/>
+          </p:cNvSpPr>
+          <p:nvPr>
+            <p:ph idx="1"/>
+          </p:nvPr>
+        </p:nvSpPr>
+        <p:spPr/>
+        <p:txBody>
+          <a:bodyPr/>
+          <a:lstStyle/>
+          <a:p>
+            <a:endParaRPr lang="en-IL"/>
+          </a:p>
+        </p:txBody>
+      </p:sp>
+      <p:sp>
+        <p:nvSpPr>
+          <p:cNvPr id="4" name="Footer Placeholder 3">
+            <a:extLst>
+              <a:ext uri="{FF2B5EF4-FFF2-40B4-BE49-F238E27FC236}">
+                <a16:creationId xmlns:a16="http://schemas.microsoft.com/office/drawing/2014/main" id="{B8E63889-BBE1-4DFC-B04D-7833103CB6A3}"/>
+              </a:ext>
+            </a:extLst>
+          </p:cNvPr>
+          <p:cNvSpPr>
+            <a:spLocks noGrp="1"/>
+          </p:cNvSpPr>
+          <p:nvPr>
+            <p:ph type="ftr" sz="quarter" idx="11"/>
+          </p:nvPr>
+        </p:nvSpPr>
+        <p:spPr/>
+        <p:txBody>
+          <a:bodyPr/>
+          <a:lstStyle/>
+          <a:p>
+            <a:r>
+              <a:rPr lang="en-US"/>
+              <a:t>Materials by Adi Sarid https://adisarid.github.io and http://www.sarid-ins.com</a:t>
+            </a:r>
+            <a:endParaRPr lang="en-US" dirty="0"/>
+          </a:p>
+        </p:txBody>
+      </p:sp>
+      <p:sp>
+        <p:nvSpPr>
+          <p:cNvPr id="5" name="Slide Number Placeholder 4">
+            <a:extLst>
+              <a:ext uri="{FF2B5EF4-FFF2-40B4-BE49-F238E27FC236}">
+                <a16:creationId xmlns:a16="http://schemas.microsoft.com/office/drawing/2014/main" id="{5273D10F-AB1B-47B0-80B3-96F2BF64E70A}"/>
+              </a:ext>
+            </a:extLst>
+          </p:cNvPr>
+          <p:cNvSpPr>
+            <a:spLocks noGrp="1"/>
+          </p:cNvSpPr>
+          <p:nvPr>
+            <p:ph type="sldNum" sz="quarter" idx="12"/>
+          </p:nvPr>
+        </p:nvSpPr>
+        <p:spPr/>
+        <p:txBody>
+          <a:bodyPr/>
+          <a:lstStyle/>
+          <a:p>
+            <a:fld id="{4FAB73BC-B049-4115-A692-8D63A059BFB8}" type="slidenum">
+              <a:rPr lang="en-US" smtClean="0"/>
+              <a:pPr/>
+              <a:t>21</a:t>
+            </a:fld>
+            <a:endParaRPr lang="en-US" dirty="0"/>
+          </a:p>
+        </p:txBody>
+      </p:sp>
+    </p:spTree>
+    <p:extLst>
+      <p:ext uri="{BB962C8B-B14F-4D97-AF65-F5344CB8AC3E}">
+        <p14:creationId xmlns:p14="http://schemas.microsoft.com/office/powerpoint/2010/main" val="2493903139"/>
+      </p:ext>
+    </p:extLst>
+  </p:cSld>
+  <p:clrMapOvr>
+    <a:masterClrMapping/>
+  </p:clrMapOvr>
+</p:sld>
+</file>
+
+<file path=ppt/slides/slide22.xml><?xml version="1.0" encoding="utf-8"?>
+<p:sld xmlns:a="http://schemas.openxmlformats.org/drawingml/2006/main" xmlns:r="http://schemas.openxmlformats.org/officeDocument/2006/relationships" xmlns:p="http://schemas.openxmlformats.org/presentationml/2006/main">
+  <p:cSld>
+    <p:spTree>
+      <p:nvGrpSpPr>
+        <p:cNvPr id="1" name=""/>
+        <p:cNvGrpSpPr/>
+        <p:nvPr/>
+      </p:nvGrpSpPr>
+      <p:grpSpPr>
+        <a:xfrm>
+          <a:off x="0" y="0"/>
+          <a:ext cx="0" cy="0"/>
+          <a:chOff x="0" y="0"/>
+          <a:chExt cx="0" cy="0"/>
+        </a:xfrm>
+      </p:grpSpPr>
+      <p:sp>
+        <p:nvSpPr>
+          <p:cNvPr id="8" name="Title 7">
+            <a:extLst>
+              <a:ext uri="{FF2B5EF4-FFF2-40B4-BE49-F238E27FC236}">
+                <a16:creationId xmlns:a16="http://schemas.microsoft.com/office/drawing/2014/main" id="{199DDFEB-C810-471D-9571-7EF7DB4FEFD3}"/>
+              </a:ext>
+            </a:extLst>
+          </p:cNvPr>
+          <p:cNvSpPr>
+            <a:spLocks noGrp="1"/>
+          </p:cNvSpPr>
+          <p:nvPr>
+            <p:ph type="title"/>
+          </p:nvPr>
+        </p:nvSpPr>
+        <p:spPr/>
+        <p:txBody>
+          <a:bodyPr/>
+          <a:lstStyle/>
+          <a:p>
+            <a:r>
+              <a:rPr lang="en-US" dirty="0"/>
+              <a:t>Random Forest Example</a:t>
+            </a:r>
+            <a:endParaRPr lang="en-IL" dirty="0"/>
+          </a:p>
+        </p:txBody>
+      </p:sp>
+      <p:sp>
+        <p:nvSpPr>
+          <p:cNvPr id="9" name="Content Placeholder 8">
+            <a:extLst>
+              <a:ext uri="{FF2B5EF4-FFF2-40B4-BE49-F238E27FC236}">
+                <a16:creationId xmlns:a16="http://schemas.microsoft.com/office/drawing/2014/main" id="{9F36936E-36E1-41DD-9B1A-702A88BBAA36}"/>
+              </a:ext>
+            </a:extLst>
+          </p:cNvPr>
+          <p:cNvSpPr>
+            <a:spLocks noGrp="1"/>
+          </p:cNvSpPr>
+          <p:nvPr>
+            <p:ph idx="1"/>
+          </p:nvPr>
+        </p:nvSpPr>
+        <p:spPr/>
+        <p:txBody>
+          <a:bodyPr/>
+          <a:lstStyle/>
+          <a:p>
+            <a:endParaRPr lang="en-IL"/>
+          </a:p>
+        </p:txBody>
+      </p:sp>
+      <p:sp>
+        <p:nvSpPr>
+          <p:cNvPr id="4" name="Footer Placeholder 3">
+            <a:extLst>
+              <a:ext uri="{FF2B5EF4-FFF2-40B4-BE49-F238E27FC236}">
+                <a16:creationId xmlns:a16="http://schemas.microsoft.com/office/drawing/2014/main" id="{B8E63889-BBE1-4DFC-B04D-7833103CB6A3}"/>
+              </a:ext>
+            </a:extLst>
+          </p:cNvPr>
+          <p:cNvSpPr>
+            <a:spLocks noGrp="1"/>
+          </p:cNvSpPr>
+          <p:nvPr>
+            <p:ph type="ftr" sz="quarter" idx="11"/>
+          </p:nvPr>
+        </p:nvSpPr>
+        <p:spPr/>
+        <p:txBody>
+          <a:bodyPr/>
+          <a:lstStyle/>
+          <a:p>
+            <a:r>
+              <a:rPr lang="en-US"/>
+              <a:t>Materials by Adi Sarid https://adisarid.github.io and http://www.sarid-ins.com</a:t>
+            </a:r>
+            <a:endParaRPr lang="en-US" dirty="0"/>
+          </a:p>
+        </p:txBody>
+      </p:sp>
+      <p:sp>
+        <p:nvSpPr>
+          <p:cNvPr id="5" name="Slide Number Placeholder 4">
+            <a:extLst>
+              <a:ext uri="{FF2B5EF4-FFF2-40B4-BE49-F238E27FC236}">
+                <a16:creationId xmlns:a16="http://schemas.microsoft.com/office/drawing/2014/main" id="{5273D10F-AB1B-47B0-80B3-96F2BF64E70A}"/>
+              </a:ext>
+            </a:extLst>
+          </p:cNvPr>
+          <p:cNvSpPr>
+            <a:spLocks noGrp="1"/>
+          </p:cNvSpPr>
+          <p:nvPr>
+            <p:ph type="sldNum" sz="quarter" idx="12"/>
+          </p:nvPr>
+        </p:nvSpPr>
+        <p:spPr/>
+        <p:txBody>
+          <a:bodyPr/>
+          <a:lstStyle/>
+          <a:p>
+            <a:fld id="{4FAB73BC-B049-4115-A692-8D63A059BFB8}" type="slidenum">
+              <a:rPr lang="en-US" smtClean="0"/>
+              <a:pPr/>
+              <a:t>22</a:t>
+            </a:fld>
+            <a:endParaRPr lang="en-US" dirty="0"/>
+          </a:p>
+        </p:txBody>
+      </p:sp>
+    </p:spTree>
+    <p:extLst>
+      <p:ext uri="{BB962C8B-B14F-4D97-AF65-F5344CB8AC3E}">
+        <p14:creationId xmlns:p14="http://schemas.microsoft.com/office/powerpoint/2010/main" val="3844348861"/>
+      </p:ext>
+    </p:extLst>
+  </p:cSld>
+  <p:clrMapOvr>
+    <a:masterClrMapping/>
+  </p:clrMapOvr>
+</p:sld>
+</file>
+
+<file path=ppt/slides/slide23.xml><?xml version="1.0" encoding="utf-8"?>
+<p:sld xmlns:a="http://schemas.openxmlformats.org/drawingml/2006/main" xmlns:r="http://schemas.openxmlformats.org/officeDocument/2006/relationships" xmlns:p="http://schemas.openxmlformats.org/presentationml/2006/main">
+  <p:cSld>
+    <p:spTree>
+      <p:nvGrpSpPr>
+        <p:cNvPr id="1" name=""/>
+        <p:cNvGrpSpPr/>
+        <p:nvPr/>
+      </p:nvGrpSpPr>
+      <p:grpSpPr>
+        <a:xfrm>
+          <a:off x="0" y="0"/>
+          <a:ext cx="0" cy="0"/>
+          <a:chOff x="0" y="0"/>
+          <a:chExt cx="0" cy="0"/>
+        </a:xfrm>
+      </p:grpSpPr>
+      <p:sp>
+        <p:nvSpPr>
+          <p:cNvPr id="6" name="Title 5">
+            <a:extLst>
+              <a:ext uri="{FF2B5EF4-FFF2-40B4-BE49-F238E27FC236}">
+                <a16:creationId xmlns:a16="http://schemas.microsoft.com/office/drawing/2014/main" id="{C1F7B72E-4181-4474-95E4-BB2F1AAE56AB}"/>
+              </a:ext>
+            </a:extLst>
+          </p:cNvPr>
+          <p:cNvSpPr>
+            <a:spLocks noGrp="1"/>
+          </p:cNvSpPr>
+          <p:nvPr>
+            <p:ph type="title"/>
+          </p:nvPr>
+        </p:nvSpPr>
+        <p:spPr/>
+        <p:txBody>
+          <a:bodyPr/>
+          <a:lstStyle/>
+          <a:p>
+            <a:r>
+              <a:rPr lang="en-US" dirty="0"/>
+              <a:t>Boosting</a:t>
+            </a:r>
+            <a:endParaRPr lang="en-IL" dirty="0"/>
+          </a:p>
+        </p:txBody>
+      </p:sp>
+      <p:sp>
+        <p:nvSpPr>
+          <p:cNvPr id="7" name="Text Placeholder 6">
+            <a:extLst>
+              <a:ext uri="{FF2B5EF4-FFF2-40B4-BE49-F238E27FC236}">
+                <a16:creationId xmlns:a16="http://schemas.microsoft.com/office/drawing/2014/main" id="{238784AB-D712-48D1-9C66-80E2CB0000D6}"/>
+              </a:ext>
+            </a:extLst>
+          </p:cNvPr>
+          <p:cNvSpPr>
+            <a:spLocks noGrp="1"/>
+          </p:cNvSpPr>
+          <p:nvPr>
+            <p:ph type="body" idx="1"/>
+          </p:nvPr>
+        </p:nvSpPr>
+        <p:spPr/>
+        <p:txBody>
+          <a:bodyPr/>
+          <a:lstStyle/>
+          <a:p>
+            <a:endParaRPr lang="en-IL"/>
+          </a:p>
+        </p:txBody>
+      </p:sp>
+      <p:sp>
+        <p:nvSpPr>
+          <p:cNvPr id="4" name="Footer Placeholder 3">
+            <a:extLst>
+              <a:ext uri="{FF2B5EF4-FFF2-40B4-BE49-F238E27FC236}">
+                <a16:creationId xmlns:a16="http://schemas.microsoft.com/office/drawing/2014/main" id="{5D6B13F2-2CB6-4E7C-B2BC-A0320D20AF69}"/>
+              </a:ext>
+            </a:extLst>
+          </p:cNvPr>
+          <p:cNvSpPr>
+            <a:spLocks noGrp="1"/>
+          </p:cNvSpPr>
+          <p:nvPr>
+            <p:ph type="ftr" sz="quarter" idx="11"/>
+          </p:nvPr>
+        </p:nvSpPr>
+        <p:spPr/>
+        <p:txBody>
+          <a:bodyPr/>
+          <a:lstStyle/>
+          <a:p>
+            <a:r>
+              <a:rPr lang="en-US"/>
+              <a:t>Materials by Adi Sarid https://adisarid.github.io and http://www.sarid-ins.com</a:t>
+            </a:r>
+            <a:endParaRPr lang="en-US" dirty="0"/>
+          </a:p>
+        </p:txBody>
+      </p:sp>
+      <p:sp>
+        <p:nvSpPr>
+          <p:cNvPr id="5" name="Slide Number Placeholder 4">
+            <a:extLst>
+              <a:ext uri="{FF2B5EF4-FFF2-40B4-BE49-F238E27FC236}">
+                <a16:creationId xmlns:a16="http://schemas.microsoft.com/office/drawing/2014/main" id="{359322BB-D65C-4202-B889-3F05EDA02657}"/>
+              </a:ext>
+            </a:extLst>
+          </p:cNvPr>
+          <p:cNvSpPr>
+            <a:spLocks noGrp="1"/>
+          </p:cNvSpPr>
+          <p:nvPr>
+            <p:ph type="sldNum" sz="quarter" idx="12"/>
+          </p:nvPr>
+        </p:nvSpPr>
+        <p:spPr/>
+        <p:txBody>
+          <a:bodyPr/>
+          <a:lstStyle/>
+          <a:p>
+            <a:fld id="{4FAB73BC-B049-4115-A692-8D63A059BFB8}" type="slidenum">
+              <a:rPr lang="en-US" smtClean="0"/>
+              <a:t>23</a:t>
+            </a:fld>
+            <a:endParaRPr lang="en-US" dirty="0"/>
+          </a:p>
+        </p:txBody>
+      </p:sp>
+    </p:spTree>
+    <p:extLst>
+      <p:ext uri="{BB962C8B-B14F-4D97-AF65-F5344CB8AC3E}">
+        <p14:creationId xmlns:p14="http://schemas.microsoft.com/office/powerpoint/2010/main" val="2864703264"/>
+      </p:ext>
+    </p:extLst>
+  </p:cSld>
+  <p:clrMapOvr>
+    <a:masterClrMapping/>
+  </p:clrMapOvr>
+</p:sld>
+</file>
+
+<file path=ppt/slides/slide24.xml><?xml version="1.0" encoding="utf-8"?>
+<p:sld xmlns:a="http://schemas.openxmlformats.org/drawingml/2006/main" xmlns:r="http://schemas.openxmlformats.org/officeDocument/2006/relationships" xmlns:p="http://schemas.openxmlformats.org/presentationml/2006/main">
+  <p:cSld>
+    <p:spTree>
+      <p:nvGrpSpPr>
+        <p:cNvPr id="1" name=""/>
+        <p:cNvGrpSpPr/>
+        <p:nvPr/>
+      </p:nvGrpSpPr>
+      <p:grpSpPr>
+        <a:xfrm>
+          <a:off x="0" y="0"/>
+          <a:ext cx="0" cy="0"/>
+          <a:chOff x="0" y="0"/>
+          <a:chExt cx="0" cy="0"/>
+        </a:xfrm>
+      </p:grpSpPr>
+      <p:sp>
+        <p:nvSpPr>
+          <p:cNvPr id="8" name="Title 7">
+            <a:extLst>
+              <a:ext uri="{FF2B5EF4-FFF2-40B4-BE49-F238E27FC236}">
+                <a16:creationId xmlns:a16="http://schemas.microsoft.com/office/drawing/2014/main" id="{199DDFEB-C810-471D-9571-7EF7DB4FEFD3}"/>
+              </a:ext>
+            </a:extLst>
+          </p:cNvPr>
+          <p:cNvSpPr>
+            <a:spLocks noGrp="1"/>
+          </p:cNvSpPr>
+          <p:nvPr>
+            <p:ph type="title"/>
+          </p:nvPr>
+        </p:nvSpPr>
+        <p:spPr/>
+        <p:txBody>
+          <a:bodyPr/>
+          <a:lstStyle/>
+          <a:p>
+            <a:r>
+              <a:rPr lang="en-US" dirty="0"/>
+              <a:t>Boosting Algorithm</a:t>
+            </a:r>
+            <a:endParaRPr lang="en-IL" dirty="0"/>
+          </a:p>
+        </p:txBody>
+      </p:sp>
+      <p:sp>
+        <p:nvSpPr>
+          <p:cNvPr id="9" name="Content Placeholder 8">
+            <a:extLst>
+              <a:ext uri="{FF2B5EF4-FFF2-40B4-BE49-F238E27FC236}">
+                <a16:creationId xmlns:a16="http://schemas.microsoft.com/office/drawing/2014/main" id="{9F36936E-36E1-41DD-9B1A-702A88BBAA36}"/>
+              </a:ext>
+            </a:extLst>
+          </p:cNvPr>
+          <p:cNvSpPr>
+            <a:spLocks noGrp="1"/>
+          </p:cNvSpPr>
+          <p:nvPr>
+            <p:ph idx="1"/>
+          </p:nvPr>
+        </p:nvSpPr>
+        <p:spPr/>
+        <p:txBody>
+          <a:bodyPr/>
+          <a:lstStyle/>
+          <a:p>
+            <a:endParaRPr lang="en-IL"/>
+          </a:p>
+        </p:txBody>
+      </p:sp>
+      <p:sp>
+        <p:nvSpPr>
+          <p:cNvPr id="4" name="Footer Placeholder 3">
+            <a:extLst>
+              <a:ext uri="{FF2B5EF4-FFF2-40B4-BE49-F238E27FC236}">
+                <a16:creationId xmlns:a16="http://schemas.microsoft.com/office/drawing/2014/main" id="{B8E63889-BBE1-4DFC-B04D-7833103CB6A3}"/>
+              </a:ext>
+            </a:extLst>
+          </p:cNvPr>
+          <p:cNvSpPr>
+            <a:spLocks noGrp="1"/>
+          </p:cNvSpPr>
+          <p:nvPr>
+            <p:ph type="ftr" sz="quarter" idx="11"/>
+          </p:nvPr>
+        </p:nvSpPr>
+        <p:spPr/>
+        <p:txBody>
+          <a:bodyPr/>
+          <a:lstStyle/>
+          <a:p>
+            <a:r>
+              <a:rPr lang="en-US"/>
+              <a:t>Materials by Adi Sarid https://adisarid.github.io and http://www.sarid-ins.com</a:t>
+            </a:r>
+            <a:endParaRPr lang="en-US" dirty="0"/>
+          </a:p>
+        </p:txBody>
+      </p:sp>
+      <p:sp>
+        <p:nvSpPr>
+          <p:cNvPr id="5" name="Slide Number Placeholder 4">
+            <a:extLst>
+              <a:ext uri="{FF2B5EF4-FFF2-40B4-BE49-F238E27FC236}">
+                <a16:creationId xmlns:a16="http://schemas.microsoft.com/office/drawing/2014/main" id="{5273D10F-AB1B-47B0-80B3-96F2BF64E70A}"/>
+              </a:ext>
+            </a:extLst>
+          </p:cNvPr>
+          <p:cNvSpPr>
+            <a:spLocks noGrp="1"/>
+          </p:cNvSpPr>
+          <p:nvPr>
+            <p:ph type="sldNum" sz="quarter" idx="12"/>
+          </p:nvPr>
+        </p:nvSpPr>
+        <p:spPr/>
+        <p:txBody>
+          <a:bodyPr/>
+          <a:lstStyle/>
+          <a:p>
+            <a:fld id="{4FAB73BC-B049-4115-A692-8D63A059BFB8}" type="slidenum">
+              <a:rPr lang="en-US" smtClean="0"/>
+              <a:pPr/>
+              <a:t>24</a:t>
+            </a:fld>
+            <a:endParaRPr lang="en-US" dirty="0"/>
+          </a:p>
+        </p:txBody>
+      </p:sp>
+    </p:spTree>
+    <p:extLst>
+      <p:ext uri="{BB962C8B-B14F-4D97-AF65-F5344CB8AC3E}">
+        <p14:creationId xmlns:p14="http://schemas.microsoft.com/office/powerpoint/2010/main" val="2136612770"/>
+      </p:ext>
+    </p:extLst>
+  </p:cSld>
+  <p:clrMapOvr>
+    <a:masterClrMapping/>
+  </p:clrMapOvr>
+</p:sld>
+</file>
+
+<file path=ppt/slides/slide25.xml><?xml version="1.0" encoding="utf-8"?>
+<p:sld xmlns:a="http://schemas.openxmlformats.org/drawingml/2006/main" xmlns:r="http://schemas.openxmlformats.org/officeDocument/2006/relationships" xmlns:p="http://schemas.openxmlformats.org/presentationml/2006/main">
+  <p:cSld>
+    <p:spTree>
+      <p:nvGrpSpPr>
+        <p:cNvPr id="1" name=""/>
+        <p:cNvGrpSpPr/>
+        <p:nvPr/>
+      </p:nvGrpSpPr>
+      <p:grpSpPr>
+        <a:xfrm>
+          <a:off x="0" y="0"/>
+          <a:ext cx="0" cy="0"/>
+          <a:chOff x="0" y="0"/>
+          <a:chExt cx="0" cy="0"/>
+        </a:xfrm>
+      </p:grpSpPr>
+      <p:sp>
+        <p:nvSpPr>
+          <p:cNvPr id="8" name="Title 7">
+            <a:extLst>
+              <a:ext uri="{FF2B5EF4-FFF2-40B4-BE49-F238E27FC236}">
+                <a16:creationId xmlns:a16="http://schemas.microsoft.com/office/drawing/2014/main" id="{199DDFEB-C810-471D-9571-7EF7DB4FEFD3}"/>
+              </a:ext>
+            </a:extLst>
+          </p:cNvPr>
+          <p:cNvSpPr>
+            <a:spLocks noGrp="1"/>
+          </p:cNvSpPr>
+          <p:nvPr>
+            <p:ph type="title"/>
+          </p:nvPr>
+        </p:nvSpPr>
+        <p:spPr/>
+        <p:txBody>
+          <a:bodyPr/>
+          <a:lstStyle/>
+          <a:p>
+            <a:r>
+              <a:rPr lang="en-US" dirty="0"/>
+              <a:t>Boosting Example</a:t>
+            </a:r>
+            <a:endParaRPr lang="en-IL" dirty="0"/>
+          </a:p>
+        </p:txBody>
+      </p:sp>
+      <p:sp>
+        <p:nvSpPr>
+          <p:cNvPr id="9" name="Content Placeholder 8">
+            <a:extLst>
+              <a:ext uri="{FF2B5EF4-FFF2-40B4-BE49-F238E27FC236}">
+                <a16:creationId xmlns:a16="http://schemas.microsoft.com/office/drawing/2014/main" id="{9F36936E-36E1-41DD-9B1A-702A88BBAA36}"/>
+              </a:ext>
+            </a:extLst>
+          </p:cNvPr>
+          <p:cNvSpPr>
+            <a:spLocks noGrp="1"/>
+          </p:cNvSpPr>
+          <p:nvPr>
+            <p:ph idx="1"/>
+          </p:nvPr>
+        </p:nvSpPr>
+        <p:spPr/>
+        <p:txBody>
+          <a:bodyPr/>
+          <a:lstStyle/>
+          <a:p>
+            <a:endParaRPr lang="en-IL"/>
+          </a:p>
+        </p:txBody>
+      </p:sp>
+      <p:sp>
+        <p:nvSpPr>
+          <p:cNvPr id="4" name="Footer Placeholder 3">
+            <a:extLst>
+              <a:ext uri="{FF2B5EF4-FFF2-40B4-BE49-F238E27FC236}">
+                <a16:creationId xmlns:a16="http://schemas.microsoft.com/office/drawing/2014/main" id="{B8E63889-BBE1-4DFC-B04D-7833103CB6A3}"/>
+              </a:ext>
+            </a:extLst>
+          </p:cNvPr>
+          <p:cNvSpPr>
+            <a:spLocks noGrp="1"/>
+          </p:cNvSpPr>
+          <p:nvPr>
+            <p:ph type="ftr" sz="quarter" idx="11"/>
+          </p:nvPr>
+        </p:nvSpPr>
+        <p:spPr/>
+        <p:txBody>
+          <a:bodyPr/>
+          <a:lstStyle/>
+          <a:p>
+            <a:r>
+              <a:rPr lang="en-US"/>
+              <a:t>Materials by Adi Sarid https://adisarid.github.io and http://www.sarid-ins.com</a:t>
+            </a:r>
+            <a:endParaRPr lang="en-US" dirty="0"/>
+          </a:p>
+        </p:txBody>
+      </p:sp>
+      <p:sp>
+        <p:nvSpPr>
+          <p:cNvPr id="5" name="Slide Number Placeholder 4">
+            <a:extLst>
+              <a:ext uri="{FF2B5EF4-FFF2-40B4-BE49-F238E27FC236}">
+                <a16:creationId xmlns:a16="http://schemas.microsoft.com/office/drawing/2014/main" id="{5273D10F-AB1B-47B0-80B3-96F2BF64E70A}"/>
+              </a:ext>
+            </a:extLst>
+          </p:cNvPr>
+          <p:cNvSpPr>
+            <a:spLocks noGrp="1"/>
+          </p:cNvSpPr>
+          <p:nvPr>
+            <p:ph type="sldNum" sz="quarter" idx="12"/>
+          </p:nvPr>
+        </p:nvSpPr>
+        <p:spPr/>
+        <p:txBody>
+          <a:bodyPr/>
+          <a:lstStyle/>
+          <a:p>
+            <a:fld id="{4FAB73BC-B049-4115-A692-8D63A059BFB8}" type="slidenum">
+              <a:rPr lang="en-US" smtClean="0"/>
+              <a:pPr/>
+              <a:t>25</a:t>
+            </a:fld>
+            <a:endParaRPr lang="en-US" dirty="0"/>
+          </a:p>
+        </p:txBody>
+      </p:sp>
+    </p:spTree>
+    <p:extLst>
+      <p:ext uri="{BB962C8B-B14F-4D97-AF65-F5344CB8AC3E}">
+        <p14:creationId xmlns:p14="http://schemas.microsoft.com/office/powerpoint/2010/main" val="4020124695"/>
+      </p:ext>
+    </p:extLst>
+  </p:cSld>
+  <p:clrMapOvr>
+    <a:masterClrMapping/>
+  </p:clrMapOvr>
+</p:sld>
+</file>
+
+<file path=ppt/slides/slide26.xml><?xml version="1.0" encoding="utf-8"?>
+<p:sld xmlns:a="http://schemas.openxmlformats.org/drawingml/2006/main" xmlns:r="http://schemas.openxmlformats.org/officeDocument/2006/relationships" xmlns:p="http://schemas.openxmlformats.org/presentationml/2006/main">
+  <p:cSld>
+    <p:spTree>
+      <p:nvGrpSpPr>
+        <p:cNvPr id="1" name=""/>
+        <p:cNvGrpSpPr/>
+        <p:nvPr/>
+      </p:nvGrpSpPr>
+      <p:grpSpPr>
+        <a:xfrm>
+          <a:off x="0" y="0"/>
+          <a:ext cx="0" cy="0"/>
+          <a:chOff x="0" y="0"/>
+          <a:chExt cx="0" cy="0"/>
+        </a:xfrm>
+      </p:grpSpPr>
+      <p:sp>
+        <p:nvSpPr>
           <p:cNvPr id="2" name="Title 1"/>
           <p:cNvSpPr>
             <a:spLocks noGrp="1"/>
@@ -7775,7 +9813,7 @@
           <a:p>
             <a:fld id="{4FAB73BC-B049-4115-A692-8D63A059BFB8}" type="slidenum">
               <a:rPr lang="en-US" smtClean="0"/>
-              <a:t>21</a:t>
+              <a:t>26</a:t>
             </a:fld>
             <a:endParaRPr lang="en-US" dirty="0"/>
           </a:p>
@@ -8728,6 +10766,95 @@
           </a:fontRef>
         </p:style>
       </p:cxnSp>
+      <p:sp>
+        <p:nvSpPr>
+          <p:cNvPr id="28" name="Rounded Rectangle 53">
+            <a:extLst>
+              <a:ext uri="{FF2B5EF4-FFF2-40B4-BE49-F238E27FC236}">
+                <a16:creationId xmlns:a16="http://schemas.microsoft.com/office/drawing/2014/main" id="{5A89EEEB-3FD3-4691-ACAF-BB15F2BC436D}"/>
+              </a:ext>
+            </a:extLst>
+          </p:cNvPr>
+          <p:cNvSpPr/>
+          <p:nvPr/>
+        </p:nvSpPr>
+        <p:spPr>
+          <a:xfrm>
+            <a:off x="1725178" y="5021471"/>
+            <a:ext cx="1410686" cy="623943"/>
+          </a:xfrm>
+          <a:prstGeom prst="roundRect">
+            <a:avLst/>
+          </a:prstGeom>
+        </p:spPr>
+        <p:style>
+          <a:lnRef idx="3">
+            <a:schemeClr val="lt1"/>
+          </a:lnRef>
+          <a:fillRef idx="1">
+            <a:schemeClr val="accent5"/>
+          </a:fillRef>
+          <a:effectRef idx="1">
+            <a:schemeClr val="accent5"/>
+          </a:effectRef>
+          <a:fontRef idx="minor">
+            <a:schemeClr val="lt1"/>
+          </a:fontRef>
+        </p:style>
+        <p:txBody>
+          <a:bodyPr rtlCol="1" anchor="ctr"/>
+          <a:lstStyle/>
+          <a:p>
+            <a:pPr algn="ctr"/>
+            <a:r>
+              <a:rPr lang="en-US" dirty="0"/>
+              <a:t>Bootstrap</a:t>
+            </a:r>
+            <a:endParaRPr lang="he-IL" dirty="0"/>
+          </a:p>
+        </p:txBody>
+      </p:sp>
+      <p:cxnSp>
+        <p:nvCxnSpPr>
+          <p:cNvPr id="29" name="Connector: Elbow 28">
+            <a:extLst>
+              <a:ext uri="{FF2B5EF4-FFF2-40B4-BE49-F238E27FC236}">
+                <a16:creationId xmlns:a16="http://schemas.microsoft.com/office/drawing/2014/main" id="{E6E56BD1-B2E3-4E1F-8912-F65B2865EF59}"/>
+              </a:ext>
+            </a:extLst>
+          </p:cNvPr>
+          <p:cNvCxnSpPr/>
+          <p:nvPr/>
+        </p:nvCxnSpPr>
+        <p:spPr>
+          <a:xfrm rot="16200000" flipH="1">
+            <a:off x="4676892" y="3399043"/>
+            <a:ext cx="1" cy="4492742"/>
+          </a:xfrm>
+          <a:prstGeom prst="bentConnector3">
+            <a:avLst>
+              <a:gd name="adj1" fmla="val 22860100000"/>
+            </a:avLst>
+          </a:prstGeom>
+          <a:ln>
+            <a:tailEnd type="triangle"/>
+          </a:ln>
+        </p:spPr>
+        <p:style>
+          <a:lnRef idx="1">
+            <a:schemeClr val="dk1"/>
+          </a:lnRef>
+          <a:fillRef idx="0">
+            <a:schemeClr val="dk1"/>
+          </a:fillRef>
+          <a:effectRef idx="0">
+            <a:schemeClr val="dk1"/>
+          </a:effectRef>
+          <a:fontRef idx="minor">
+            <a:schemeClr val="tx1"/>
+          </a:fontRef>
+        </p:style>
+      </p:cxnSp>
     </p:spTree>
     <p:extLst>
       <p:ext uri="{BB962C8B-B14F-4D97-AF65-F5344CB8AC3E}">
@@ -8741,7 +10868,7 @@
 </p:sld>
 </file>
 
-<file path=ppt/slides/slide22.xml><?xml version="1.0" encoding="utf-8"?>
+<file path=ppt/slides/slide27.xml><?xml version="1.0" encoding="utf-8"?>
 <p:sld xmlns:a="http://schemas.openxmlformats.org/drawingml/2006/main" xmlns:r="http://schemas.openxmlformats.org/officeDocument/2006/relationships" xmlns:p="http://schemas.openxmlformats.org/presentationml/2006/main">
   <p:cSld>
     <p:spTree>
@@ -8864,7 +10991,7 @@
           <a:p>
             <a:fld id="{4FAB73BC-B049-4115-A692-8D63A059BFB8}" type="slidenum">
               <a:rPr lang="en-US" smtClean="0"/>
-              <a:t>22</a:t>
+              <a:t>27</a:t>
             </a:fld>
             <a:endParaRPr lang="en-US" dirty="0"/>
           </a:p>

</xml_diff>

<commit_message>
Improved question about bootstrap
</commit_message>
<xml_diff>
--- a/presentation/pptx/04-Bagging, randomForests, and Boosting.pptx
+++ b/presentation/pptx/04-Bagging, randomForests, and Boosting.pptx
@@ -775,11 +775,25 @@
             </a:pPr>
             <a:r>
               <a:rPr lang="en-US" dirty="0"/>
-              <a:t>All of </a:t>
+              <a:t>The average of a sample which drawn from an “unknown distribution” (i.e., not normal, exponential, etc.)</a:t>
             </a:r>
+          </a:p>
+          <a:p>
+            <a:pPr marL="228600" indent="-228600">
+              <a:buAutoNum type="alphaUcPeriod"/>
+            </a:pPr>
             <a:r>
-              <a:rPr lang="en-US"/>
-              <a:t>the above</a:t>
+              <a:rPr lang="en-US" dirty="0"/>
+              <a:t>The standard deviation of a sample from which was drawn from an “unknown distribution”</a:t>
+            </a:r>
+          </a:p>
+          <a:p>
+            <a:pPr marL="228600" indent="-228600">
+              <a:buAutoNum type="alphaUcPeriod"/>
+            </a:pPr>
+            <a:r>
+              <a:rPr lang="en-US" dirty="0"/>
+              <a:t>A hypothesis test for the monotonicity of a density function</a:t>
             </a:r>
             <a:endParaRPr lang="en-IL" dirty="0"/>
           </a:p>
@@ -6854,8 +6868,8 @@
           </a:p>
         </p:txBody>
       </p:sp>
-      <mc:AlternateContent xmlns:mc="http://schemas.openxmlformats.org/markup-compatibility/2006">
-        <mc:Choice xmlns:a14="http://schemas.microsoft.com/office/drawing/2010/main" Requires="a14">
+      <mc:AlternateContent xmlns:mc="http://schemas.openxmlformats.org/markup-compatibility/2006" xmlns:a14="http://schemas.microsoft.com/office/drawing/2010/main">
+        <mc:Choice Requires="a14">
           <p:sp>
             <p:nvSpPr>
               <p:cNvPr id="7" name="Content Placeholder 6">
@@ -7033,7 +7047,7 @@
             </p:txBody>
           </p:sp>
         </mc:Choice>
-        <mc:Fallback>
+        <mc:Fallback xmlns="">
           <p:sp>
             <p:nvSpPr>
               <p:cNvPr id="7" name="Content Placeholder 6">
@@ -7191,8 +7205,8 @@
           </a:p>
         </p:txBody>
       </p:sp>
-      <mc:AlternateContent xmlns:mc="http://schemas.openxmlformats.org/markup-compatibility/2006">
-        <mc:Choice xmlns:a14="http://schemas.microsoft.com/office/drawing/2010/main" Requires="a14">
+      <mc:AlternateContent xmlns:mc="http://schemas.openxmlformats.org/markup-compatibility/2006" xmlns:a14="http://schemas.microsoft.com/office/drawing/2010/main">
+        <mc:Choice Requires="a14">
           <p:sp>
             <p:nvSpPr>
               <p:cNvPr id="3" name="Content Placeholder 2">
@@ -7380,7 +7394,7 @@
                     <m:sSub>
                       <m:sSubPr>
                         <m:ctrlPr>
-                          <a:rPr lang="en-US" b="0" i="0" dirty="0" smtClean="0">
+                          <a:rPr lang="en-US" b="0" i="1" dirty="0" smtClean="0">
                             <a:latin typeface="Cambria Math" panose="02040503050406030204" pitchFamily="18" charset="0"/>
                           </a:rPr>
                         </m:ctrlPr>
@@ -7621,7 +7635,7 @@
             </p:txBody>
           </p:sp>
         </mc:Choice>
-        <mc:Fallback>
+        <mc:Fallback xmlns="">
           <p:sp>
             <p:nvSpPr>
               <p:cNvPr id="3" name="Content Placeholder 2">
@@ -7955,8 +7969,8 @@
           </a:p>
         </p:txBody>
       </p:sp>
-      <mc:AlternateContent xmlns:mc="http://schemas.openxmlformats.org/markup-compatibility/2006">
-        <mc:Choice xmlns:a14="http://schemas.microsoft.com/office/drawing/2010/main" Requires="a14">
+      <mc:AlternateContent xmlns:mc="http://schemas.openxmlformats.org/markup-compatibility/2006" xmlns:a14="http://schemas.microsoft.com/office/drawing/2010/main">
+        <mc:Choice Requires="a14">
           <p:sp>
             <p:nvSpPr>
               <p:cNvPr id="3" name="Content Placeholder 2">
@@ -8190,7 +8204,7 @@
             </p:txBody>
           </p:sp>
         </mc:Choice>
-        <mc:Fallback>
+        <mc:Fallback xmlns="">
           <p:sp>
             <p:nvSpPr>
               <p:cNvPr id="3" name="Content Placeholder 2">
@@ -16337,13 +16351,7 @@
                             <a:rPr lang="en-US" b="0" i="1" smtClean="0">
                               <a:latin typeface="Cambria Math" panose="02040503050406030204" pitchFamily="18" charset="0"/>
                             </a:rPr>
-                            <m:t>=</m:t>
-                          </m:r>
-                          <m:r>
-                            <a:rPr lang="en-US" b="0" i="1" smtClean="0">
-                              <a:latin typeface="Cambria Math" panose="02040503050406030204" pitchFamily="18" charset="0"/>
-                            </a:rPr>
-                            <m:t>1</m:t>
+                            <m:t>=1</m:t>
                           </m:r>
                         </m:sub>
                         <m:sup>

</xml_diff>

<commit_message>
Added mentimeter link for bootstrap slide
</commit_message>
<xml_diff>
--- a/presentation/pptx/04-Bagging, randomForests, and Boosting.pptx
+++ b/presentation/pptx/04-Bagging, randomForests, and Boosting.pptx
@@ -5,7 +5,7 @@
     <p:sldMasterId id="2147483840" r:id="rId1"/>
   </p:sldMasterIdLst>
   <p:notesMasterIdLst>
-    <p:notesMasterId r:id="rId29"/>
+    <p:notesMasterId r:id="rId28"/>
   </p:notesMasterIdLst>
   <p:sldIdLst>
     <p:sldId id="256" r:id="rId2"/>
@@ -19,22 +19,21 @@
     <p:sldId id="297" r:id="rId10"/>
     <p:sldId id="298" r:id="rId11"/>
     <p:sldId id="303" r:id="rId12"/>
-    <p:sldId id="316" r:id="rId13"/>
-    <p:sldId id="299" r:id="rId14"/>
-    <p:sldId id="301" r:id="rId15"/>
-    <p:sldId id="315" r:id="rId16"/>
-    <p:sldId id="312" r:id="rId17"/>
-    <p:sldId id="314" r:id="rId18"/>
-    <p:sldId id="313" r:id="rId19"/>
-    <p:sldId id="302" r:id="rId20"/>
-    <p:sldId id="309" r:id="rId21"/>
-    <p:sldId id="306" r:id="rId22"/>
-    <p:sldId id="307" r:id="rId23"/>
-    <p:sldId id="304" r:id="rId24"/>
-    <p:sldId id="305" r:id="rId25"/>
-    <p:sldId id="308" r:id="rId26"/>
-    <p:sldId id="310" r:id="rId27"/>
-    <p:sldId id="311" r:id="rId28"/>
+    <p:sldId id="306" r:id="rId13"/>
+    <p:sldId id="307" r:id="rId14"/>
+    <p:sldId id="316" r:id="rId15"/>
+    <p:sldId id="299" r:id="rId16"/>
+    <p:sldId id="301" r:id="rId17"/>
+    <p:sldId id="315" r:id="rId18"/>
+    <p:sldId id="312" r:id="rId19"/>
+    <p:sldId id="314" r:id="rId20"/>
+    <p:sldId id="302" r:id="rId21"/>
+    <p:sldId id="309" r:id="rId22"/>
+    <p:sldId id="304" r:id="rId23"/>
+    <p:sldId id="305" r:id="rId24"/>
+    <p:sldId id="308" r:id="rId25"/>
+    <p:sldId id="310" r:id="rId26"/>
+    <p:sldId id="311" r:id="rId27"/>
   </p:sldIdLst>
   <p:sldSz cx="12192000" cy="6858000"/>
   <p:notesSz cx="6858000" cy="9144000"/>
@@ -733,8 +732,15 @@
             </a:r>
             <a:r>
               <a:rPr lang="en-US" dirty="0"/>
-              <a:t>:</a:t>
-            </a:r>
+              <a:t>: </a:t>
+            </a:r>
+            <a:r>
+              <a:rPr lang="en-US" dirty="0">
+                <a:hlinkClick r:id="rId3"/>
+              </a:rPr>
+              <a:t>https://www.mentimeter.com/s/4065641c158611be7b963216aa6d682e/5bf16a135536/edit?</a:t>
+            </a:r>
+            <a:endParaRPr lang="en-US" dirty="0"/>
           </a:p>
           <a:p>
             <a:r>
@@ -794,6 +800,33 @@
             <a:r>
               <a:rPr lang="en-US" dirty="0"/>
               <a:t>A hypothesis test for the monotonicity of a density function</a:t>
+            </a:r>
+          </a:p>
+          <a:p>
+            <a:pPr marL="228600" indent="-228600">
+              <a:buAutoNum type="alphaUcPeriod"/>
+            </a:pPr>
+            <a:endParaRPr lang="en-US" dirty="0"/>
+          </a:p>
+          <a:p>
+            <a:pPr marL="0" indent="0">
+              <a:buNone/>
+            </a:pPr>
+            <a:r>
+              <a:rPr lang="en-US" dirty="0"/>
+              <a:t>My set is (B; F; and maybe C. Specifically C can also be computed out of the likelihood function using the </a:t>
+            </a:r>
+            <a:r>
+              <a:rPr lang="en-US" i="1" dirty="0" err="1"/>
+              <a:t>confint</a:t>
+            </a:r>
+            <a:r>
+              <a:rPr lang="en-US" i="0" dirty="0"/>
+              <a:t> function</a:t>
+            </a:r>
+            <a:r>
+              <a:rPr lang="en-US" dirty="0"/>
+              <a:t>)</a:t>
             </a:r>
             <a:endParaRPr lang="en-IL" dirty="0"/>
           </a:p>
@@ -816,7 +849,7 @@
           <a:p>
             <a:fld id="{C4276747-8356-4D8F-84BF-3C530C5DAF39}" type="slidenum">
               <a:rPr lang="he-IL" smtClean="0"/>
-              <a:t>16</a:t>
+              <a:t>18</a:t>
             </a:fld>
             <a:endParaRPr lang="he-IL"/>
           </a:p>
@@ -900,7 +933,7 @@
           <a:p>
             <a:fld id="{C4276747-8356-4D8F-84BF-3C530C5DAF39}" type="slidenum">
               <a:rPr lang="he-IL" smtClean="0"/>
-              <a:t>26</a:t>
+              <a:t>25</a:t>
             </a:fld>
             <a:endParaRPr lang="he-IL"/>
           </a:p>
@@ -6553,10 +6586,10 @@
       </p:grpSpPr>
       <p:sp>
         <p:nvSpPr>
-          <p:cNvPr id="6" name="Title 5">
+          <p:cNvPr id="8" name="Title 7">
             <a:extLst>
               <a:ext uri="{FF2B5EF4-FFF2-40B4-BE49-F238E27FC236}">
-                <a16:creationId xmlns:a16="http://schemas.microsoft.com/office/drawing/2014/main" id="{F9410F38-6A76-423D-9DFF-59E988932E9B}"/>
+                <a16:creationId xmlns:a16="http://schemas.microsoft.com/office/drawing/2014/main" id="{199DDFEB-C810-471D-9571-7EF7DB4FEFD3}"/>
               </a:ext>
             </a:extLst>
           </p:cNvPr>
@@ -6572,16 +6605,20 @@
           <a:bodyPr/>
           <a:lstStyle/>
           <a:p>
-            <a:endParaRPr lang="en-IL"/>
-          </a:p>
-        </p:txBody>
-      </p:sp>
-      <p:sp>
-        <p:nvSpPr>
-          <p:cNvPr id="7" name="Content Placeholder 6">
+            <a:r>
+              <a:rPr lang="en-US" dirty="0"/>
+              <a:t>Random Forest Algorithm</a:t>
+            </a:r>
+            <a:endParaRPr lang="en-IL" dirty="0"/>
+          </a:p>
+        </p:txBody>
+      </p:sp>
+      <p:sp>
+        <p:nvSpPr>
+          <p:cNvPr id="9" name="Content Placeholder 8">
             <a:extLst>
               <a:ext uri="{FF2B5EF4-FFF2-40B4-BE49-F238E27FC236}">
-                <a16:creationId xmlns:a16="http://schemas.microsoft.com/office/drawing/2014/main" id="{7E8A62C2-2DBC-4DA6-9B61-994A498BC5F8}"/>
+                <a16:creationId xmlns:a16="http://schemas.microsoft.com/office/drawing/2014/main" id="{9F36936E-36E1-41DD-9B1A-702A88BBAA36}"/>
               </a:ext>
             </a:extLst>
           </p:cNvPr>
@@ -6606,7 +6643,7 @@
           <p:cNvPr id="4" name="Footer Placeholder 3">
             <a:extLst>
               <a:ext uri="{FF2B5EF4-FFF2-40B4-BE49-F238E27FC236}">
-                <a16:creationId xmlns:a16="http://schemas.microsoft.com/office/drawing/2014/main" id="{B26D5EE8-22A7-4AEA-8667-EBE567F5E08F}"/>
+                <a16:creationId xmlns:a16="http://schemas.microsoft.com/office/drawing/2014/main" id="{B8E63889-BBE1-4DFC-B04D-7833103CB6A3}"/>
               </a:ext>
             </a:extLst>
           </p:cNvPr>
@@ -6635,7 +6672,7 @@
           <p:cNvPr id="5" name="Slide Number Placeholder 4">
             <a:extLst>
               <a:ext uri="{FF2B5EF4-FFF2-40B4-BE49-F238E27FC236}">
-                <a16:creationId xmlns:a16="http://schemas.microsoft.com/office/drawing/2014/main" id="{7487FBE2-1B4F-4DD6-80B3-C680726CAB51}"/>
+                <a16:creationId xmlns:a16="http://schemas.microsoft.com/office/drawing/2014/main" id="{5273D10F-AB1B-47B0-80B3-96F2BF64E70A}"/>
               </a:ext>
             </a:extLst>
           </p:cNvPr>
@@ -6663,7 +6700,7 @@
     </p:spTree>
     <p:extLst>
       <p:ext uri="{BB962C8B-B14F-4D97-AF65-F5344CB8AC3E}">
-        <p14:creationId xmlns:p14="http://schemas.microsoft.com/office/powerpoint/2010/main" val="2201374704"/>
+        <p14:creationId xmlns:p14="http://schemas.microsoft.com/office/powerpoint/2010/main" val="2493903139"/>
       </p:ext>
     </p:extLst>
   </p:cSld>
@@ -6692,6 +6729,288 @@
       </p:grpSpPr>
       <p:sp>
         <p:nvSpPr>
+          <p:cNvPr id="8" name="Title 7">
+            <a:extLst>
+              <a:ext uri="{FF2B5EF4-FFF2-40B4-BE49-F238E27FC236}">
+                <a16:creationId xmlns:a16="http://schemas.microsoft.com/office/drawing/2014/main" id="{199DDFEB-C810-471D-9571-7EF7DB4FEFD3}"/>
+              </a:ext>
+            </a:extLst>
+          </p:cNvPr>
+          <p:cNvSpPr>
+            <a:spLocks noGrp="1"/>
+          </p:cNvSpPr>
+          <p:nvPr>
+            <p:ph type="title"/>
+          </p:nvPr>
+        </p:nvSpPr>
+        <p:spPr/>
+        <p:txBody>
+          <a:bodyPr/>
+          <a:lstStyle/>
+          <a:p>
+            <a:r>
+              <a:rPr lang="en-US" dirty="0"/>
+              <a:t>Random Forest Example</a:t>
+            </a:r>
+            <a:endParaRPr lang="en-IL" dirty="0"/>
+          </a:p>
+        </p:txBody>
+      </p:sp>
+      <p:sp>
+        <p:nvSpPr>
+          <p:cNvPr id="9" name="Content Placeholder 8">
+            <a:extLst>
+              <a:ext uri="{FF2B5EF4-FFF2-40B4-BE49-F238E27FC236}">
+                <a16:creationId xmlns:a16="http://schemas.microsoft.com/office/drawing/2014/main" id="{9F36936E-36E1-41DD-9B1A-702A88BBAA36}"/>
+              </a:ext>
+            </a:extLst>
+          </p:cNvPr>
+          <p:cNvSpPr>
+            <a:spLocks noGrp="1"/>
+          </p:cNvSpPr>
+          <p:nvPr>
+            <p:ph idx="1"/>
+          </p:nvPr>
+        </p:nvSpPr>
+        <p:spPr/>
+        <p:txBody>
+          <a:bodyPr/>
+          <a:lstStyle/>
+          <a:p>
+            <a:endParaRPr lang="en-IL"/>
+          </a:p>
+        </p:txBody>
+      </p:sp>
+      <p:sp>
+        <p:nvSpPr>
+          <p:cNvPr id="4" name="Footer Placeholder 3">
+            <a:extLst>
+              <a:ext uri="{FF2B5EF4-FFF2-40B4-BE49-F238E27FC236}">
+                <a16:creationId xmlns:a16="http://schemas.microsoft.com/office/drawing/2014/main" id="{B8E63889-BBE1-4DFC-B04D-7833103CB6A3}"/>
+              </a:ext>
+            </a:extLst>
+          </p:cNvPr>
+          <p:cNvSpPr>
+            <a:spLocks noGrp="1"/>
+          </p:cNvSpPr>
+          <p:nvPr>
+            <p:ph type="ftr" sz="quarter" idx="11"/>
+          </p:nvPr>
+        </p:nvSpPr>
+        <p:spPr/>
+        <p:txBody>
+          <a:bodyPr/>
+          <a:lstStyle/>
+          <a:p>
+            <a:r>
+              <a:rPr lang="en-US"/>
+              <a:t>Materials by Adi Sarid https://adisarid.github.io and http://www.sarid-ins.com</a:t>
+            </a:r>
+            <a:endParaRPr lang="en-US" dirty="0"/>
+          </a:p>
+        </p:txBody>
+      </p:sp>
+      <p:sp>
+        <p:nvSpPr>
+          <p:cNvPr id="5" name="Slide Number Placeholder 4">
+            <a:extLst>
+              <a:ext uri="{FF2B5EF4-FFF2-40B4-BE49-F238E27FC236}">
+                <a16:creationId xmlns:a16="http://schemas.microsoft.com/office/drawing/2014/main" id="{5273D10F-AB1B-47B0-80B3-96F2BF64E70A}"/>
+              </a:ext>
+            </a:extLst>
+          </p:cNvPr>
+          <p:cNvSpPr>
+            <a:spLocks noGrp="1"/>
+          </p:cNvSpPr>
+          <p:nvPr>
+            <p:ph type="sldNum" sz="quarter" idx="12"/>
+          </p:nvPr>
+        </p:nvSpPr>
+        <p:spPr/>
+        <p:txBody>
+          <a:bodyPr/>
+          <a:lstStyle/>
+          <a:p>
+            <a:fld id="{4FAB73BC-B049-4115-A692-8D63A059BFB8}" type="slidenum">
+              <a:rPr lang="en-US" smtClean="0"/>
+              <a:pPr/>
+              <a:t>13</a:t>
+            </a:fld>
+            <a:endParaRPr lang="en-US" dirty="0"/>
+          </a:p>
+        </p:txBody>
+      </p:sp>
+    </p:spTree>
+    <p:extLst>
+      <p:ext uri="{BB962C8B-B14F-4D97-AF65-F5344CB8AC3E}">
+        <p14:creationId xmlns:p14="http://schemas.microsoft.com/office/powerpoint/2010/main" val="3844348861"/>
+      </p:ext>
+    </p:extLst>
+  </p:cSld>
+  <p:clrMapOvr>
+    <a:masterClrMapping/>
+  </p:clrMapOvr>
+</p:sld>
+</file>
+
+<file path=ppt/slides/slide14.xml><?xml version="1.0" encoding="utf-8"?>
+<p:sld xmlns:a="http://schemas.openxmlformats.org/drawingml/2006/main" xmlns:r="http://schemas.openxmlformats.org/officeDocument/2006/relationships" xmlns:p="http://schemas.openxmlformats.org/presentationml/2006/main">
+  <p:cSld>
+    <p:spTree>
+      <p:nvGrpSpPr>
+        <p:cNvPr id="1" name=""/>
+        <p:cNvGrpSpPr/>
+        <p:nvPr/>
+      </p:nvGrpSpPr>
+      <p:grpSpPr>
+        <a:xfrm>
+          <a:off x="0" y="0"/>
+          <a:ext cx="0" cy="0"/>
+          <a:chOff x="0" y="0"/>
+          <a:chExt cx="0" cy="0"/>
+        </a:xfrm>
+      </p:grpSpPr>
+      <p:sp>
+        <p:nvSpPr>
+          <p:cNvPr id="6" name="Title 5">
+            <a:extLst>
+              <a:ext uri="{FF2B5EF4-FFF2-40B4-BE49-F238E27FC236}">
+                <a16:creationId xmlns:a16="http://schemas.microsoft.com/office/drawing/2014/main" id="{F9410F38-6A76-423D-9DFF-59E988932E9B}"/>
+              </a:ext>
+            </a:extLst>
+          </p:cNvPr>
+          <p:cNvSpPr>
+            <a:spLocks noGrp="1"/>
+          </p:cNvSpPr>
+          <p:nvPr>
+            <p:ph type="title"/>
+          </p:nvPr>
+        </p:nvSpPr>
+        <p:spPr/>
+        <p:txBody>
+          <a:bodyPr/>
+          <a:lstStyle/>
+          <a:p>
+            <a:endParaRPr lang="en-IL"/>
+          </a:p>
+        </p:txBody>
+      </p:sp>
+      <p:sp>
+        <p:nvSpPr>
+          <p:cNvPr id="7" name="Content Placeholder 6">
+            <a:extLst>
+              <a:ext uri="{FF2B5EF4-FFF2-40B4-BE49-F238E27FC236}">
+                <a16:creationId xmlns:a16="http://schemas.microsoft.com/office/drawing/2014/main" id="{7E8A62C2-2DBC-4DA6-9B61-994A498BC5F8}"/>
+              </a:ext>
+            </a:extLst>
+          </p:cNvPr>
+          <p:cNvSpPr>
+            <a:spLocks noGrp="1"/>
+          </p:cNvSpPr>
+          <p:nvPr>
+            <p:ph idx="1"/>
+          </p:nvPr>
+        </p:nvSpPr>
+        <p:spPr/>
+        <p:txBody>
+          <a:bodyPr/>
+          <a:lstStyle/>
+          <a:p>
+            <a:endParaRPr lang="en-IL"/>
+          </a:p>
+        </p:txBody>
+      </p:sp>
+      <p:sp>
+        <p:nvSpPr>
+          <p:cNvPr id="4" name="Footer Placeholder 3">
+            <a:extLst>
+              <a:ext uri="{FF2B5EF4-FFF2-40B4-BE49-F238E27FC236}">
+                <a16:creationId xmlns:a16="http://schemas.microsoft.com/office/drawing/2014/main" id="{B26D5EE8-22A7-4AEA-8667-EBE567F5E08F}"/>
+              </a:ext>
+            </a:extLst>
+          </p:cNvPr>
+          <p:cNvSpPr>
+            <a:spLocks noGrp="1"/>
+          </p:cNvSpPr>
+          <p:nvPr>
+            <p:ph type="ftr" sz="quarter" idx="11"/>
+          </p:nvPr>
+        </p:nvSpPr>
+        <p:spPr/>
+        <p:txBody>
+          <a:bodyPr/>
+          <a:lstStyle/>
+          <a:p>
+            <a:r>
+              <a:rPr lang="en-US"/>
+              <a:t>Materials by Adi Sarid https://adisarid.github.io and http://www.sarid-ins.com</a:t>
+            </a:r>
+            <a:endParaRPr lang="en-US" dirty="0"/>
+          </a:p>
+        </p:txBody>
+      </p:sp>
+      <p:sp>
+        <p:nvSpPr>
+          <p:cNvPr id="5" name="Slide Number Placeholder 4">
+            <a:extLst>
+              <a:ext uri="{FF2B5EF4-FFF2-40B4-BE49-F238E27FC236}">
+                <a16:creationId xmlns:a16="http://schemas.microsoft.com/office/drawing/2014/main" id="{7487FBE2-1B4F-4DD6-80B3-C680726CAB51}"/>
+              </a:ext>
+            </a:extLst>
+          </p:cNvPr>
+          <p:cNvSpPr>
+            <a:spLocks noGrp="1"/>
+          </p:cNvSpPr>
+          <p:nvPr>
+            <p:ph type="sldNum" sz="quarter" idx="12"/>
+          </p:nvPr>
+        </p:nvSpPr>
+        <p:spPr/>
+        <p:txBody>
+          <a:bodyPr/>
+          <a:lstStyle/>
+          <a:p>
+            <a:fld id="{4FAB73BC-B049-4115-A692-8D63A059BFB8}" type="slidenum">
+              <a:rPr lang="en-US" smtClean="0"/>
+              <a:pPr/>
+              <a:t>14</a:t>
+            </a:fld>
+            <a:endParaRPr lang="en-US" dirty="0"/>
+          </a:p>
+        </p:txBody>
+      </p:sp>
+    </p:spTree>
+    <p:extLst>
+      <p:ext uri="{BB962C8B-B14F-4D97-AF65-F5344CB8AC3E}">
+        <p14:creationId xmlns:p14="http://schemas.microsoft.com/office/powerpoint/2010/main" val="2201374704"/>
+      </p:ext>
+    </p:extLst>
+  </p:cSld>
+  <p:clrMapOvr>
+    <a:masterClrMapping/>
+  </p:clrMapOvr>
+</p:sld>
+</file>
+
+<file path=ppt/slides/slide15.xml><?xml version="1.0" encoding="utf-8"?>
+<p:sld xmlns:a="http://schemas.openxmlformats.org/drawingml/2006/main" xmlns:r="http://schemas.openxmlformats.org/officeDocument/2006/relationships" xmlns:p="http://schemas.openxmlformats.org/presentationml/2006/main">
+  <p:cSld>
+    <p:spTree>
+      <p:nvGrpSpPr>
+        <p:cNvPr id="1" name=""/>
+        <p:cNvGrpSpPr/>
+        <p:nvPr/>
+      </p:nvGrpSpPr>
+      <p:grpSpPr>
+        <a:xfrm>
+          <a:off x="0" y="0"/>
+          <a:ext cx="0" cy="0"/>
+          <a:chOff x="0" y="0"/>
+          <a:chExt cx="0" cy="0"/>
+        </a:xfrm>
+      </p:grpSpPr>
+      <p:sp>
+        <p:nvSpPr>
           <p:cNvPr id="6" name="Title 5">
             <a:extLst>
               <a:ext uri="{FF2B5EF4-FFF2-40B4-BE49-F238E27FC236}">
@@ -6803,7 +7122,7 @@
           <a:p>
             <a:fld id="{4FAB73BC-B049-4115-A692-8D63A059BFB8}" type="slidenum">
               <a:rPr lang="en-US" smtClean="0"/>
-              <a:t>13</a:t>
+              <a:t>15</a:t>
             </a:fld>
             <a:endParaRPr lang="en-US" dirty="0"/>
           </a:p>
@@ -6822,7 +7141,7 @@
 </p:sld>
 </file>
 
-<file path=ppt/slides/slide14.xml><?xml version="1.0" encoding="utf-8"?>
+<file path=ppt/slides/slide16.xml><?xml version="1.0" encoding="utf-8"?>
 <p:sld xmlns:a="http://schemas.openxmlformats.org/drawingml/2006/main" xmlns:r="http://schemas.openxmlformats.org/officeDocument/2006/relationships" xmlns:p="http://schemas.openxmlformats.org/presentationml/2006/main">
   <p:cSld>
     <p:spTree>
@@ -7140,7 +7459,7 @@
             <a:fld id="{4FAB73BC-B049-4115-A692-8D63A059BFB8}" type="slidenum">
               <a:rPr lang="en-US" smtClean="0"/>
               <a:pPr/>
-              <a:t>14</a:t>
+              <a:t>16</a:t>
             </a:fld>
             <a:endParaRPr lang="en-US" dirty="0"/>
           </a:p>
@@ -7159,7 +7478,7 @@
 </p:sld>
 </file>
 
-<file path=ppt/slides/slide15.xml><?xml version="1.0" encoding="utf-8"?>
+<file path=ppt/slides/slide17.xml><?xml version="1.0" encoding="utf-8"?>
 <p:sld xmlns:a="http://schemas.openxmlformats.org/drawingml/2006/main" xmlns:r="http://schemas.openxmlformats.org/officeDocument/2006/relationships" xmlns:p="http://schemas.openxmlformats.org/presentationml/2006/main">
   <p:cSld>
     <p:spTree>
@@ -7727,7 +8046,7 @@
           <a:p>
             <a:fld id="{4FAB73BC-B049-4115-A692-8D63A059BFB8}" type="slidenum">
               <a:rPr lang="en-US" smtClean="0"/>
-              <a:t>15</a:t>
+              <a:t>17</a:t>
             </a:fld>
             <a:endParaRPr lang="en-US" dirty="0"/>
           </a:p>
@@ -7923,7 +8242,7 @@
 </p:sld>
 </file>
 
-<file path=ppt/slides/slide16.xml><?xml version="1.0" encoding="utf-8"?>
+<file path=ppt/slides/slide18.xml><?xml version="1.0" encoding="utf-8"?>
 <p:sld xmlns:a="http://schemas.openxmlformats.org/drawingml/2006/main" xmlns:r="http://schemas.openxmlformats.org/officeDocument/2006/relationships" xmlns:p="http://schemas.openxmlformats.org/presentationml/2006/main">
   <p:cSld>
     <p:spTree>
@@ -8296,7 +8615,7 @@
           <a:p>
             <a:fld id="{4FAB73BC-B049-4115-A692-8D63A059BFB8}" type="slidenum">
               <a:rPr lang="en-US" smtClean="0"/>
-              <a:t>16</a:t>
+              <a:t>18</a:t>
             </a:fld>
             <a:endParaRPr lang="en-US" dirty="0"/>
           </a:p>
@@ -8332,290 +8651,41 @@
           </a:prstGeom>
         </p:spPr>
       </p:pic>
+      <p:pic>
+        <p:nvPicPr>
+          <p:cNvPr id="6" name="Picture 5">
+            <a:hlinkClick r:id="rId5"/>
+            <a:extLst>
+              <a:ext uri="{FF2B5EF4-FFF2-40B4-BE49-F238E27FC236}">
+                <a16:creationId xmlns:a16="http://schemas.microsoft.com/office/drawing/2014/main" id="{1AC22C7C-B1DE-4BA1-9B95-D65E34524D76}"/>
+              </a:ext>
+            </a:extLst>
+          </p:cNvPr>
+          <p:cNvPicPr>
+            <a:picLocks noChangeAspect="1"/>
+          </p:cNvPicPr>
+          <p:nvPr/>
+        </p:nvPicPr>
+        <p:blipFill>
+          <a:blip r:embed="rId6"/>
+          <a:stretch>
+            <a:fillRect/>
+          </a:stretch>
+        </p:blipFill>
+        <p:spPr>
+          <a:xfrm>
+            <a:off x="10036440" y="5469523"/>
+            <a:ext cx="1067424" cy="903845"/>
+          </a:xfrm>
+          <a:prstGeom prst="rect">
+            <a:avLst/>
+          </a:prstGeom>
+        </p:spPr>
+      </p:pic>
     </p:spTree>
     <p:extLst>
       <p:ext uri="{BB962C8B-B14F-4D97-AF65-F5344CB8AC3E}">
         <p14:creationId xmlns:p14="http://schemas.microsoft.com/office/powerpoint/2010/main" val="3348148821"/>
-      </p:ext>
-    </p:extLst>
-  </p:cSld>
-  <p:clrMapOvr>
-    <a:masterClrMapping/>
-  </p:clrMapOvr>
-</p:sld>
-</file>
-
-<file path=ppt/slides/slide17.xml><?xml version="1.0" encoding="utf-8"?>
-<p:sld xmlns:a="http://schemas.openxmlformats.org/drawingml/2006/main" xmlns:r="http://schemas.openxmlformats.org/officeDocument/2006/relationships" xmlns:p="http://schemas.openxmlformats.org/presentationml/2006/main">
-  <p:cSld>
-    <p:spTree>
-      <p:nvGrpSpPr>
-        <p:cNvPr id="1" name=""/>
-        <p:cNvGrpSpPr/>
-        <p:nvPr/>
-      </p:nvGrpSpPr>
-      <p:grpSpPr>
-        <a:xfrm>
-          <a:off x="0" y="0"/>
-          <a:ext cx="0" cy="0"/>
-          <a:chOff x="0" y="0"/>
-          <a:chExt cx="0" cy="0"/>
-        </a:xfrm>
-      </p:grpSpPr>
-      <p:sp>
-        <p:nvSpPr>
-          <p:cNvPr id="2" name="Title 1">
-            <a:extLst>
-              <a:ext uri="{FF2B5EF4-FFF2-40B4-BE49-F238E27FC236}">
-                <a16:creationId xmlns:a16="http://schemas.microsoft.com/office/drawing/2014/main" id="{C8D94AA1-340A-4BB5-BAAA-449CBA7FCA8D}"/>
-              </a:ext>
-            </a:extLst>
-          </p:cNvPr>
-          <p:cNvSpPr>
-            <a:spLocks noGrp="1"/>
-          </p:cNvSpPr>
-          <p:nvPr>
-            <p:ph type="title"/>
-          </p:nvPr>
-        </p:nvSpPr>
-        <p:spPr/>
-        <p:txBody>
-          <a:bodyPr/>
-          <a:lstStyle/>
-          <a:p>
-            <a:r>
-              <a:rPr lang="en-US" dirty="0"/>
-              <a:t>Bagging (Bootstrap Aggregation)</a:t>
-            </a:r>
-            <a:endParaRPr lang="en-IL" dirty="0"/>
-          </a:p>
-        </p:txBody>
-      </p:sp>
-      <p:sp>
-        <p:nvSpPr>
-          <p:cNvPr id="3" name="Content Placeholder 2">
-            <a:extLst>
-              <a:ext uri="{FF2B5EF4-FFF2-40B4-BE49-F238E27FC236}">
-                <a16:creationId xmlns:a16="http://schemas.microsoft.com/office/drawing/2014/main" id="{E964157B-FE0F-4D65-A77C-132BE3253AB7}"/>
-              </a:ext>
-            </a:extLst>
-          </p:cNvPr>
-          <p:cNvSpPr>
-            <a:spLocks noGrp="1"/>
-          </p:cNvSpPr>
-          <p:nvPr>
-            <p:ph idx="1"/>
-          </p:nvPr>
-        </p:nvSpPr>
-        <p:spPr/>
-        <p:txBody>
-          <a:bodyPr/>
-          <a:lstStyle/>
-          <a:p>
-            <a:endParaRPr lang="en-IL"/>
-          </a:p>
-        </p:txBody>
-      </p:sp>
-      <p:sp>
-        <p:nvSpPr>
-          <p:cNvPr id="4" name="Footer Placeholder 3">
-            <a:extLst>
-              <a:ext uri="{FF2B5EF4-FFF2-40B4-BE49-F238E27FC236}">
-                <a16:creationId xmlns:a16="http://schemas.microsoft.com/office/drawing/2014/main" id="{33C14BF4-9999-4602-AE2F-F03FA9A46596}"/>
-              </a:ext>
-            </a:extLst>
-          </p:cNvPr>
-          <p:cNvSpPr>
-            <a:spLocks noGrp="1"/>
-          </p:cNvSpPr>
-          <p:nvPr>
-            <p:ph type="ftr" sz="quarter" idx="11"/>
-          </p:nvPr>
-        </p:nvSpPr>
-        <p:spPr/>
-        <p:txBody>
-          <a:bodyPr/>
-          <a:lstStyle/>
-          <a:p>
-            <a:r>
-              <a:rPr lang="en-US"/>
-              <a:t>Materials by Adi Sarid https://adisarid.github.io and http://www.sarid-ins.com</a:t>
-            </a:r>
-            <a:endParaRPr lang="en-US" dirty="0"/>
-          </a:p>
-        </p:txBody>
-      </p:sp>
-      <p:sp>
-        <p:nvSpPr>
-          <p:cNvPr id="5" name="Slide Number Placeholder 4">
-            <a:extLst>
-              <a:ext uri="{FF2B5EF4-FFF2-40B4-BE49-F238E27FC236}">
-                <a16:creationId xmlns:a16="http://schemas.microsoft.com/office/drawing/2014/main" id="{BEDC9B48-2A21-4DBB-9AD9-835D08278419}"/>
-              </a:ext>
-            </a:extLst>
-          </p:cNvPr>
-          <p:cNvSpPr>
-            <a:spLocks noGrp="1"/>
-          </p:cNvSpPr>
-          <p:nvPr>
-            <p:ph type="sldNum" sz="quarter" idx="12"/>
-          </p:nvPr>
-        </p:nvSpPr>
-        <p:spPr/>
-        <p:txBody>
-          <a:bodyPr/>
-          <a:lstStyle/>
-          <a:p>
-            <a:fld id="{4FAB73BC-B049-4115-A692-8D63A059BFB8}" type="slidenum">
-              <a:rPr lang="en-US" smtClean="0"/>
-              <a:t>17</a:t>
-            </a:fld>
-            <a:endParaRPr lang="en-US" dirty="0"/>
-          </a:p>
-        </p:txBody>
-      </p:sp>
-    </p:spTree>
-    <p:extLst>
-      <p:ext uri="{BB962C8B-B14F-4D97-AF65-F5344CB8AC3E}">
-        <p14:creationId xmlns:p14="http://schemas.microsoft.com/office/powerpoint/2010/main" val="1952416764"/>
-      </p:ext>
-    </p:extLst>
-  </p:cSld>
-  <p:clrMapOvr>
-    <a:masterClrMapping/>
-  </p:clrMapOvr>
-</p:sld>
-</file>
-
-<file path=ppt/slides/slide18.xml><?xml version="1.0" encoding="utf-8"?>
-<p:sld xmlns:a="http://schemas.openxmlformats.org/drawingml/2006/main" xmlns:r="http://schemas.openxmlformats.org/officeDocument/2006/relationships" xmlns:p="http://schemas.openxmlformats.org/presentationml/2006/main">
-  <p:cSld>
-    <p:spTree>
-      <p:nvGrpSpPr>
-        <p:cNvPr id="1" name=""/>
-        <p:cNvGrpSpPr/>
-        <p:nvPr/>
-      </p:nvGrpSpPr>
-      <p:grpSpPr>
-        <a:xfrm>
-          <a:off x="0" y="0"/>
-          <a:ext cx="0" cy="0"/>
-          <a:chOff x="0" y="0"/>
-          <a:chExt cx="0" cy="0"/>
-        </a:xfrm>
-      </p:grpSpPr>
-      <p:sp>
-        <p:nvSpPr>
-          <p:cNvPr id="2" name="Title 1">
-            <a:extLst>
-              <a:ext uri="{FF2B5EF4-FFF2-40B4-BE49-F238E27FC236}">
-                <a16:creationId xmlns:a16="http://schemas.microsoft.com/office/drawing/2014/main" id="{DEA79A93-975D-489E-AED9-E70D2C394E45}"/>
-              </a:ext>
-            </a:extLst>
-          </p:cNvPr>
-          <p:cNvSpPr>
-            <a:spLocks noGrp="1"/>
-          </p:cNvSpPr>
-          <p:nvPr>
-            <p:ph type="title"/>
-          </p:nvPr>
-        </p:nvSpPr>
-        <p:spPr/>
-        <p:txBody>
-          <a:bodyPr/>
-          <a:lstStyle/>
-          <a:p>
-            <a:endParaRPr lang="en-IL" dirty="0"/>
-          </a:p>
-        </p:txBody>
-      </p:sp>
-      <p:sp>
-        <p:nvSpPr>
-          <p:cNvPr id="3" name="Content Placeholder 2">
-            <a:extLst>
-              <a:ext uri="{FF2B5EF4-FFF2-40B4-BE49-F238E27FC236}">
-                <a16:creationId xmlns:a16="http://schemas.microsoft.com/office/drawing/2014/main" id="{5BA6EB24-11BD-4CA5-B6A1-EB1ECC5A3FDC}"/>
-              </a:ext>
-            </a:extLst>
-          </p:cNvPr>
-          <p:cNvSpPr>
-            <a:spLocks noGrp="1"/>
-          </p:cNvSpPr>
-          <p:nvPr>
-            <p:ph idx="1"/>
-          </p:nvPr>
-        </p:nvSpPr>
-        <p:spPr/>
-        <p:txBody>
-          <a:bodyPr/>
-          <a:lstStyle/>
-          <a:p>
-            <a:endParaRPr lang="en-IL"/>
-          </a:p>
-        </p:txBody>
-      </p:sp>
-      <p:sp>
-        <p:nvSpPr>
-          <p:cNvPr id="4" name="Footer Placeholder 3">
-            <a:extLst>
-              <a:ext uri="{FF2B5EF4-FFF2-40B4-BE49-F238E27FC236}">
-                <a16:creationId xmlns:a16="http://schemas.microsoft.com/office/drawing/2014/main" id="{DE04C2F2-5BE6-4022-8E43-73267C793844}"/>
-              </a:ext>
-            </a:extLst>
-          </p:cNvPr>
-          <p:cNvSpPr>
-            <a:spLocks noGrp="1"/>
-          </p:cNvSpPr>
-          <p:nvPr>
-            <p:ph type="ftr" sz="quarter" idx="11"/>
-          </p:nvPr>
-        </p:nvSpPr>
-        <p:spPr/>
-        <p:txBody>
-          <a:bodyPr/>
-          <a:lstStyle/>
-          <a:p>
-            <a:r>
-              <a:rPr lang="en-US"/>
-              <a:t>Materials by Adi Sarid https://adisarid.github.io and http://www.sarid-ins.com</a:t>
-            </a:r>
-            <a:endParaRPr lang="en-US" dirty="0"/>
-          </a:p>
-        </p:txBody>
-      </p:sp>
-      <p:sp>
-        <p:nvSpPr>
-          <p:cNvPr id="5" name="Slide Number Placeholder 4">
-            <a:extLst>
-              <a:ext uri="{FF2B5EF4-FFF2-40B4-BE49-F238E27FC236}">
-                <a16:creationId xmlns:a16="http://schemas.microsoft.com/office/drawing/2014/main" id="{C4A173A8-0616-495E-A338-B45631D742DA}"/>
-              </a:ext>
-            </a:extLst>
-          </p:cNvPr>
-          <p:cNvSpPr>
-            <a:spLocks noGrp="1"/>
-          </p:cNvSpPr>
-          <p:nvPr>
-            <p:ph type="sldNum" sz="quarter" idx="12"/>
-          </p:nvPr>
-        </p:nvSpPr>
-        <p:spPr/>
-        <p:txBody>
-          <a:bodyPr/>
-          <a:lstStyle/>
-          <a:p>
-            <a:fld id="{4FAB73BC-B049-4115-A692-8D63A059BFB8}" type="slidenum">
-              <a:rPr lang="en-US" smtClean="0"/>
-              <a:t>18</a:t>
-            </a:fld>
-            <a:endParaRPr lang="en-US" dirty="0"/>
-          </a:p>
-        </p:txBody>
-      </p:sp>
-    </p:spTree>
-    <p:extLst>
-      <p:ext uri="{BB962C8B-B14F-4D97-AF65-F5344CB8AC3E}">
-        <p14:creationId xmlns:p14="http://schemas.microsoft.com/office/powerpoint/2010/main" val="3062051705"/>
       </p:ext>
     </p:extLst>
   </p:cSld>
@@ -8647,7 +8717,7 @@
           <p:cNvPr id="2" name="Title 1">
             <a:extLst>
               <a:ext uri="{FF2B5EF4-FFF2-40B4-BE49-F238E27FC236}">
-                <a16:creationId xmlns:a16="http://schemas.microsoft.com/office/drawing/2014/main" id="{C45BA524-44F5-43AD-B56C-AECAEBF6D824}"/>
+                <a16:creationId xmlns:a16="http://schemas.microsoft.com/office/drawing/2014/main" id="{C8D94AA1-340A-4BB5-BAAA-449CBA7FCA8D}"/>
               </a:ext>
             </a:extLst>
           </p:cNvPr>
@@ -8665,7 +8735,7 @@
           <a:p>
             <a:r>
               <a:rPr lang="en-US" dirty="0"/>
-              <a:t>How is Bagging Related to Bootstrap?</a:t>
+              <a:t>Bagging (Bootstrap Aggregation)</a:t>
             </a:r>
             <a:endParaRPr lang="en-IL" dirty="0"/>
           </a:p>
@@ -8676,7 +8746,7 @@
           <p:cNvPr id="3" name="Content Placeholder 2">
             <a:extLst>
               <a:ext uri="{FF2B5EF4-FFF2-40B4-BE49-F238E27FC236}">
-                <a16:creationId xmlns:a16="http://schemas.microsoft.com/office/drawing/2014/main" id="{245ABCF7-6AA1-4B82-A039-868FA8C73A68}"/>
+                <a16:creationId xmlns:a16="http://schemas.microsoft.com/office/drawing/2014/main" id="{E964157B-FE0F-4D65-A77C-132BE3253AB7}"/>
               </a:ext>
             </a:extLst>
           </p:cNvPr>
@@ -8692,6 +8762,23 @@
           <a:bodyPr/>
           <a:lstStyle/>
           <a:p>
+            <a:pPr>
+              <a:lnSpc>
+                <a:spcPct val="150000"/>
+              </a:lnSpc>
+            </a:pPr>
+            <a:r>
+              <a:rPr lang="en-US" dirty="0"/>
+              <a:t>General purpose procedure for </a:t>
+            </a:r>
+            <a:r>
+              <a:rPr lang="en-US" b="1" dirty="0"/>
+              <a:t>reducing the variance </a:t>
+            </a:r>
+            <a:r>
+              <a:rPr lang="en-US" dirty="0"/>
+              <a:t>of a statistical learning model</a:t>
+            </a:r>
             <a:endParaRPr lang="en-IL" dirty="0"/>
           </a:p>
         </p:txBody>
@@ -8701,7 +8788,7 @@
           <p:cNvPr id="4" name="Footer Placeholder 3">
             <a:extLst>
               <a:ext uri="{FF2B5EF4-FFF2-40B4-BE49-F238E27FC236}">
-                <a16:creationId xmlns:a16="http://schemas.microsoft.com/office/drawing/2014/main" id="{59BC251F-11EB-4627-8494-805C22661042}"/>
+                <a16:creationId xmlns:a16="http://schemas.microsoft.com/office/drawing/2014/main" id="{33C14BF4-9999-4602-AE2F-F03FA9A46596}"/>
               </a:ext>
             </a:extLst>
           </p:cNvPr>
@@ -8730,7 +8817,7 @@
           <p:cNvPr id="5" name="Slide Number Placeholder 4">
             <a:extLst>
               <a:ext uri="{FF2B5EF4-FFF2-40B4-BE49-F238E27FC236}">
-                <a16:creationId xmlns:a16="http://schemas.microsoft.com/office/drawing/2014/main" id="{021902A6-EB2E-499B-816B-6A5163807960}"/>
+                <a16:creationId xmlns:a16="http://schemas.microsoft.com/office/drawing/2014/main" id="{BEDC9B48-2A21-4DBB-9AD9-835D08278419}"/>
               </a:ext>
             </a:extLst>
           </p:cNvPr>
@@ -8757,7 +8844,7 @@
     </p:spTree>
     <p:extLst>
       <p:ext uri="{BB962C8B-B14F-4D97-AF65-F5344CB8AC3E}">
-        <p14:creationId xmlns:p14="http://schemas.microsoft.com/office/powerpoint/2010/main" val="1725775073"/>
+        <p14:creationId xmlns:p14="http://schemas.microsoft.com/office/powerpoint/2010/main" val="1952416764"/>
       </p:ext>
     </p:extLst>
   </p:cSld>
@@ -8925,7 +9012,7 @@
           <a:p>
             <a:r>
               <a:rPr lang="en-US" dirty="0"/>
-              <a:t>Bagging Example</a:t>
+              <a:t>How is Bagging Related to Bootstrap?</a:t>
             </a:r>
             <a:endParaRPr lang="en-IL" dirty="0"/>
           </a:p>
@@ -9017,7 +9104,7 @@
     </p:spTree>
     <p:extLst>
       <p:ext uri="{BB962C8B-B14F-4D97-AF65-F5344CB8AC3E}">
-        <p14:creationId xmlns:p14="http://schemas.microsoft.com/office/powerpoint/2010/main" val="1895960918"/>
+        <p14:creationId xmlns:p14="http://schemas.microsoft.com/office/powerpoint/2010/main" val="1725775073"/>
       </p:ext>
     </p:extLst>
   </p:cSld>
@@ -9046,10 +9133,10 @@
       </p:grpSpPr>
       <p:sp>
         <p:nvSpPr>
-          <p:cNvPr id="8" name="Title 7">
+          <p:cNvPr id="2" name="Title 1">
             <a:extLst>
               <a:ext uri="{FF2B5EF4-FFF2-40B4-BE49-F238E27FC236}">
-                <a16:creationId xmlns:a16="http://schemas.microsoft.com/office/drawing/2014/main" id="{199DDFEB-C810-471D-9571-7EF7DB4FEFD3}"/>
+                <a16:creationId xmlns:a16="http://schemas.microsoft.com/office/drawing/2014/main" id="{C45BA524-44F5-43AD-B56C-AECAEBF6D824}"/>
               </a:ext>
             </a:extLst>
           </p:cNvPr>
@@ -9067,7 +9154,7 @@
           <a:p>
             <a:r>
               <a:rPr lang="en-US" dirty="0"/>
-              <a:t>Random Forest Algorithm</a:t>
+              <a:t>Bagging Example</a:t>
             </a:r>
             <a:endParaRPr lang="en-IL" dirty="0"/>
           </a:p>
@@ -9075,10 +9162,10 @@
       </p:sp>
       <p:sp>
         <p:nvSpPr>
-          <p:cNvPr id="9" name="Content Placeholder 8">
+          <p:cNvPr id="3" name="Content Placeholder 2">
             <a:extLst>
               <a:ext uri="{FF2B5EF4-FFF2-40B4-BE49-F238E27FC236}">
-                <a16:creationId xmlns:a16="http://schemas.microsoft.com/office/drawing/2014/main" id="{9F36936E-36E1-41DD-9B1A-702A88BBAA36}"/>
+                <a16:creationId xmlns:a16="http://schemas.microsoft.com/office/drawing/2014/main" id="{245ABCF7-6AA1-4B82-A039-868FA8C73A68}"/>
               </a:ext>
             </a:extLst>
           </p:cNvPr>
@@ -9094,7 +9181,7 @@
           <a:bodyPr/>
           <a:lstStyle/>
           <a:p>
-            <a:endParaRPr lang="en-IL"/>
+            <a:endParaRPr lang="en-IL" dirty="0"/>
           </a:p>
         </p:txBody>
       </p:sp>
@@ -9103,7 +9190,7 @@
           <p:cNvPr id="4" name="Footer Placeholder 3">
             <a:extLst>
               <a:ext uri="{FF2B5EF4-FFF2-40B4-BE49-F238E27FC236}">
-                <a16:creationId xmlns:a16="http://schemas.microsoft.com/office/drawing/2014/main" id="{B8E63889-BBE1-4DFC-B04D-7833103CB6A3}"/>
+                <a16:creationId xmlns:a16="http://schemas.microsoft.com/office/drawing/2014/main" id="{59BC251F-11EB-4627-8494-805C22661042}"/>
               </a:ext>
             </a:extLst>
           </p:cNvPr>
@@ -9132,7 +9219,7 @@
           <p:cNvPr id="5" name="Slide Number Placeholder 4">
             <a:extLst>
               <a:ext uri="{FF2B5EF4-FFF2-40B4-BE49-F238E27FC236}">
-                <a16:creationId xmlns:a16="http://schemas.microsoft.com/office/drawing/2014/main" id="{5273D10F-AB1B-47B0-80B3-96F2BF64E70A}"/>
+                <a16:creationId xmlns:a16="http://schemas.microsoft.com/office/drawing/2014/main" id="{021902A6-EB2E-499B-816B-6A5163807960}"/>
               </a:ext>
             </a:extLst>
           </p:cNvPr>
@@ -9150,7 +9237,6 @@
           <a:p>
             <a:fld id="{4FAB73BC-B049-4115-A692-8D63A059BFB8}" type="slidenum">
               <a:rPr lang="en-US" smtClean="0"/>
-              <a:pPr/>
               <a:t>21</a:t>
             </a:fld>
             <a:endParaRPr lang="en-US" dirty="0"/>
@@ -9160,7 +9246,7 @@
     </p:spTree>
     <p:extLst>
       <p:ext uri="{BB962C8B-B14F-4D97-AF65-F5344CB8AC3E}">
-        <p14:creationId xmlns:p14="http://schemas.microsoft.com/office/powerpoint/2010/main" val="2493903139"/>
+        <p14:creationId xmlns:p14="http://schemas.microsoft.com/office/powerpoint/2010/main" val="1895960918"/>
       </p:ext>
     </p:extLst>
   </p:cSld>
@@ -9189,10 +9275,10 @@
       </p:grpSpPr>
       <p:sp>
         <p:nvSpPr>
-          <p:cNvPr id="8" name="Title 7">
+          <p:cNvPr id="6" name="Title 5">
             <a:extLst>
               <a:ext uri="{FF2B5EF4-FFF2-40B4-BE49-F238E27FC236}">
-                <a16:creationId xmlns:a16="http://schemas.microsoft.com/office/drawing/2014/main" id="{199DDFEB-C810-471D-9571-7EF7DB4FEFD3}"/>
+                <a16:creationId xmlns:a16="http://schemas.microsoft.com/office/drawing/2014/main" id="{C1F7B72E-4181-4474-95E4-BB2F1AAE56AB}"/>
               </a:ext>
             </a:extLst>
           </p:cNvPr>
@@ -9210,7 +9296,7 @@
           <a:p>
             <a:r>
               <a:rPr lang="en-US" dirty="0"/>
-              <a:t>Random Forest Example</a:t>
+              <a:t>Boosting</a:t>
             </a:r>
             <a:endParaRPr lang="en-IL" dirty="0"/>
           </a:p>
@@ -9218,10 +9304,10 @@
       </p:sp>
       <p:sp>
         <p:nvSpPr>
-          <p:cNvPr id="9" name="Content Placeholder 8">
+          <p:cNvPr id="7" name="Text Placeholder 6">
             <a:extLst>
               <a:ext uri="{FF2B5EF4-FFF2-40B4-BE49-F238E27FC236}">
-                <a16:creationId xmlns:a16="http://schemas.microsoft.com/office/drawing/2014/main" id="{9F36936E-36E1-41DD-9B1A-702A88BBAA36}"/>
+                <a16:creationId xmlns:a16="http://schemas.microsoft.com/office/drawing/2014/main" id="{238784AB-D712-48D1-9C66-80E2CB0000D6}"/>
               </a:ext>
             </a:extLst>
           </p:cNvPr>
@@ -9229,7 +9315,7 @@
             <a:spLocks noGrp="1"/>
           </p:cNvSpPr>
           <p:nvPr>
-            <p:ph idx="1"/>
+            <p:ph type="body" idx="1"/>
           </p:nvPr>
         </p:nvSpPr>
         <p:spPr/>
@@ -9246,7 +9332,7 @@
           <p:cNvPr id="4" name="Footer Placeholder 3">
             <a:extLst>
               <a:ext uri="{FF2B5EF4-FFF2-40B4-BE49-F238E27FC236}">
-                <a16:creationId xmlns:a16="http://schemas.microsoft.com/office/drawing/2014/main" id="{B8E63889-BBE1-4DFC-B04D-7833103CB6A3}"/>
+                <a16:creationId xmlns:a16="http://schemas.microsoft.com/office/drawing/2014/main" id="{5D6B13F2-2CB6-4E7C-B2BC-A0320D20AF69}"/>
               </a:ext>
             </a:extLst>
           </p:cNvPr>
@@ -9275,7 +9361,7 @@
           <p:cNvPr id="5" name="Slide Number Placeholder 4">
             <a:extLst>
               <a:ext uri="{FF2B5EF4-FFF2-40B4-BE49-F238E27FC236}">
-                <a16:creationId xmlns:a16="http://schemas.microsoft.com/office/drawing/2014/main" id="{5273D10F-AB1B-47B0-80B3-96F2BF64E70A}"/>
+                <a16:creationId xmlns:a16="http://schemas.microsoft.com/office/drawing/2014/main" id="{359322BB-D65C-4202-B889-3F05EDA02657}"/>
               </a:ext>
             </a:extLst>
           </p:cNvPr>
@@ -9293,7 +9379,6 @@
           <a:p>
             <a:fld id="{4FAB73BC-B049-4115-A692-8D63A059BFB8}" type="slidenum">
               <a:rPr lang="en-US" smtClean="0"/>
-              <a:pPr/>
               <a:t>22</a:t>
             </a:fld>
             <a:endParaRPr lang="en-US" dirty="0"/>
@@ -9303,7 +9388,7 @@
     </p:spTree>
     <p:extLst>
       <p:ext uri="{BB962C8B-B14F-4D97-AF65-F5344CB8AC3E}">
-        <p14:creationId xmlns:p14="http://schemas.microsoft.com/office/powerpoint/2010/main" val="3844348861"/>
+        <p14:creationId xmlns:p14="http://schemas.microsoft.com/office/powerpoint/2010/main" val="2864703264"/>
       </p:ext>
     </p:extLst>
   </p:cSld>
@@ -9332,10 +9417,10 @@
       </p:grpSpPr>
       <p:sp>
         <p:nvSpPr>
-          <p:cNvPr id="6" name="Title 5">
+          <p:cNvPr id="8" name="Title 7">
             <a:extLst>
               <a:ext uri="{FF2B5EF4-FFF2-40B4-BE49-F238E27FC236}">
-                <a16:creationId xmlns:a16="http://schemas.microsoft.com/office/drawing/2014/main" id="{C1F7B72E-4181-4474-95E4-BB2F1AAE56AB}"/>
+                <a16:creationId xmlns:a16="http://schemas.microsoft.com/office/drawing/2014/main" id="{199DDFEB-C810-471D-9571-7EF7DB4FEFD3}"/>
               </a:ext>
             </a:extLst>
           </p:cNvPr>
@@ -9353,7 +9438,7 @@
           <a:p>
             <a:r>
               <a:rPr lang="en-US" dirty="0"/>
-              <a:t>Boosting</a:t>
+              <a:t>Boosting Algorithm</a:t>
             </a:r>
             <a:endParaRPr lang="en-IL" dirty="0"/>
           </a:p>
@@ -9361,10 +9446,10 @@
       </p:sp>
       <p:sp>
         <p:nvSpPr>
-          <p:cNvPr id="7" name="Text Placeholder 6">
+          <p:cNvPr id="9" name="Content Placeholder 8">
             <a:extLst>
               <a:ext uri="{FF2B5EF4-FFF2-40B4-BE49-F238E27FC236}">
-                <a16:creationId xmlns:a16="http://schemas.microsoft.com/office/drawing/2014/main" id="{238784AB-D712-48D1-9C66-80E2CB0000D6}"/>
+                <a16:creationId xmlns:a16="http://schemas.microsoft.com/office/drawing/2014/main" id="{9F36936E-36E1-41DD-9B1A-702A88BBAA36}"/>
               </a:ext>
             </a:extLst>
           </p:cNvPr>
@@ -9372,7 +9457,7 @@
             <a:spLocks noGrp="1"/>
           </p:cNvSpPr>
           <p:nvPr>
-            <p:ph type="body" idx="1"/>
+            <p:ph idx="1"/>
           </p:nvPr>
         </p:nvSpPr>
         <p:spPr/>
@@ -9389,7 +9474,7 @@
           <p:cNvPr id="4" name="Footer Placeholder 3">
             <a:extLst>
               <a:ext uri="{FF2B5EF4-FFF2-40B4-BE49-F238E27FC236}">
-                <a16:creationId xmlns:a16="http://schemas.microsoft.com/office/drawing/2014/main" id="{5D6B13F2-2CB6-4E7C-B2BC-A0320D20AF69}"/>
+                <a16:creationId xmlns:a16="http://schemas.microsoft.com/office/drawing/2014/main" id="{B8E63889-BBE1-4DFC-B04D-7833103CB6A3}"/>
               </a:ext>
             </a:extLst>
           </p:cNvPr>
@@ -9418,7 +9503,7 @@
           <p:cNvPr id="5" name="Slide Number Placeholder 4">
             <a:extLst>
               <a:ext uri="{FF2B5EF4-FFF2-40B4-BE49-F238E27FC236}">
-                <a16:creationId xmlns:a16="http://schemas.microsoft.com/office/drawing/2014/main" id="{359322BB-D65C-4202-B889-3F05EDA02657}"/>
+                <a16:creationId xmlns:a16="http://schemas.microsoft.com/office/drawing/2014/main" id="{5273D10F-AB1B-47B0-80B3-96F2BF64E70A}"/>
               </a:ext>
             </a:extLst>
           </p:cNvPr>
@@ -9436,6 +9521,7 @@
           <a:p>
             <a:fld id="{4FAB73BC-B049-4115-A692-8D63A059BFB8}" type="slidenum">
               <a:rPr lang="en-US" smtClean="0"/>
+              <a:pPr/>
               <a:t>23</a:t>
             </a:fld>
             <a:endParaRPr lang="en-US" dirty="0"/>
@@ -9445,7 +9531,7 @@
     </p:spTree>
     <p:extLst>
       <p:ext uri="{BB962C8B-B14F-4D97-AF65-F5344CB8AC3E}">
-        <p14:creationId xmlns:p14="http://schemas.microsoft.com/office/powerpoint/2010/main" val="2864703264"/>
+        <p14:creationId xmlns:p14="http://schemas.microsoft.com/office/powerpoint/2010/main" val="2136612770"/>
       </p:ext>
     </p:extLst>
   </p:cSld>
@@ -9495,7 +9581,7 @@
           <a:p>
             <a:r>
               <a:rPr lang="en-US" dirty="0"/>
-              <a:t>Boosting Algorithm</a:t>
+              <a:t>Boosting Example</a:t>
             </a:r>
             <a:endParaRPr lang="en-IL" dirty="0"/>
           </a:p>
@@ -9588,7 +9674,7 @@
     </p:spTree>
     <p:extLst>
       <p:ext uri="{BB962C8B-B14F-4D97-AF65-F5344CB8AC3E}">
-        <p14:creationId xmlns:p14="http://schemas.microsoft.com/office/powerpoint/2010/main" val="2136612770"/>
+        <p14:creationId xmlns:p14="http://schemas.microsoft.com/office/powerpoint/2010/main" val="4020124695"/>
       </p:ext>
     </p:extLst>
   </p:cSld>
@@ -9617,149 +9703,6 @@
       </p:grpSpPr>
       <p:sp>
         <p:nvSpPr>
-          <p:cNvPr id="8" name="Title 7">
-            <a:extLst>
-              <a:ext uri="{FF2B5EF4-FFF2-40B4-BE49-F238E27FC236}">
-                <a16:creationId xmlns:a16="http://schemas.microsoft.com/office/drawing/2014/main" id="{199DDFEB-C810-471D-9571-7EF7DB4FEFD3}"/>
-              </a:ext>
-            </a:extLst>
-          </p:cNvPr>
-          <p:cNvSpPr>
-            <a:spLocks noGrp="1"/>
-          </p:cNvSpPr>
-          <p:nvPr>
-            <p:ph type="title"/>
-          </p:nvPr>
-        </p:nvSpPr>
-        <p:spPr/>
-        <p:txBody>
-          <a:bodyPr/>
-          <a:lstStyle/>
-          <a:p>
-            <a:r>
-              <a:rPr lang="en-US" dirty="0"/>
-              <a:t>Boosting Example</a:t>
-            </a:r>
-            <a:endParaRPr lang="en-IL" dirty="0"/>
-          </a:p>
-        </p:txBody>
-      </p:sp>
-      <p:sp>
-        <p:nvSpPr>
-          <p:cNvPr id="9" name="Content Placeholder 8">
-            <a:extLst>
-              <a:ext uri="{FF2B5EF4-FFF2-40B4-BE49-F238E27FC236}">
-                <a16:creationId xmlns:a16="http://schemas.microsoft.com/office/drawing/2014/main" id="{9F36936E-36E1-41DD-9B1A-702A88BBAA36}"/>
-              </a:ext>
-            </a:extLst>
-          </p:cNvPr>
-          <p:cNvSpPr>
-            <a:spLocks noGrp="1"/>
-          </p:cNvSpPr>
-          <p:nvPr>
-            <p:ph idx="1"/>
-          </p:nvPr>
-        </p:nvSpPr>
-        <p:spPr/>
-        <p:txBody>
-          <a:bodyPr/>
-          <a:lstStyle/>
-          <a:p>
-            <a:endParaRPr lang="en-IL"/>
-          </a:p>
-        </p:txBody>
-      </p:sp>
-      <p:sp>
-        <p:nvSpPr>
-          <p:cNvPr id="4" name="Footer Placeholder 3">
-            <a:extLst>
-              <a:ext uri="{FF2B5EF4-FFF2-40B4-BE49-F238E27FC236}">
-                <a16:creationId xmlns:a16="http://schemas.microsoft.com/office/drawing/2014/main" id="{B8E63889-BBE1-4DFC-B04D-7833103CB6A3}"/>
-              </a:ext>
-            </a:extLst>
-          </p:cNvPr>
-          <p:cNvSpPr>
-            <a:spLocks noGrp="1"/>
-          </p:cNvSpPr>
-          <p:nvPr>
-            <p:ph type="ftr" sz="quarter" idx="11"/>
-          </p:nvPr>
-        </p:nvSpPr>
-        <p:spPr/>
-        <p:txBody>
-          <a:bodyPr/>
-          <a:lstStyle/>
-          <a:p>
-            <a:r>
-              <a:rPr lang="en-US"/>
-              <a:t>Materials by Adi Sarid https://adisarid.github.io and http://www.sarid-ins.com</a:t>
-            </a:r>
-            <a:endParaRPr lang="en-US" dirty="0"/>
-          </a:p>
-        </p:txBody>
-      </p:sp>
-      <p:sp>
-        <p:nvSpPr>
-          <p:cNvPr id="5" name="Slide Number Placeholder 4">
-            <a:extLst>
-              <a:ext uri="{FF2B5EF4-FFF2-40B4-BE49-F238E27FC236}">
-                <a16:creationId xmlns:a16="http://schemas.microsoft.com/office/drawing/2014/main" id="{5273D10F-AB1B-47B0-80B3-96F2BF64E70A}"/>
-              </a:ext>
-            </a:extLst>
-          </p:cNvPr>
-          <p:cNvSpPr>
-            <a:spLocks noGrp="1"/>
-          </p:cNvSpPr>
-          <p:nvPr>
-            <p:ph type="sldNum" sz="quarter" idx="12"/>
-          </p:nvPr>
-        </p:nvSpPr>
-        <p:spPr/>
-        <p:txBody>
-          <a:bodyPr/>
-          <a:lstStyle/>
-          <a:p>
-            <a:fld id="{4FAB73BC-B049-4115-A692-8D63A059BFB8}" type="slidenum">
-              <a:rPr lang="en-US" smtClean="0"/>
-              <a:pPr/>
-              <a:t>25</a:t>
-            </a:fld>
-            <a:endParaRPr lang="en-US" dirty="0"/>
-          </a:p>
-        </p:txBody>
-      </p:sp>
-    </p:spTree>
-    <p:extLst>
-      <p:ext uri="{BB962C8B-B14F-4D97-AF65-F5344CB8AC3E}">
-        <p14:creationId xmlns:p14="http://schemas.microsoft.com/office/powerpoint/2010/main" val="4020124695"/>
-      </p:ext>
-    </p:extLst>
-  </p:cSld>
-  <p:clrMapOvr>
-    <a:masterClrMapping/>
-  </p:clrMapOvr>
-</p:sld>
-</file>
-
-<file path=ppt/slides/slide26.xml><?xml version="1.0" encoding="utf-8"?>
-<p:sld xmlns:a="http://schemas.openxmlformats.org/drawingml/2006/main" xmlns:r="http://schemas.openxmlformats.org/officeDocument/2006/relationships" xmlns:p="http://schemas.openxmlformats.org/presentationml/2006/main">
-  <p:cSld>
-    <p:spTree>
-      <p:nvGrpSpPr>
-        <p:cNvPr id="1" name=""/>
-        <p:cNvGrpSpPr/>
-        <p:nvPr/>
-      </p:nvGrpSpPr>
-      <p:grpSpPr>
-        <a:xfrm>
-          <a:off x="0" y="0"/>
-          <a:ext cx="0" cy="0"/>
-          <a:chOff x="0" y="0"/>
-          <a:chExt cx="0" cy="0"/>
-        </a:xfrm>
-      </p:grpSpPr>
-      <p:sp>
-        <p:nvSpPr>
           <p:cNvPr id="2" name="Title 1"/>
           <p:cNvSpPr>
             <a:spLocks noGrp="1"/>
@@ -9827,7 +9770,7 @@
           <a:p>
             <a:fld id="{4FAB73BC-B049-4115-A692-8D63A059BFB8}" type="slidenum">
               <a:rPr lang="en-US" smtClean="0"/>
-              <a:t>26</a:t>
+              <a:t>25</a:t>
             </a:fld>
             <a:endParaRPr lang="en-US" dirty="0"/>
           </a:p>
@@ -10882,7 +10825,7 @@
 </p:sld>
 </file>
 
-<file path=ppt/slides/slide27.xml><?xml version="1.0" encoding="utf-8"?>
+<file path=ppt/slides/slide26.xml><?xml version="1.0" encoding="utf-8"?>
 <p:sld xmlns:a="http://schemas.openxmlformats.org/drawingml/2006/main" xmlns:r="http://schemas.openxmlformats.org/officeDocument/2006/relationships" xmlns:p="http://schemas.openxmlformats.org/presentationml/2006/main">
   <p:cSld>
     <p:spTree>
@@ -11005,7 +10948,7 @@
           <a:p>
             <a:fld id="{4FAB73BC-B049-4115-A692-8D63A059BFB8}" type="slidenum">
               <a:rPr lang="en-US" smtClean="0"/>
-              <a:t>27</a:t>
+              <a:t>26</a:t>
             </a:fld>
             <a:endParaRPr lang="en-US" dirty="0"/>
           </a:p>
@@ -16351,7 +16294,13 @@
                             <a:rPr lang="en-US" b="0" i="1" smtClean="0">
                               <a:latin typeface="Cambria Math" panose="02040503050406030204" pitchFamily="18" charset="0"/>
                             </a:rPr>
-                            <m:t>=1</m:t>
+                            <m:t>=</m:t>
+                          </m:r>
+                          <m:r>
+                            <a:rPr lang="en-US" b="0" i="1" smtClean="0">
+                              <a:latin typeface="Cambria Math" panose="02040503050406030204" pitchFamily="18" charset="0"/>
+                            </a:rPr>
+                            <m:t>1</m:t>
                           </m:r>
                         </m:sub>
                         <m:sup>

</xml_diff>

<commit_message>
Added boosting weights example and explanations
</commit_message>
<xml_diff>
--- a/presentation/pptx/04-Bagging, randomForests, and Boosting.pptx
+++ b/presentation/pptx/04-Bagging, randomForests, and Boosting.pptx
@@ -690,7 +690,7 @@
             </a:r>
             <a:r>
               <a:rPr lang="en-US" i="0" dirty="0"/>
-              <a:t> is accurate, then the weight is 1. If the prediction is wrong, then the weight becomes (1-err)/err*</a:t>
+              <a:t> is accurate, then the weight is not changed (multiplied by 1). If the prediction is wrong, then the weight becomes (1-err)/err*</a:t>
             </a:r>
             <a:r>
               <a:rPr lang="en-US" i="0" dirty="0" err="1"/>
@@ -698,11 +698,8 @@
             </a:r>
             <a:r>
               <a:rPr lang="en-US" i="0" dirty="0"/>
-              <a:t>. As the process continues from iteration to iteration, the weight is updated scaled up (increased) until there is a model which is able to predict the observation (then the weight resets to 1).</a:t>
-            </a:r>
-            <a:endParaRPr lang="en-US" dirty="0"/>
-          </a:p>
-          <a:p>
+              <a:t>. As the process continues from iteration to iteration, the weight is updated scaled up (increased) when the classification is wrong and remains unchanged when the classification is correct.</a:t>
+            </a:r>
             <a:endParaRPr lang="en-IL" dirty="0"/>
           </a:p>
         </p:txBody>

</xml_diff>

<commit_message>
updated mentimeter boosting question
</commit_message>
<xml_diff>
--- a/presentation/pptx/04-Bagging, randomForests, and Boosting.pptx
+++ b/presentation/pptx/04-Bagging, randomForests, and Boosting.pptx
@@ -5,7 +5,7 @@
     <p:sldMasterId id="2147483840" r:id="rId1"/>
   </p:sldMasterIdLst>
   <p:notesMasterIdLst>
-    <p:notesMasterId r:id="rId31"/>
+    <p:notesMasterId r:id="rId32"/>
   </p:notesMasterIdLst>
   <p:sldIdLst>
     <p:sldId id="256" r:id="rId2"/>
@@ -37,6 +37,7 @@
     <p:sldId id="324" r:id="rId28"/>
     <p:sldId id="310" r:id="rId29"/>
     <p:sldId id="311" r:id="rId30"/>
+    <p:sldId id="325" r:id="rId31"/>
   </p:sldIdLst>
   <p:sldSz cx="12192000" cy="6858000"/>
   <p:notesSz cx="6858000" cy="9144000"/>
@@ -699,6 +700,25 @@
             <a:r>
               <a:rPr lang="en-US" i="0" dirty="0"/>
               <a:t>. As the process continues from iteration to iteration, the weight is updated scaled up (increased) when the classification is wrong and remains unchanged when the classification is correct.</a:t>
+            </a:r>
+          </a:p>
+          <a:p>
+            <a:endParaRPr lang="en-US" i="0" dirty="0"/>
+          </a:p>
+          <a:p>
+            <a:r>
+              <a:rPr lang="en-US" i="0" dirty="0" err="1"/>
+              <a:t>Mentimeter</a:t>
+            </a:r>
+            <a:r>
+              <a:rPr lang="en-US" i="0" dirty="0"/>
+              <a:t>: </a:t>
+            </a:r>
+            <a:r>
+              <a:rPr lang="en-US" dirty="0">
+                <a:hlinkClick r:id="rId3"/>
+              </a:rPr>
+              <a:t>https://www.mentimeter.com/s/ccfdae1613bfa65976766fe5a8c02e94/70251db61258/</a:t>
             </a:r>
             <a:endParaRPr lang="en-IL" dirty="0"/>
           </a:p>
@@ -15932,6 +15952,37 @@
           </a:fontRef>
         </p:style>
       </p:cxnSp>
+      <p:pic>
+        <p:nvPicPr>
+          <p:cNvPr id="27" name="Picture 26">
+            <a:hlinkClick r:id="rId5"/>
+            <a:extLst>
+              <a:ext uri="{FF2B5EF4-FFF2-40B4-BE49-F238E27FC236}">
+                <a16:creationId xmlns:a16="http://schemas.microsoft.com/office/drawing/2014/main" id="{D0B6159A-CEAF-4DA6-B16C-587ACDD218CB}"/>
+              </a:ext>
+            </a:extLst>
+          </p:cNvPr>
+          <p:cNvPicPr>
+            <a:picLocks noChangeAspect="1"/>
+          </p:cNvPicPr>
+          <p:nvPr/>
+        </p:nvPicPr>
+        <p:blipFill>
+          <a:blip r:embed="rId6"/>
+          <a:stretch>
+            <a:fillRect/>
+          </a:stretch>
+        </p:blipFill>
+        <p:spPr>
+          <a:xfrm>
+            <a:off x="9831019" y="5268355"/>
+            <a:ext cx="1067424" cy="903845"/>
+          </a:xfrm>
+          <a:prstGeom prst="rect">
+            <a:avLst/>
+          </a:prstGeom>
+        </p:spPr>
+      </p:pic>
     </p:spTree>
     <p:extLst>
       <p:ext uri="{BB962C8B-B14F-4D97-AF65-F5344CB8AC3E}">
@@ -16220,6 +16271,51 @@
                                         </p:cTn>
                                         <p:tgtEl>
                                           <p:spTgt spid="25"/>
+                                        </p:tgtEl>
+                                        <p:attrNameLst>
+                                          <p:attrName>style.visibility</p:attrName>
+                                        </p:attrNameLst>
+                                      </p:cBhvr>
+                                      <p:to>
+                                        <p:strVal val="visible"/>
+                                      </p:to>
+                                    </p:set>
+                                  </p:childTnLst>
+                                </p:cTn>
+                              </p:par>
+                            </p:childTnLst>
+                          </p:cTn>
+                        </p:par>
+                      </p:childTnLst>
+                    </p:cTn>
+                  </p:par>
+                  <p:par>
+                    <p:cTn id="27" fill="hold">
+                      <p:stCondLst>
+                        <p:cond delay="indefinite"/>
+                      </p:stCondLst>
+                      <p:childTnLst>
+                        <p:par>
+                          <p:cTn id="28" fill="hold">
+                            <p:stCondLst>
+                              <p:cond delay="0"/>
+                            </p:stCondLst>
+                            <p:childTnLst>
+                              <p:par>
+                                <p:cTn id="29" presetID="1" presetClass="entr" presetSubtype="0" fill="hold" nodeType="clickEffect">
+                                  <p:stCondLst>
+                                    <p:cond delay="0"/>
+                                  </p:stCondLst>
+                                  <p:childTnLst>
+                                    <p:set>
+                                      <p:cBhvr>
+                                        <p:cTn id="30" dur="1" fill="hold">
+                                          <p:stCondLst>
+                                            <p:cond delay="0"/>
+                                          </p:stCondLst>
+                                        </p:cTn>
+                                        <p:tgtEl>
+                                          <p:spTgt spid="27"/>
                                         </p:tgtEl>
                                         <p:attrNameLst>
                                           <p:attrName>style.visibility</p:attrName>
@@ -17327,7 +17423,7 @@
               <a:p>
                 <a:r>
                   <a:rPr lang="en-US" dirty="0"/>
-                  <a:t>But intuitively, (and to see the relationship to the residuals we were using earlier) consider:</a:t>
+                  <a:t>But intuitively (and to see the relationship to the residuals we were using earlier) consider:</a:t>
                 </a:r>
               </a:p>
               <a:p>
@@ -17479,7 +17575,7 @@
                 </a14:m>
                 <a:r>
                   <a:rPr lang="en-US" dirty="0"/>
-                  <a:t> as the loss function. Then its gradient is given by.</a:t>
+                  <a:t> as the loss function. Then its gradient is given by:</a:t>
                 </a:r>
               </a:p>
               <a:p>
@@ -19384,6 +19480,149 @@
     <p:extLst>
       <p:ext uri="{BB962C8B-B14F-4D97-AF65-F5344CB8AC3E}">
         <p14:creationId xmlns:p14="http://schemas.microsoft.com/office/powerpoint/2010/main" val="1860836206"/>
+      </p:ext>
+    </p:extLst>
+  </p:cSld>
+  <p:clrMapOvr>
+    <a:masterClrMapping/>
+  </p:clrMapOvr>
+</p:sld>
+</file>
+
+<file path=ppt/slides/slide30.xml><?xml version="1.0" encoding="utf-8"?>
+<p:sld xmlns:a="http://schemas.openxmlformats.org/drawingml/2006/main" xmlns:r="http://schemas.openxmlformats.org/officeDocument/2006/relationships" xmlns:p="http://schemas.openxmlformats.org/presentationml/2006/main">
+  <p:cSld>
+    <p:spTree>
+      <p:nvGrpSpPr>
+        <p:cNvPr id="1" name=""/>
+        <p:cNvGrpSpPr/>
+        <p:nvPr/>
+      </p:nvGrpSpPr>
+      <p:grpSpPr>
+        <a:xfrm>
+          <a:off x="0" y="0"/>
+          <a:ext cx="0" cy="0"/>
+          <a:chOff x="0" y="0"/>
+          <a:chExt cx="0" cy="0"/>
+        </a:xfrm>
+      </p:grpSpPr>
+      <p:sp>
+        <p:nvSpPr>
+          <p:cNvPr id="6" name="Title 5">
+            <a:extLst>
+              <a:ext uri="{FF2B5EF4-FFF2-40B4-BE49-F238E27FC236}">
+                <a16:creationId xmlns:a16="http://schemas.microsoft.com/office/drawing/2014/main" id="{CEB90572-E1CC-4A67-A15D-8C9A75AE1646}"/>
+              </a:ext>
+            </a:extLst>
+          </p:cNvPr>
+          <p:cNvSpPr>
+            <a:spLocks noGrp="1"/>
+          </p:cNvSpPr>
+          <p:nvPr>
+            <p:ph type="title"/>
+          </p:nvPr>
+        </p:nvSpPr>
+        <p:spPr/>
+        <p:txBody>
+          <a:bodyPr/>
+          <a:lstStyle/>
+          <a:p>
+            <a:r>
+              <a:rPr lang="en-US" dirty="0"/>
+              <a:t>Optimization</a:t>
+            </a:r>
+            <a:endParaRPr lang="en-IL" dirty="0"/>
+          </a:p>
+        </p:txBody>
+      </p:sp>
+      <p:sp>
+        <p:nvSpPr>
+          <p:cNvPr id="7" name="Content Placeholder 6">
+            <a:extLst>
+              <a:ext uri="{FF2B5EF4-FFF2-40B4-BE49-F238E27FC236}">
+                <a16:creationId xmlns:a16="http://schemas.microsoft.com/office/drawing/2014/main" id="{81006E01-5FBD-489C-BED7-7BC7D05F8C62}"/>
+              </a:ext>
+            </a:extLst>
+          </p:cNvPr>
+          <p:cNvSpPr>
+            <a:spLocks noGrp="1"/>
+          </p:cNvSpPr>
+          <p:nvPr>
+            <p:ph idx="1"/>
+          </p:nvPr>
+        </p:nvSpPr>
+        <p:spPr/>
+        <p:txBody>
+          <a:bodyPr/>
+          <a:lstStyle/>
+          <a:p>
+            <a:endParaRPr lang="en-IL"/>
+          </a:p>
+        </p:txBody>
+      </p:sp>
+      <p:sp>
+        <p:nvSpPr>
+          <p:cNvPr id="4" name="Footer Placeholder 3">
+            <a:extLst>
+              <a:ext uri="{FF2B5EF4-FFF2-40B4-BE49-F238E27FC236}">
+                <a16:creationId xmlns:a16="http://schemas.microsoft.com/office/drawing/2014/main" id="{0D22FBCC-F7D5-4F7F-BED9-3022167B0083}"/>
+              </a:ext>
+            </a:extLst>
+          </p:cNvPr>
+          <p:cNvSpPr>
+            <a:spLocks noGrp="1"/>
+          </p:cNvSpPr>
+          <p:nvPr>
+            <p:ph type="ftr" sz="quarter" idx="11"/>
+          </p:nvPr>
+        </p:nvSpPr>
+        <p:spPr/>
+        <p:txBody>
+          <a:bodyPr/>
+          <a:lstStyle/>
+          <a:p>
+            <a:r>
+              <a:rPr lang="en-US"/>
+              <a:t>Materials by Adi Sarid https://adisarid.github.io and http://www.sarid-ins.com</a:t>
+            </a:r>
+            <a:endParaRPr lang="en-US" dirty="0"/>
+          </a:p>
+        </p:txBody>
+      </p:sp>
+      <p:sp>
+        <p:nvSpPr>
+          <p:cNvPr id="5" name="Slide Number Placeholder 4">
+            <a:extLst>
+              <a:ext uri="{FF2B5EF4-FFF2-40B4-BE49-F238E27FC236}">
+                <a16:creationId xmlns:a16="http://schemas.microsoft.com/office/drawing/2014/main" id="{6CC110FB-3DB5-45C8-8D7C-9E88D95D7B34}"/>
+              </a:ext>
+            </a:extLst>
+          </p:cNvPr>
+          <p:cNvSpPr>
+            <a:spLocks noGrp="1"/>
+          </p:cNvSpPr>
+          <p:nvPr>
+            <p:ph type="sldNum" sz="quarter" idx="12"/>
+          </p:nvPr>
+        </p:nvSpPr>
+        <p:spPr/>
+        <p:txBody>
+          <a:bodyPr/>
+          <a:lstStyle/>
+          <a:p>
+            <a:fld id="{4FAB73BC-B049-4115-A692-8D63A059BFB8}" type="slidenum">
+              <a:rPr lang="en-US" smtClean="0"/>
+              <a:pPr/>
+              <a:t>30</a:t>
+            </a:fld>
+            <a:endParaRPr lang="en-US" dirty="0"/>
+          </a:p>
+        </p:txBody>
+      </p:sp>
+    </p:spTree>
+    <p:extLst>
+      <p:ext uri="{BB962C8B-B14F-4D97-AF65-F5344CB8AC3E}">
+        <p14:creationId xmlns:p14="http://schemas.microsoft.com/office/powerpoint/2010/main" val="973391659"/>
       </p:ext>
     </p:extLst>
   </p:cSld>

</xml_diff>

<commit_message>
added a knapsack example
</commit_message>
<xml_diff>
--- a/presentation/pptx/04-Bagging, randomForests, and Boosting.pptx
+++ b/presentation/pptx/04-Bagging, randomForests, and Boosting.pptx
@@ -5,7 +5,7 @@
     <p:sldMasterId id="2147483840" r:id="rId1"/>
   </p:sldMasterIdLst>
   <p:notesMasterIdLst>
-    <p:notesMasterId r:id="rId32"/>
+    <p:notesMasterId r:id="rId36"/>
   </p:notesMasterIdLst>
   <p:sldIdLst>
     <p:sldId id="256" r:id="rId2"/>
@@ -38,6 +38,10 @@
     <p:sldId id="310" r:id="rId29"/>
     <p:sldId id="311" r:id="rId30"/>
     <p:sldId id="325" r:id="rId31"/>
+    <p:sldId id="326" r:id="rId32"/>
+    <p:sldId id="327" r:id="rId33"/>
+    <p:sldId id="328" r:id="rId34"/>
+    <p:sldId id="329" r:id="rId35"/>
   </p:sldIdLst>
   <p:sldSz cx="12192000" cy="6858000"/>
   <p:notesSz cx="6858000" cy="9144000"/>
@@ -14387,13 +14391,7 @@
                       <a:rPr lang="en-US" b="0" i="1" smtClean="0">
                         <a:latin typeface="Cambria Math" panose="02040503050406030204" pitchFamily="18" charset="0"/>
                       </a:rPr>
-                      <m:t>1</m:t>
-                    </m:r>
-                    <m:r>
-                      <a:rPr lang="en-US" b="0" i="1" smtClean="0">
-                        <a:latin typeface="Cambria Math" panose="02040503050406030204" pitchFamily="18" charset="0"/>
-                      </a:rPr>
-                      <m:t>,…,</m:t>
+                      <m:t>1,…,</m:t>
                     </m:r>
                     <m:r>
                       <a:rPr lang="en-US" b="0" i="1" smtClean="0">
@@ -14435,31 +14433,7 @@
                       <a:rPr lang="en-US" b="0" i="1" smtClean="0">
                         <a:latin typeface="Cambria Math" panose="02040503050406030204" pitchFamily="18" charset="0"/>
                       </a:rPr>
-                      <m:t>=</m:t>
-                    </m:r>
-                    <m:r>
-                      <a:rPr lang="en-US" b="0" i="1" smtClean="0">
-                        <a:latin typeface="Cambria Math" panose="02040503050406030204" pitchFamily="18" charset="0"/>
-                      </a:rPr>
-                      <m:t>1</m:t>
-                    </m:r>
-                    <m:r>
-                      <a:rPr lang="en-US" b="0" i="1" smtClean="0">
-                        <a:latin typeface="Cambria Math" panose="02040503050406030204" pitchFamily="18" charset="0"/>
-                      </a:rPr>
-                      <m:t>,</m:t>
-                    </m:r>
-                    <m:r>
-                      <a:rPr lang="en-US" b="0" i="1" smtClean="0">
-                        <a:latin typeface="Cambria Math" panose="02040503050406030204" pitchFamily="18" charset="0"/>
-                      </a:rPr>
-                      <m:t>2</m:t>
-                    </m:r>
-                    <m:r>
-                      <a:rPr lang="en-US" b="0" i="1" smtClean="0">
-                        <a:latin typeface="Cambria Math" panose="02040503050406030204" pitchFamily="18" charset="0"/>
-                      </a:rPr>
-                      <m:t>,…,</m:t>
+                      <m:t>=1,2,…,</m:t>
                     </m:r>
                     <m:r>
                       <a:rPr lang="en-US" b="0" i="1" smtClean="0">
@@ -14868,13 +14842,7 @@
                               <a:rPr lang="en-US" b="0" i="1" smtClean="0">
                                 <a:latin typeface="Cambria Math" panose="02040503050406030204" pitchFamily="18" charset="0"/>
                               </a:rPr>
-                              <m:t>1</m:t>
-                            </m:r>
-                            <m:r>
-                              <a:rPr lang="en-US" b="0" i="1" smtClean="0">
-                                <a:latin typeface="Cambria Math" panose="02040503050406030204" pitchFamily="18" charset="0"/>
-                              </a:rPr>
-                              <m:t>−</m:t>
+                              <m:t>1−</m:t>
                             </m:r>
                             <m:sSub>
                               <m:sSubPr>
@@ -15203,19 +15171,7 @@
                       <a:rPr lang="en-US" b="0" i="1" smtClean="0">
                         <a:latin typeface="Cambria Math" panose="02040503050406030204" pitchFamily="18" charset="0"/>
                       </a:rPr>
-                      <m:t>=</m:t>
-                    </m:r>
-                    <m:r>
-                      <a:rPr lang="en-US" b="0" i="1" smtClean="0">
-                        <a:latin typeface="Cambria Math" panose="02040503050406030204" pitchFamily="18" charset="0"/>
-                      </a:rPr>
-                      <m:t>1</m:t>
-                    </m:r>
-                    <m:r>
-                      <a:rPr lang="en-US" b="0" i="1" smtClean="0">
-                        <a:latin typeface="Cambria Math" panose="02040503050406030204" pitchFamily="18" charset="0"/>
-                      </a:rPr>
-                      <m:t>…,</m:t>
+                      <m:t>=1…,</m:t>
                     </m:r>
                     <m:r>
                       <a:rPr lang="en-US" b="0" i="1" smtClean="0">
@@ -16863,13 +16819,7 @@
                               <a:rPr lang="en-US" b="0" i="1" smtClean="0">
                                 <a:latin typeface="Cambria Math" panose="02040503050406030204" pitchFamily="18" charset="0"/>
                               </a:rPr>
-                              <m:t>−</m:t>
-                            </m:r>
-                            <m:r>
-                              <a:rPr lang="en-US" b="0" i="1" smtClean="0">
-                                <a:latin typeface="Cambria Math" panose="02040503050406030204" pitchFamily="18" charset="0"/>
-                              </a:rPr>
-                              <m:t>1</m:t>
+                              <m:t>−1</m:t>
                             </m:r>
                           </m:sub>
                         </m:sSub>
@@ -17035,13 +16985,7 @@
                             <a:rPr lang="en-US" b="0" i="1" smtClean="0">
                               <a:latin typeface="Cambria Math" panose="02040503050406030204" pitchFamily="18" charset="0"/>
                             </a:rPr>
-                            <m:t>=</m:t>
-                          </m:r>
-                          <m:r>
-                            <a:rPr lang="en-US" b="0" i="1" smtClean="0">
-                              <a:latin typeface="Cambria Math" panose="02040503050406030204" pitchFamily="18" charset="0"/>
-                            </a:rPr>
-                            <m:t>1</m:t>
+                            <m:t>=1</m:t>
                           </m:r>
                         </m:sub>
                         <m:sup>
@@ -19233,7 +19177,11 @@
           <a:bodyPr/>
           <a:lstStyle/>
           <a:p>
-            <a:endParaRPr lang="en-IL"/>
+            <a:r>
+              <a:rPr lang="en-US" dirty="0"/>
+              <a:t>This is just to open your mind to new things; the problem description is a made-up over-simplification of a use case.</a:t>
+            </a:r>
+            <a:endParaRPr lang="en-IL" dirty="0"/>
           </a:p>
         </p:txBody>
       </p:sp>
@@ -19524,7 +19472,9 @@
         </p:nvSpPr>
         <p:spPr/>
         <p:txBody>
-          <a:bodyPr/>
+          <a:bodyPr>
+            <a:normAutofit/>
+          </a:bodyPr>
           <a:lstStyle/>
           <a:p>
             <a:r>
@@ -19535,31 +19485,351 @@
           </a:p>
         </p:txBody>
       </p:sp>
-      <p:sp>
-        <p:nvSpPr>
-          <p:cNvPr id="7" name="Content Placeholder 6">
-            <a:extLst>
-              <a:ext uri="{FF2B5EF4-FFF2-40B4-BE49-F238E27FC236}">
-                <a16:creationId xmlns:a16="http://schemas.microsoft.com/office/drawing/2014/main" id="{81006E01-5FBD-489C-BED7-7BC7D05F8C62}"/>
-              </a:ext>
-            </a:extLst>
-          </p:cNvPr>
-          <p:cNvSpPr>
-            <a:spLocks noGrp="1"/>
-          </p:cNvSpPr>
-          <p:nvPr>
-            <p:ph idx="1"/>
-          </p:nvPr>
-        </p:nvSpPr>
-        <p:spPr/>
-        <p:txBody>
-          <a:bodyPr/>
-          <a:lstStyle/>
-          <a:p>
-            <a:endParaRPr lang="en-IL"/>
-          </a:p>
-        </p:txBody>
-      </p:sp>
+      <mc:AlternateContent xmlns:mc="http://schemas.openxmlformats.org/markup-compatibility/2006">
+        <mc:Choice xmlns:a14="http://schemas.microsoft.com/office/drawing/2010/main" Requires="a14">
+          <p:sp>
+            <p:nvSpPr>
+              <p:cNvPr id="7" name="Content Placeholder 6">
+                <a:extLst>
+                  <a:ext uri="{FF2B5EF4-FFF2-40B4-BE49-F238E27FC236}">
+                    <a16:creationId xmlns:a16="http://schemas.microsoft.com/office/drawing/2014/main" id="{81006E01-5FBD-489C-BED7-7BC7D05F8C62}"/>
+                  </a:ext>
+                </a:extLst>
+              </p:cNvPr>
+              <p:cNvSpPr>
+                <a:spLocks noGrp="1"/>
+              </p:cNvSpPr>
+              <p:nvPr>
+                <p:ph idx="1"/>
+              </p:nvPr>
+            </p:nvSpPr>
+            <p:spPr/>
+            <p:txBody>
+              <a:bodyPr>
+                <a:normAutofit lnSpcReduction="10000"/>
+              </a:bodyPr>
+              <a:lstStyle/>
+              <a:p>
+                <a:r>
+                  <a:rPr lang="en-US" dirty="0"/>
+                  <a:t>We have run into many optimization problems, i.e., minimum sub of squares in linear regression, maximum likelihood in logistic regression, maximal margin in SVM, and more.</a:t>
+                </a:r>
+              </a:p>
+              <a:p>
+                <a:r>
+                  <a:rPr lang="en-US" dirty="0"/>
+                  <a:t>A general framework for optimization is:</a:t>
+                </a:r>
+              </a:p>
+              <a:p>
+                <a:pPr marL="0" indent="0">
+                  <a:buNone/>
+                </a:pPr>
+                <a14:m>
+                  <m:oMathPara xmlns:m="http://schemas.openxmlformats.org/officeDocument/2006/math">
+                    <m:oMathParaPr>
+                      <m:jc m:val="centerGroup"/>
+                    </m:oMathParaPr>
+                    <m:oMath xmlns:m="http://schemas.openxmlformats.org/officeDocument/2006/math">
+                      <m:func>
+                        <m:funcPr>
+                          <m:ctrlPr>
+                            <a:rPr lang="en-US" b="0" i="1" smtClean="0">
+                              <a:latin typeface="Cambria Math" panose="02040503050406030204" pitchFamily="18" charset="0"/>
+                            </a:rPr>
+                          </m:ctrlPr>
+                        </m:funcPr>
+                        <m:fName>
+                          <m:r>
+                            <m:rPr>
+                              <m:sty m:val="p"/>
+                            </m:rPr>
+                            <a:rPr lang="en-US" b="0" i="0" smtClean="0">
+                              <a:latin typeface="Cambria Math" panose="02040503050406030204" pitchFamily="18" charset="0"/>
+                            </a:rPr>
+                            <m:t>min</m:t>
+                          </m:r>
+                        </m:fName>
+                        <m:e>
+                          <m:r>
+                            <a:rPr lang="en-US" b="0" i="1" smtClean="0">
+                              <a:latin typeface="Cambria Math" panose="02040503050406030204" pitchFamily="18" charset="0"/>
+                            </a:rPr>
+                            <m:t>𝑔</m:t>
+                          </m:r>
+                          <m:d>
+                            <m:dPr>
+                              <m:ctrlPr>
+                                <a:rPr lang="en-US" b="0" i="1" smtClean="0">
+                                  <a:latin typeface="Cambria Math" panose="02040503050406030204" pitchFamily="18" charset="0"/>
+                                </a:rPr>
+                              </m:ctrlPr>
+                            </m:dPr>
+                            <m:e>
+                              <m:r>
+                                <a:rPr lang="en-US" b="0" i="1" smtClean="0">
+                                  <a:latin typeface="Cambria Math" panose="02040503050406030204" pitchFamily="18" charset="0"/>
+                                </a:rPr>
+                                <m:t>𝑥</m:t>
+                              </m:r>
+                            </m:e>
+                          </m:d>
+                        </m:e>
+                      </m:func>
+                    </m:oMath>
+                  </m:oMathPara>
+                </a14:m>
+                <a:endParaRPr lang="en-US" b="0" dirty="0"/>
+              </a:p>
+              <a:p>
+                <a:pPr marL="0" indent="0">
+                  <a:buNone/>
+                </a:pPr>
+                <a:r>
+                  <a:rPr lang="en-US" dirty="0"/>
+                  <a:t>Subject to:</a:t>
+                </a:r>
+              </a:p>
+              <a:p>
+                <a:pPr marL="0" indent="0">
+                  <a:buNone/>
+                </a:pPr>
+                <a14:m>
+                  <m:oMathPara xmlns:m="http://schemas.openxmlformats.org/officeDocument/2006/math">
+                    <m:oMathParaPr>
+                      <m:jc m:val="centerGroup"/>
+                    </m:oMathParaPr>
+                    <m:oMath xmlns:m="http://schemas.openxmlformats.org/officeDocument/2006/math">
+                      <m:sSub>
+                        <m:sSubPr>
+                          <m:ctrlPr>
+                            <a:rPr lang="en-US" b="0" i="1" smtClean="0">
+                              <a:latin typeface="Cambria Math" panose="02040503050406030204" pitchFamily="18" charset="0"/>
+                            </a:rPr>
+                          </m:ctrlPr>
+                        </m:sSubPr>
+                        <m:e>
+                          <m:r>
+                            <a:rPr lang="en-US" b="0" i="1" smtClean="0">
+                              <a:latin typeface="Cambria Math" panose="02040503050406030204" pitchFamily="18" charset="0"/>
+                            </a:rPr>
+                            <m:t>𝑓</m:t>
+                          </m:r>
+                        </m:e>
+                        <m:sub>
+                          <m:r>
+                            <a:rPr lang="en-US" b="0" i="1" smtClean="0">
+                              <a:latin typeface="Cambria Math" panose="02040503050406030204" pitchFamily="18" charset="0"/>
+                            </a:rPr>
+                            <m:t>𝑖</m:t>
+                          </m:r>
+                        </m:sub>
+                      </m:sSub>
+                      <m:d>
+                        <m:dPr>
+                          <m:ctrlPr>
+                            <a:rPr lang="en-US" b="0" i="1" smtClean="0">
+                              <a:latin typeface="Cambria Math" panose="02040503050406030204" pitchFamily="18" charset="0"/>
+                            </a:rPr>
+                          </m:ctrlPr>
+                        </m:dPr>
+                        <m:e>
+                          <m:r>
+                            <a:rPr lang="en-US" b="0" i="1" smtClean="0">
+                              <a:latin typeface="Cambria Math" panose="02040503050406030204" pitchFamily="18" charset="0"/>
+                            </a:rPr>
+                            <m:t>𝑥</m:t>
+                          </m:r>
+                        </m:e>
+                      </m:d>
+                      <m:r>
+                        <a:rPr lang="en-US" b="0" i="1" smtClean="0">
+                          <a:latin typeface="Cambria Math" panose="02040503050406030204" pitchFamily="18" charset="0"/>
+                        </a:rPr>
+                        <m:t>≤</m:t>
+                      </m:r>
+                      <m:sSub>
+                        <m:sSubPr>
+                          <m:ctrlPr>
+                            <a:rPr lang="en-US" b="0" i="1" smtClean="0">
+                              <a:latin typeface="Cambria Math" panose="02040503050406030204" pitchFamily="18" charset="0"/>
+                            </a:rPr>
+                          </m:ctrlPr>
+                        </m:sSubPr>
+                        <m:e>
+                          <m:r>
+                            <a:rPr lang="en-US" b="0" i="1" smtClean="0">
+                              <a:latin typeface="Cambria Math" panose="02040503050406030204" pitchFamily="18" charset="0"/>
+                            </a:rPr>
+                            <m:t>𝑏</m:t>
+                          </m:r>
+                        </m:e>
+                        <m:sub>
+                          <m:r>
+                            <a:rPr lang="en-US" b="0" i="1" smtClean="0">
+                              <a:latin typeface="Cambria Math" panose="02040503050406030204" pitchFamily="18" charset="0"/>
+                            </a:rPr>
+                            <m:t>𝑖</m:t>
+                          </m:r>
+                        </m:sub>
+                      </m:sSub>
+                    </m:oMath>
+                  </m:oMathPara>
+                </a14:m>
+                <a:endParaRPr lang="en-US" dirty="0"/>
+              </a:p>
+              <a:p>
+                <a:r>
+                  <a:rPr lang="en-US" dirty="0"/>
+                  <a:t>Linear optimization is a specific case in which </a:t>
+                </a:r>
+                <a14:m>
+                  <m:oMath xmlns:m="http://schemas.openxmlformats.org/officeDocument/2006/math">
+                    <m:r>
+                      <a:rPr lang="en-US" b="0" i="1" smtClean="0">
+                        <a:latin typeface="Cambria Math" panose="02040503050406030204" pitchFamily="18" charset="0"/>
+                      </a:rPr>
+                      <m:t>𝑔</m:t>
+                    </m:r>
+                    <m:r>
+                      <a:rPr lang="en-US" b="0" i="1" smtClean="0">
+                        <a:latin typeface="Cambria Math" panose="02040503050406030204" pitchFamily="18" charset="0"/>
+                      </a:rPr>
+                      <m:t>, </m:t>
+                    </m:r>
+                    <m:sSub>
+                      <m:sSubPr>
+                        <m:ctrlPr>
+                          <a:rPr lang="en-US" b="0" i="1" smtClean="0">
+                            <a:latin typeface="Cambria Math" panose="02040503050406030204" pitchFamily="18" charset="0"/>
+                          </a:rPr>
+                        </m:ctrlPr>
+                      </m:sSubPr>
+                      <m:e>
+                        <m:r>
+                          <a:rPr lang="en-US" b="0" i="1" smtClean="0">
+                            <a:latin typeface="Cambria Math" panose="02040503050406030204" pitchFamily="18" charset="0"/>
+                          </a:rPr>
+                          <m:t>𝑓</m:t>
+                        </m:r>
+                      </m:e>
+                      <m:sub>
+                        <m:r>
+                          <a:rPr lang="en-US" b="0" i="1" smtClean="0">
+                            <a:latin typeface="Cambria Math" panose="02040503050406030204" pitchFamily="18" charset="0"/>
+                          </a:rPr>
+                          <m:t>𝑖</m:t>
+                        </m:r>
+                      </m:sub>
+                    </m:sSub>
+                  </m:oMath>
+                </a14:m>
+                <a:r>
+                  <a:rPr lang="en-US" dirty="0"/>
+                  <a:t> are both linear</a:t>
+                </a:r>
+              </a:p>
+              <a:p>
+                <a:pPr lvl="1"/>
+                <a:r>
+                  <a:rPr lang="en-US" dirty="0"/>
+                  <a:t>This is called linear programming, though it’s not “programming”…</a:t>
+                </a:r>
+              </a:p>
+              <a:p>
+                <a:r>
+                  <a:rPr lang="en-US" dirty="0"/>
+                  <a:t>When we want the solution to be integer, i.e., </a:t>
+                </a:r>
+                <a14:m>
+                  <m:oMath xmlns:m="http://schemas.openxmlformats.org/officeDocument/2006/math">
+                    <m:r>
+                      <a:rPr lang="en-US" b="0" i="1" smtClean="0">
+                        <a:latin typeface="Cambria Math" panose="02040503050406030204" pitchFamily="18" charset="0"/>
+                      </a:rPr>
+                      <m:t>𝑥</m:t>
+                    </m:r>
+                    <m:r>
+                      <a:rPr lang="en-US" b="0" i="1" smtClean="0">
+                        <a:latin typeface="Cambria Math" panose="02040503050406030204" pitchFamily="18" charset="0"/>
+                      </a:rPr>
+                      <m:t>∈</m:t>
+                    </m:r>
+                    <m:d>
+                      <m:dPr>
+                        <m:begChr m:val="{"/>
+                        <m:endChr m:val="}"/>
+                        <m:ctrlPr>
+                          <a:rPr lang="en-US" b="0" i="1" smtClean="0">
+                            <a:latin typeface="Cambria Math" panose="02040503050406030204" pitchFamily="18" charset="0"/>
+                          </a:rPr>
+                        </m:ctrlPr>
+                      </m:dPr>
+                      <m:e>
+                        <m:r>
+                          <a:rPr lang="en-US" b="0" i="1" smtClean="0">
+                            <a:latin typeface="Cambria Math" panose="02040503050406030204" pitchFamily="18" charset="0"/>
+                          </a:rPr>
+                          <m:t>1,2,</m:t>
+                        </m:r>
+                        <m:r>
+                          <a:rPr lang="en-US" b="0" i="1" smtClean="0">
+                            <a:latin typeface="Cambria Math" panose="02040503050406030204" pitchFamily="18" charset="0"/>
+                          </a:rPr>
+                          <m:t>…</m:t>
+                        </m:r>
+                      </m:e>
+                    </m:d>
+                  </m:oMath>
+                </a14:m>
+                <a:r>
+                  <a:rPr lang="en-US" dirty="0"/>
+                  <a:t>, that’s called a mixed-integer linear programming (MILP) or integer linear programming (ILP)</a:t>
+                </a:r>
+              </a:p>
+            </p:txBody>
+          </p:sp>
+        </mc:Choice>
+        <mc:Fallback>
+          <p:sp>
+            <p:nvSpPr>
+              <p:cNvPr id="7" name="Content Placeholder 6">
+                <a:extLst>
+                  <a:ext uri="{FF2B5EF4-FFF2-40B4-BE49-F238E27FC236}">
+                    <a16:creationId xmlns:a16="http://schemas.microsoft.com/office/drawing/2014/main" id="{81006E01-5FBD-489C-BED7-7BC7D05F8C62}"/>
+                  </a:ext>
+                </a:extLst>
+              </p:cNvPr>
+              <p:cNvSpPr>
+                <a:spLocks noGrp="1" noRot="1" noChangeAspect="1" noMove="1" noResize="1" noEditPoints="1" noAdjustHandles="1" noChangeArrowheads="1" noChangeShapeType="1" noTextEdit="1"/>
+              </p:cNvSpPr>
+              <p:nvPr>
+                <p:ph idx="1"/>
+              </p:nvPr>
+            </p:nvSpPr>
+            <p:spPr>
+              <a:blipFill>
+                <a:blip r:embed="rId2"/>
+                <a:stretch>
+                  <a:fillRect l="-667" t="-1504" r="-121"/>
+                </a:stretch>
+              </a:blipFill>
+            </p:spPr>
+            <p:txBody>
+              <a:bodyPr/>
+              <a:lstStyle/>
+              <a:p>
+                <a:r>
+                  <a:rPr lang="en-IL">
+                    <a:noFill/>
+                  </a:rPr>
+                  <a:t> </a:t>
+                </a:r>
+              </a:p>
+            </p:txBody>
+          </p:sp>
+        </mc:Fallback>
+      </mc:AlternateContent>
       <p:sp>
         <p:nvSpPr>
           <p:cNvPr id="4" name="Footer Placeholder 3">
@@ -19623,6 +19893,1461 @@
     <p:extLst>
       <p:ext uri="{BB962C8B-B14F-4D97-AF65-F5344CB8AC3E}">
         <p14:creationId xmlns:p14="http://schemas.microsoft.com/office/powerpoint/2010/main" val="973391659"/>
+      </p:ext>
+    </p:extLst>
+  </p:cSld>
+  <p:clrMapOvr>
+    <a:masterClrMapping/>
+  </p:clrMapOvr>
+</p:sld>
+</file>
+
+<file path=ppt/slides/slide31.xml><?xml version="1.0" encoding="utf-8"?>
+<p:sld xmlns:a="http://schemas.openxmlformats.org/drawingml/2006/main" xmlns:r="http://schemas.openxmlformats.org/officeDocument/2006/relationships" xmlns:p="http://schemas.openxmlformats.org/presentationml/2006/main">
+  <p:cSld>
+    <p:spTree>
+      <p:nvGrpSpPr>
+        <p:cNvPr id="1" name=""/>
+        <p:cNvGrpSpPr/>
+        <p:nvPr/>
+      </p:nvGrpSpPr>
+      <p:grpSpPr>
+        <a:xfrm>
+          <a:off x="0" y="0"/>
+          <a:ext cx="0" cy="0"/>
+          <a:chOff x="0" y="0"/>
+          <a:chExt cx="0" cy="0"/>
+        </a:xfrm>
+      </p:grpSpPr>
+      <p:sp>
+        <p:nvSpPr>
+          <p:cNvPr id="2" name="Title 1">
+            <a:extLst>
+              <a:ext uri="{FF2B5EF4-FFF2-40B4-BE49-F238E27FC236}">
+                <a16:creationId xmlns:a16="http://schemas.microsoft.com/office/drawing/2014/main" id="{23CDBA37-41D8-47D7-A353-863EDDCAA7D7}"/>
+              </a:ext>
+            </a:extLst>
+          </p:cNvPr>
+          <p:cNvSpPr>
+            <a:spLocks noGrp="1"/>
+          </p:cNvSpPr>
+          <p:nvPr>
+            <p:ph type="title"/>
+          </p:nvPr>
+        </p:nvSpPr>
+        <p:spPr/>
+        <p:txBody>
+          <a:bodyPr/>
+          <a:lstStyle/>
+          <a:p>
+            <a:r>
+              <a:rPr lang="en-US" dirty="0"/>
+              <a:t>Linear Optimization</a:t>
+            </a:r>
+            <a:endParaRPr lang="en-IL" dirty="0"/>
+          </a:p>
+        </p:txBody>
+      </p:sp>
+      <mc:AlternateContent xmlns:mc="http://schemas.openxmlformats.org/markup-compatibility/2006">
+        <mc:Choice xmlns:a14="http://schemas.microsoft.com/office/drawing/2010/main" Requires="a14">
+          <p:sp>
+            <p:nvSpPr>
+              <p:cNvPr id="3" name="Content Placeholder 2">
+                <a:extLst>
+                  <a:ext uri="{FF2B5EF4-FFF2-40B4-BE49-F238E27FC236}">
+                    <a16:creationId xmlns:a16="http://schemas.microsoft.com/office/drawing/2014/main" id="{760C6B95-C23A-4413-96B8-CEDBD9EDF498}"/>
+                  </a:ext>
+                </a:extLst>
+              </p:cNvPr>
+              <p:cNvSpPr>
+                <a:spLocks noGrp="1"/>
+              </p:cNvSpPr>
+              <p:nvPr>
+                <p:ph idx="1"/>
+              </p:nvPr>
+            </p:nvSpPr>
+            <p:spPr/>
+            <p:txBody>
+              <a:bodyPr/>
+              <a:lstStyle/>
+              <a:p>
+                <a:pPr>
+                  <a:lnSpc>
+                    <a:spcPct val="150000"/>
+                  </a:lnSpc>
+                </a:pPr>
+                <a:r>
+                  <a:rPr lang="en-US" dirty="0"/>
+                  <a:t>The general formulation for a MILP problem is</a:t>
+                </a:r>
+              </a:p>
+              <a:p>
+                <a:pPr marL="0" indent="0">
+                  <a:lnSpc>
+                    <a:spcPct val="150000"/>
+                  </a:lnSpc>
+                  <a:buNone/>
+                </a:pPr>
+                <a14:m>
+                  <m:oMathPara xmlns:m="http://schemas.openxmlformats.org/officeDocument/2006/math">
+                    <m:oMathParaPr>
+                      <m:jc m:val="centerGroup"/>
+                    </m:oMathParaPr>
+                    <m:oMath xmlns:m="http://schemas.openxmlformats.org/officeDocument/2006/math">
+                      <m:func>
+                        <m:funcPr>
+                          <m:ctrlPr>
+                            <a:rPr lang="en-US" b="0" i="1" smtClean="0">
+                              <a:latin typeface="Cambria Math" panose="02040503050406030204" pitchFamily="18" charset="0"/>
+                            </a:rPr>
+                          </m:ctrlPr>
+                        </m:funcPr>
+                        <m:fName>
+                          <m:r>
+                            <m:rPr>
+                              <m:sty m:val="p"/>
+                            </m:rPr>
+                            <a:rPr lang="en-US" b="0" i="0" smtClean="0">
+                              <a:latin typeface="Cambria Math" panose="02040503050406030204" pitchFamily="18" charset="0"/>
+                            </a:rPr>
+                            <m:t>min</m:t>
+                          </m:r>
+                        </m:fName>
+                        <m:e>
+                          <m:sSup>
+                            <m:sSupPr>
+                              <m:ctrlPr>
+                                <a:rPr lang="en-US" b="0" i="1" smtClean="0">
+                                  <a:latin typeface="Cambria Math" panose="02040503050406030204" pitchFamily="18" charset="0"/>
+                                </a:rPr>
+                              </m:ctrlPr>
+                            </m:sSupPr>
+                            <m:e>
+                              <m:r>
+                                <a:rPr lang="en-US" b="0" i="1" smtClean="0">
+                                  <a:latin typeface="Cambria Math" panose="02040503050406030204" pitchFamily="18" charset="0"/>
+                                </a:rPr>
+                                <m:t>𝑐</m:t>
+                              </m:r>
+                            </m:e>
+                            <m:sup>
+                              <m:r>
+                                <a:rPr lang="en-US" b="0" i="1" smtClean="0">
+                                  <a:latin typeface="Cambria Math" panose="02040503050406030204" pitchFamily="18" charset="0"/>
+                                </a:rPr>
+                                <m:t>𝑇</m:t>
+                              </m:r>
+                            </m:sup>
+                          </m:sSup>
+                          <m:r>
+                            <a:rPr lang="en-US" b="0" i="1" smtClean="0">
+                              <a:latin typeface="Cambria Math" panose="02040503050406030204" pitchFamily="18" charset="0"/>
+                            </a:rPr>
+                            <m:t>𝑥</m:t>
+                          </m:r>
+                        </m:e>
+                      </m:func>
+                    </m:oMath>
+                  </m:oMathPara>
+                </a14:m>
+                <a:endParaRPr lang="en-US" dirty="0"/>
+              </a:p>
+              <a:p>
+                <a:pPr>
+                  <a:lnSpc>
+                    <a:spcPct val="150000"/>
+                  </a:lnSpc>
+                </a:pPr>
+                <a:r>
+                  <a:rPr lang="en-US" dirty="0"/>
+                  <a:t>Subject to</a:t>
+                </a:r>
+              </a:p>
+              <a:p>
+                <a:pPr marL="0" indent="0" algn="ctr">
+                  <a:lnSpc>
+                    <a:spcPct val="150000"/>
+                  </a:lnSpc>
+                  <a:buNone/>
+                </a:pPr>
+                <a14:m>
+                  <m:oMath xmlns:m="http://schemas.openxmlformats.org/officeDocument/2006/math">
+                    <m:r>
+                      <a:rPr lang="en-US" b="0" i="1" smtClean="0">
+                        <a:latin typeface="Cambria Math" panose="02040503050406030204" pitchFamily="18" charset="0"/>
+                      </a:rPr>
+                      <m:t>𝐴𝑥</m:t>
+                    </m:r>
+                    <m:r>
+                      <a:rPr lang="en-US" b="0" i="1" smtClean="0">
+                        <a:latin typeface="Cambria Math" panose="02040503050406030204" pitchFamily="18" charset="0"/>
+                      </a:rPr>
+                      <m:t>≤</m:t>
+                    </m:r>
+                    <m:r>
+                      <a:rPr lang="en-US" b="0" i="1" smtClean="0">
+                        <a:latin typeface="Cambria Math" panose="02040503050406030204" pitchFamily="18" charset="0"/>
+                      </a:rPr>
+                      <m:t>𝑏</m:t>
+                    </m:r>
+                  </m:oMath>
+                </a14:m>
+                <a:r>
+                  <a:rPr lang="en-US" dirty="0"/>
+                  <a:t>,</a:t>
+                </a:r>
+              </a:p>
+              <a:p>
+                <a:pPr marL="0" indent="0">
+                  <a:lnSpc>
+                    <a:spcPct val="150000"/>
+                  </a:lnSpc>
+                  <a:buNone/>
+                </a:pPr>
+                <a14:m>
+                  <m:oMathPara xmlns:m="http://schemas.openxmlformats.org/officeDocument/2006/math">
+                    <m:oMathParaPr>
+                      <m:jc m:val="centerGroup"/>
+                    </m:oMathParaPr>
+                    <m:oMath xmlns:m="http://schemas.openxmlformats.org/officeDocument/2006/math">
+                      <m:sSub>
+                        <m:sSubPr>
+                          <m:ctrlPr>
+                            <a:rPr lang="en-US" b="0" i="1" smtClean="0">
+                              <a:latin typeface="Cambria Math" panose="02040503050406030204" pitchFamily="18" charset="0"/>
+                            </a:rPr>
+                          </m:ctrlPr>
+                        </m:sSubPr>
+                        <m:e>
+                          <m:r>
+                            <a:rPr lang="en-US" b="0" i="1" smtClean="0">
+                              <a:latin typeface="Cambria Math" panose="02040503050406030204" pitchFamily="18" charset="0"/>
+                            </a:rPr>
+                            <m:t>𝑥</m:t>
+                          </m:r>
+                        </m:e>
+                        <m:sub>
+                          <m:r>
+                            <a:rPr lang="en-US" b="0" i="1" smtClean="0">
+                              <a:latin typeface="Cambria Math" panose="02040503050406030204" pitchFamily="18" charset="0"/>
+                            </a:rPr>
+                            <m:t>𝑖</m:t>
+                          </m:r>
+                        </m:sub>
+                      </m:sSub>
+                      <m:r>
+                        <a:rPr lang="en-US" b="0" i="1" smtClean="0">
+                          <a:latin typeface="Cambria Math" panose="02040503050406030204" pitchFamily="18" charset="0"/>
+                        </a:rPr>
+                        <m:t>∈</m:t>
+                      </m:r>
+                      <m:r>
+                        <a:rPr lang="en-US" b="0" i="1" smtClean="0">
+                          <a:latin typeface="Cambria Math" panose="02040503050406030204" pitchFamily="18" charset="0"/>
+                        </a:rPr>
+                        <m:t>𝑁</m:t>
+                      </m:r>
+                      <m:r>
+                        <a:rPr lang="en-US" b="0" i="1" smtClean="0">
+                          <a:latin typeface="Cambria Math" panose="02040503050406030204" pitchFamily="18" charset="0"/>
+                        </a:rPr>
+                        <m:t>,  ∀</m:t>
+                      </m:r>
+                      <m:r>
+                        <a:rPr lang="en-US" b="0" i="1" smtClean="0">
+                          <a:latin typeface="Cambria Math" panose="02040503050406030204" pitchFamily="18" charset="0"/>
+                        </a:rPr>
+                        <m:t>𝑖</m:t>
+                      </m:r>
+                      <m:r>
+                        <a:rPr lang="en-US" b="0" i="1" smtClean="0">
+                          <a:latin typeface="Cambria Math" panose="02040503050406030204" pitchFamily="18" charset="0"/>
+                        </a:rPr>
+                        <m:t>∈</m:t>
+                      </m:r>
+                      <m:r>
+                        <m:rPr>
+                          <m:nor/>
+                        </m:rPr>
+                        <a:rPr lang="en-US" b="0" i="0" smtClean="0">
+                          <a:latin typeface="Cambria Math" panose="02040503050406030204" pitchFamily="18" charset="0"/>
+                        </a:rPr>
+                        <m:t>...</m:t>
+                      </m:r>
+                      <m:r>
+                        <m:rPr>
+                          <m:nor/>
+                        </m:rPr>
+                        <a:rPr lang="en-US" b="0" i="0" smtClean="0">
+                          <a:latin typeface="Cambria Math" panose="02040503050406030204" pitchFamily="18" charset="0"/>
+                        </a:rPr>
+                        <m:t>relevant</m:t>
+                      </m:r>
+                      <m:r>
+                        <m:rPr>
+                          <m:nor/>
+                        </m:rPr>
+                        <a:rPr lang="en-US" b="0" i="0" smtClean="0">
+                          <a:latin typeface="Cambria Math" panose="02040503050406030204" pitchFamily="18" charset="0"/>
+                        </a:rPr>
+                        <m:t> </m:t>
+                      </m:r>
+                      <m:r>
+                        <m:rPr>
+                          <m:nor/>
+                        </m:rPr>
+                        <a:rPr lang="en-US" b="0" i="0" smtClean="0">
+                          <a:latin typeface="Cambria Math" panose="02040503050406030204" pitchFamily="18" charset="0"/>
+                        </a:rPr>
+                        <m:t>set</m:t>
+                      </m:r>
+                      <m:r>
+                        <m:rPr>
+                          <m:nor/>
+                        </m:rPr>
+                        <a:rPr lang="en-US" b="0" i="0" smtClean="0">
+                          <a:latin typeface="Cambria Math" panose="02040503050406030204" pitchFamily="18" charset="0"/>
+                        </a:rPr>
+                        <m:t>...</m:t>
+                      </m:r>
+                    </m:oMath>
+                  </m:oMathPara>
+                </a14:m>
+                <a:endParaRPr lang="en-US" dirty="0"/>
+              </a:p>
+              <a:p>
+                <a:pPr marL="0" indent="0">
+                  <a:lnSpc>
+                    <a:spcPct val="150000"/>
+                  </a:lnSpc>
+                  <a:buNone/>
+                </a:pPr>
+                <a:endParaRPr lang="en-IL" dirty="0"/>
+              </a:p>
+            </p:txBody>
+          </p:sp>
+        </mc:Choice>
+        <mc:Fallback>
+          <p:sp>
+            <p:nvSpPr>
+              <p:cNvPr id="3" name="Content Placeholder 2">
+                <a:extLst>
+                  <a:ext uri="{FF2B5EF4-FFF2-40B4-BE49-F238E27FC236}">
+                    <a16:creationId xmlns:a16="http://schemas.microsoft.com/office/drawing/2014/main" id="{760C6B95-C23A-4413-96B8-CEDBD9EDF498}"/>
+                  </a:ext>
+                </a:extLst>
+              </p:cNvPr>
+              <p:cNvSpPr>
+                <a:spLocks noGrp="1" noRot="1" noChangeAspect="1" noMove="1" noResize="1" noEditPoints="1" noAdjustHandles="1" noChangeArrowheads="1" noChangeShapeType="1" noTextEdit="1"/>
+              </p:cNvSpPr>
+              <p:nvPr>
+                <p:ph idx="1"/>
+              </p:nvPr>
+            </p:nvSpPr>
+            <p:spPr>
+              <a:blipFill>
+                <a:blip r:embed="rId2"/>
+                <a:stretch>
+                  <a:fillRect l="-303"/>
+                </a:stretch>
+              </a:blipFill>
+            </p:spPr>
+            <p:txBody>
+              <a:bodyPr/>
+              <a:lstStyle/>
+              <a:p>
+                <a:r>
+                  <a:rPr lang="en-IL">
+                    <a:noFill/>
+                  </a:rPr>
+                  <a:t> </a:t>
+                </a:r>
+              </a:p>
+            </p:txBody>
+          </p:sp>
+        </mc:Fallback>
+      </mc:AlternateContent>
+      <p:sp>
+        <p:nvSpPr>
+          <p:cNvPr id="4" name="Footer Placeholder 3">
+            <a:extLst>
+              <a:ext uri="{FF2B5EF4-FFF2-40B4-BE49-F238E27FC236}">
+                <a16:creationId xmlns:a16="http://schemas.microsoft.com/office/drawing/2014/main" id="{8946C433-87D9-445E-AA99-A3B6B09FD64D}"/>
+              </a:ext>
+            </a:extLst>
+          </p:cNvPr>
+          <p:cNvSpPr>
+            <a:spLocks noGrp="1"/>
+          </p:cNvSpPr>
+          <p:nvPr>
+            <p:ph type="ftr" sz="quarter" idx="11"/>
+          </p:nvPr>
+        </p:nvSpPr>
+        <p:spPr/>
+        <p:txBody>
+          <a:bodyPr/>
+          <a:lstStyle/>
+          <a:p>
+            <a:r>
+              <a:rPr lang="en-US"/>
+              <a:t>Materials by Adi Sarid https://adisarid.github.io and http://www.sarid-ins.com</a:t>
+            </a:r>
+            <a:endParaRPr lang="en-US" dirty="0"/>
+          </a:p>
+        </p:txBody>
+      </p:sp>
+      <p:sp>
+        <p:nvSpPr>
+          <p:cNvPr id="5" name="Slide Number Placeholder 4">
+            <a:extLst>
+              <a:ext uri="{FF2B5EF4-FFF2-40B4-BE49-F238E27FC236}">
+                <a16:creationId xmlns:a16="http://schemas.microsoft.com/office/drawing/2014/main" id="{462BE465-3C42-4636-A57D-01817F61DC6D}"/>
+              </a:ext>
+            </a:extLst>
+          </p:cNvPr>
+          <p:cNvSpPr>
+            <a:spLocks noGrp="1"/>
+          </p:cNvSpPr>
+          <p:nvPr>
+            <p:ph type="sldNum" sz="quarter" idx="12"/>
+          </p:nvPr>
+        </p:nvSpPr>
+        <p:spPr/>
+        <p:txBody>
+          <a:bodyPr/>
+          <a:lstStyle/>
+          <a:p>
+            <a:fld id="{4FAB73BC-B049-4115-A692-8D63A059BFB8}" type="slidenum">
+              <a:rPr lang="en-US" smtClean="0"/>
+              <a:t>31</a:t>
+            </a:fld>
+            <a:endParaRPr lang="en-US" dirty="0"/>
+          </a:p>
+        </p:txBody>
+      </p:sp>
+    </p:spTree>
+    <p:extLst>
+      <p:ext uri="{BB962C8B-B14F-4D97-AF65-F5344CB8AC3E}">
+        <p14:creationId xmlns:p14="http://schemas.microsoft.com/office/powerpoint/2010/main" val="2186938136"/>
+      </p:ext>
+    </p:extLst>
+  </p:cSld>
+  <p:clrMapOvr>
+    <a:masterClrMapping/>
+  </p:clrMapOvr>
+</p:sld>
+</file>
+
+<file path=ppt/slides/slide32.xml><?xml version="1.0" encoding="utf-8"?>
+<p:sld xmlns:a="http://schemas.openxmlformats.org/drawingml/2006/main" xmlns:r="http://schemas.openxmlformats.org/officeDocument/2006/relationships" xmlns:p="http://schemas.openxmlformats.org/presentationml/2006/main">
+  <p:cSld>
+    <p:spTree>
+      <p:nvGrpSpPr>
+        <p:cNvPr id="1" name=""/>
+        <p:cNvGrpSpPr/>
+        <p:nvPr/>
+      </p:nvGrpSpPr>
+      <p:grpSpPr>
+        <a:xfrm>
+          <a:off x="0" y="0"/>
+          <a:ext cx="0" cy="0"/>
+          <a:chOff x="0" y="0"/>
+          <a:chExt cx="0" cy="0"/>
+        </a:xfrm>
+      </p:grpSpPr>
+      <p:sp>
+        <p:nvSpPr>
+          <p:cNvPr id="2" name="Title 1">
+            <a:extLst>
+              <a:ext uri="{FF2B5EF4-FFF2-40B4-BE49-F238E27FC236}">
+                <a16:creationId xmlns:a16="http://schemas.microsoft.com/office/drawing/2014/main" id="{A6679EB2-2542-4ACB-8F2B-30A1FB75C275}"/>
+              </a:ext>
+            </a:extLst>
+          </p:cNvPr>
+          <p:cNvSpPr>
+            <a:spLocks noGrp="1"/>
+          </p:cNvSpPr>
+          <p:nvPr>
+            <p:ph type="title"/>
+          </p:nvPr>
+        </p:nvSpPr>
+        <p:spPr/>
+        <p:txBody>
+          <a:bodyPr/>
+          <a:lstStyle/>
+          <a:p>
+            <a:r>
+              <a:rPr lang="en-US" dirty="0"/>
+              <a:t>Example</a:t>
+            </a:r>
+            <a:endParaRPr lang="en-IL" dirty="0"/>
+          </a:p>
+        </p:txBody>
+      </p:sp>
+      <p:sp>
+        <p:nvSpPr>
+          <p:cNvPr id="3" name="Content Placeholder 2">
+            <a:extLst>
+              <a:ext uri="{FF2B5EF4-FFF2-40B4-BE49-F238E27FC236}">
+                <a16:creationId xmlns:a16="http://schemas.microsoft.com/office/drawing/2014/main" id="{11A6F6CD-F5EE-40BB-BBD1-4138A38C4E09}"/>
+              </a:ext>
+            </a:extLst>
+          </p:cNvPr>
+          <p:cNvSpPr>
+            <a:spLocks noGrp="1"/>
+          </p:cNvSpPr>
+          <p:nvPr>
+            <p:ph idx="1"/>
+          </p:nvPr>
+        </p:nvSpPr>
+        <p:spPr/>
+        <p:txBody>
+          <a:bodyPr>
+            <a:normAutofit lnSpcReduction="10000"/>
+          </a:bodyPr>
+          <a:lstStyle/>
+          <a:p>
+            <a:r>
+              <a:rPr lang="en-US" dirty="0"/>
+              <a:t>Say we would like to predict fraud</a:t>
+            </a:r>
+          </a:p>
+          <a:p>
+            <a:r>
+              <a:rPr lang="en-US" dirty="0"/>
+              <a:t>We have a set of features that we can buy (i.e., subscribe to an API query service)</a:t>
+            </a:r>
+          </a:p>
+          <a:p>
+            <a:r>
+              <a:rPr lang="en-US" dirty="0"/>
+              <a:t>Each feature has an “average contribution” to the improvement of our prediction model</a:t>
+            </a:r>
+          </a:p>
+          <a:p>
+            <a:r>
+              <a:rPr lang="en-US" dirty="0"/>
+              <a:t>The catch:</a:t>
+            </a:r>
+          </a:p>
+          <a:p>
+            <a:pPr lvl="1"/>
+            <a:r>
+              <a:rPr lang="en-US" dirty="0"/>
+              <a:t>It takes time to query the features</a:t>
+            </a:r>
+          </a:p>
+          <a:p>
+            <a:pPr lvl="1"/>
+            <a:r>
+              <a:rPr lang="en-US" dirty="0"/>
+              <a:t>We have a limited supply of time</a:t>
+            </a:r>
+          </a:p>
+          <a:p>
+            <a:pPr lvl="1"/>
+            <a:r>
+              <a:rPr lang="en-US" dirty="0"/>
+              <a:t>(Replace “time” with “money” and it’s the same)</a:t>
+            </a:r>
+          </a:p>
+          <a:p>
+            <a:r>
+              <a:rPr lang="en-US" dirty="0"/>
+              <a:t>We want to maximize our model’s performance while not exceeding reasonable query time (or budget) </a:t>
+            </a:r>
+            <a:endParaRPr lang="en-IL" dirty="0"/>
+          </a:p>
+        </p:txBody>
+      </p:sp>
+      <p:sp>
+        <p:nvSpPr>
+          <p:cNvPr id="4" name="Footer Placeholder 3">
+            <a:extLst>
+              <a:ext uri="{FF2B5EF4-FFF2-40B4-BE49-F238E27FC236}">
+                <a16:creationId xmlns:a16="http://schemas.microsoft.com/office/drawing/2014/main" id="{2DE66C56-F39E-40A6-A3B3-9ABE4CC4A486}"/>
+              </a:ext>
+            </a:extLst>
+          </p:cNvPr>
+          <p:cNvSpPr>
+            <a:spLocks noGrp="1"/>
+          </p:cNvSpPr>
+          <p:nvPr>
+            <p:ph type="ftr" sz="quarter" idx="11"/>
+          </p:nvPr>
+        </p:nvSpPr>
+        <p:spPr/>
+        <p:txBody>
+          <a:bodyPr/>
+          <a:lstStyle/>
+          <a:p>
+            <a:r>
+              <a:rPr lang="en-US"/>
+              <a:t>Materials by Adi Sarid https://adisarid.github.io and http://www.sarid-ins.com</a:t>
+            </a:r>
+            <a:endParaRPr lang="en-US" dirty="0"/>
+          </a:p>
+        </p:txBody>
+      </p:sp>
+      <p:sp>
+        <p:nvSpPr>
+          <p:cNvPr id="5" name="Slide Number Placeholder 4">
+            <a:extLst>
+              <a:ext uri="{FF2B5EF4-FFF2-40B4-BE49-F238E27FC236}">
+                <a16:creationId xmlns:a16="http://schemas.microsoft.com/office/drawing/2014/main" id="{ABA38ACA-08DB-44F7-9090-909E9256A775}"/>
+              </a:ext>
+            </a:extLst>
+          </p:cNvPr>
+          <p:cNvSpPr>
+            <a:spLocks noGrp="1"/>
+          </p:cNvSpPr>
+          <p:nvPr>
+            <p:ph type="sldNum" sz="quarter" idx="12"/>
+          </p:nvPr>
+        </p:nvSpPr>
+        <p:spPr/>
+        <p:txBody>
+          <a:bodyPr/>
+          <a:lstStyle/>
+          <a:p>
+            <a:fld id="{4FAB73BC-B049-4115-A692-8D63A059BFB8}" type="slidenum">
+              <a:rPr lang="en-US" smtClean="0"/>
+              <a:t>32</a:t>
+            </a:fld>
+            <a:endParaRPr lang="en-US" dirty="0"/>
+          </a:p>
+        </p:txBody>
+      </p:sp>
+    </p:spTree>
+    <p:extLst>
+      <p:ext uri="{BB962C8B-B14F-4D97-AF65-F5344CB8AC3E}">
+        <p14:creationId xmlns:p14="http://schemas.microsoft.com/office/powerpoint/2010/main" val="1922963382"/>
+      </p:ext>
+    </p:extLst>
+  </p:cSld>
+  <p:clrMapOvr>
+    <a:masterClrMapping/>
+  </p:clrMapOvr>
+</p:sld>
+</file>
+
+<file path=ppt/slides/slide33.xml><?xml version="1.0" encoding="utf-8"?>
+<p:sld xmlns:a="http://schemas.openxmlformats.org/drawingml/2006/main" xmlns:r="http://schemas.openxmlformats.org/officeDocument/2006/relationships" xmlns:p="http://schemas.openxmlformats.org/presentationml/2006/main">
+  <p:cSld>
+    <p:spTree>
+      <p:nvGrpSpPr>
+        <p:cNvPr id="1" name=""/>
+        <p:cNvGrpSpPr/>
+        <p:nvPr/>
+      </p:nvGrpSpPr>
+      <p:grpSpPr>
+        <a:xfrm>
+          <a:off x="0" y="0"/>
+          <a:ext cx="0" cy="0"/>
+          <a:chOff x="0" y="0"/>
+          <a:chExt cx="0" cy="0"/>
+        </a:xfrm>
+      </p:grpSpPr>
+      <p:sp>
+        <p:nvSpPr>
+          <p:cNvPr id="2" name="Title 1">
+            <a:extLst>
+              <a:ext uri="{FF2B5EF4-FFF2-40B4-BE49-F238E27FC236}">
+                <a16:creationId xmlns:a16="http://schemas.microsoft.com/office/drawing/2014/main" id="{7A745954-0804-4554-A9E1-FE01F0894D36}"/>
+              </a:ext>
+            </a:extLst>
+          </p:cNvPr>
+          <p:cNvSpPr>
+            <a:spLocks noGrp="1"/>
+          </p:cNvSpPr>
+          <p:nvPr>
+            <p:ph type="title"/>
+          </p:nvPr>
+        </p:nvSpPr>
+        <p:spPr>
+          <a:xfrm>
+            <a:off x="576363" y="484632"/>
+            <a:ext cx="10058400" cy="1609344"/>
+          </a:xfrm>
+        </p:spPr>
+        <p:txBody>
+          <a:bodyPr>
+            <a:normAutofit/>
+          </a:bodyPr>
+          <a:lstStyle/>
+          <a:p>
+            <a:r>
+              <a:rPr lang="en-US" dirty="0"/>
+              <a:t>The 0-1 Knapsack Problem</a:t>
+            </a:r>
+            <a:br>
+              <a:rPr lang="en-US" dirty="0"/>
+            </a:br>
+            <a:r>
+              <a:rPr lang="en-US" sz="2400" dirty="0"/>
+              <a:t>What items should you take in your knapsack to maximize profit while not exceeding your knapsack’s capacity.</a:t>
+            </a:r>
+            <a:endParaRPr lang="en-IL" dirty="0"/>
+          </a:p>
+        </p:txBody>
+      </p:sp>
+      <mc:AlternateContent xmlns:mc="http://schemas.openxmlformats.org/markup-compatibility/2006">
+        <mc:Choice xmlns:a14="http://schemas.microsoft.com/office/drawing/2010/main" Requires="a14">
+          <p:sp>
+            <p:nvSpPr>
+              <p:cNvPr id="3" name="Content Placeholder 2">
+                <a:extLst>
+                  <a:ext uri="{FF2B5EF4-FFF2-40B4-BE49-F238E27FC236}">
+                    <a16:creationId xmlns:a16="http://schemas.microsoft.com/office/drawing/2014/main" id="{415CD700-6A3A-480D-94B5-B27832BF3943}"/>
+                  </a:ext>
+                </a:extLst>
+              </p:cNvPr>
+              <p:cNvSpPr>
+                <a:spLocks noGrp="1"/>
+              </p:cNvSpPr>
+              <p:nvPr>
+                <p:ph idx="1"/>
+              </p:nvPr>
+            </p:nvSpPr>
+            <p:spPr/>
+            <p:txBody>
+              <a:bodyPr>
+                <a:normAutofit fontScale="92500"/>
+              </a:bodyPr>
+              <a:lstStyle/>
+              <a:p>
+                <a:r>
+                  <a:rPr lang="en-US" dirty="0"/>
+                  <a:t>This is the 0-1 knapsack problem!</a:t>
+                </a:r>
+              </a:p>
+              <a:p>
+                <a:pPr marL="0" indent="0">
+                  <a:buNone/>
+                </a:pPr>
+                <a14:m>
+                  <m:oMathPara xmlns:m="http://schemas.openxmlformats.org/officeDocument/2006/math">
+                    <m:oMathParaPr>
+                      <m:jc m:val="centerGroup"/>
+                    </m:oMathParaPr>
+                    <m:oMath xmlns:m="http://schemas.openxmlformats.org/officeDocument/2006/math">
+                      <m:func>
+                        <m:funcPr>
+                          <m:ctrlPr>
+                            <a:rPr lang="en-US" b="0" i="1" smtClean="0">
+                              <a:latin typeface="Cambria Math" panose="02040503050406030204" pitchFamily="18" charset="0"/>
+                            </a:rPr>
+                          </m:ctrlPr>
+                        </m:funcPr>
+                        <m:fName>
+                          <m:r>
+                            <m:rPr>
+                              <m:sty m:val="p"/>
+                            </m:rPr>
+                            <a:rPr lang="en-US" b="0" i="0" smtClean="0">
+                              <a:latin typeface="Cambria Math" panose="02040503050406030204" pitchFamily="18" charset="0"/>
+                            </a:rPr>
+                            <m:t>max</m:t>
+                          </m:r>
+                        </m:fName>
+                        <m:e>
+                          <m:nary>
+                            <m:naryPr>
+                              <m:chr m:val="∑"/>
+                              <m:ctrlPr>
+                                <a:rPr lang="en-US" b="0" i="1" smtClean="0">
+                                  <a:latin typeface="Cambria Math" panose="02040503050406030204" pitchFamily="18" charset="0"/>
+                                </a:rPr>
+                              </m:ctrlPr>
+                            </m:naryPr>
+                            <m:sub>
+                              <m:r>
+                                <a:rPr lang="en-US" b="0" i="1" smtClean="0">
+                                  <a:latin typeface="Cambria Math" panose="02040503050406030204" pitchFamily="18" charset="0"/>
+                                </a:rPr>
+                                <m:t>𝑖</m:t>
+                              </m:r>
+                              <m:r>
+                                <a:rPr lang="en-US" b="0" i="1" smtClean="0">
+                                  <a:latin typeface="Cambria Math" panose="02040503050406030204" pitchFamily="18" charset="0"/>
+                                </a:rPr>
+                                <m:t>=</m:t>
+                              </m:r>
+                              <m:r>
+                                <a:rPr lang="en-US" b="0" i="1" smtClean="0">
+                                  <a:latin typeface="Cambria Math" panose="02040503050406030204" pitchFamily="18" charset="0"/>
+                                </a:rPr>
+                                <m:t>1</m:t>
+                              </m:r>
+                            </m:sub>
+                            <m:sup>
+                              <m:r>
+                                <a:rPr lang="en-US" b="0" i="1" smtClean="0">
+                                  <a:latin typeface="Cambria Math" panose="02040503050406030204" pitchFamily="18" charset="0"/>
+                                </a:rPr>
+                                <m:t>𝐹</m:t>
+                              </m:r>
+                            </m:sup>
+                            <m:e>
+                              <m:sSub>
+                                <m:sSubPr>
+                                  <m:ctrlPr>
+                                    <a:rPr lang="en-US" b="0" i="1" smtClean="0">
+                                      <a:latin typeface="Cambria Math" panose="02040503050406030204" pitchFamily="18" charset="0"/>
+                                    </a:rPr>
+                                  </m:ctrlPr>
+                                </m:sSubPr>
+                                <m:e>
+                                  <m:r>
+                                    <a:rPr lang="en-US" b="0" i="1" smtClean="0">
+                                      <a:latin typeface="Cambria Math" panose="02040503050406030204" pitchFamily="18" charset="0"/>
+                                    </a:rPr>
+                                    <m:t>𝑝</m:t>
+                                  </m:r>
+                                </m:e>
+                                <m:sub>
+                                  <m:r>
+                                    <a:rPr lang="en-US" b="0" i="1" smtClean="0">
+                                      <a:latin typeface="Cambria Math" panose="02040503050406030204" pitchFamily="18" charset="0"/>
+                                    </a:rPr>
+                                    <m:t>𝑖</m:t>
+                                  </m:r>
+                                </m:sub>
+                              </m:sSub>
+                            </m:e>
+                          </m:nary>
+                          <m:sSub>
+                            <m:sSubPr>
+                              <m:ctrlPr>
+                                <a:rPr lang="en-US" b="0" i="1" smtClean="0">
+                                  <a:latin typeface="Cambria Math" panose="02040503050406030204" pitchFamily="18" charset="0"/>
+                                </a:rPr>
+                              </m:ctrlPr>
+                            </m:sSubPr>
+                            <m:e>
+                              <m:r>
+                                <a:rPr lang="en-US" b="0" i="1" smtClean="0">
+                                  <a:latin typeface="Cambria Math" panose="02040503050406030204" pitchFamily="18" charset="0"/>
+                                </a:rPr>
+                                <m:t>𝑥</m:t>
+                              </m:r>
+                            </m:e>
+                            <m:sub>
+                              <m:r>
+                                <a:rPr lang="en-US" b="0" i="1" smtClean="0">
+                                  <a:latin typeface="Cambria Math" panose="02040503050406030204" pitchFamily="18" charset="0"/>
+                                </a:rPr>
+                                <m:t>𝑖</m:t>
+                              </m:r>
+                            </m:sub>
+                          </m:sSub>
+                        </m:e>
+                      </m:func>
+                    </m:oMath>
+                  </m:oMathPara>
+                </a14:m>
+                <a:endParaRPr lang="en-US" dirty="0"/>
+              </a:p>
+              <a:p>
+                <a:pPr marL="0" indent="0">
+                  <a:buNone/>
+                </a:pPr>
+                <a:r>
+                  <a:rPr lang="en-US" dirty="0"/>
+                  <a:t>Subject to</a:t>
+                </a:r>
+              </a:p>
+              <a:p>
+                <a:pPr marL="0" indent="0">
+                  <a:buNone/>
+                </a:pPr>
+                <a14:m>
+                  <m:oMathPara xmlns:m="http://schemas.openxmlformats.org/officeDocument/2006/math">
+                    <m:oMathParaPr>
+                      <m:jc m:val="centerGroup"/>
+                    </m:oMathParaPr>
+                    <m:oMath xmlns:m="http://schemas.openxmlformats.org/officeDocument/2006/math">
+                      <m:nary>
+                        <m:naryPr>
+                          <m:chr m:val="∑"/>
+                          <m:ctrlPr>
+                            <a:rPr lang="en-US" b="0" i="1" smtClean="0">
+                              <a:latin typeface="Cambria Math" panose="02040503050406030204" pitchFamily="18" charset="0"/>
+                            </a:rPr>
+                          </m:ctrlPr>
+                        </m:naryPr>
+                        <m:sub>
+                          <m:r>
+                            <a:rPr lang="en-US" b="0" i="1" smtClean="0">
+                              <a:latin typeface="Cambria Math" panose="02040503050406030204" pitchFamily="18" charset="0"/>
+                            </a:rPr>
+                            <m:t>𝑖</m:t>
+                          </m:r>
+                          <m:r>
+                            <a:rPr lang="en-US" b="0" i="1" smtClean="0">
+                              <a:latin typeface="Cambria Math" panose="02040503050406030204" pitchFamily="18" charset="0"/>
+                            </a:rPr>
+                            <m:t>=</m:t>
+                          </m:r>
+                          <m:r>
+                            <a:rPr lang="en-US" b="0" i="1" smtClean="0">
+                              <a:latin typeface="Cambria Math" panose="02040503050406030204" pitchFamily="18" charset="0"/>
+                            </a:rPr>
+                            <m:t>1</m:t>
+                          </m:r>
+                        </m:sub>
+                        <m:sup>
+                          <m:r>
+                            <a:rPr lang="en-US" b="0" i="1" smtClean="0">
+                              <a:latin typeface="Cambria Math" panose="02040503050406030204" pitchFamily="18" charset="0"/>
+                            </a:rPr>
+                            <m:t>𝐹</m:t>
+                          </m:r>
+                        </m:sup>
+                        <m:e>
+                          <m:sSub>
+                            <m:sSubPr>
+                              <m:ctrlPr>
+                                <a:rPr lang="en-US" b="0" i="1" smtClean="0">
+                                  <a:latin typeface="Cambria Math" panose="02040503050406030204" pitchFamily="18" charset="0"/>
+                                </a:rPr>
+                              </m:ctrlPr>
+                            </m:sSubPr>
+                            <m:e>
+                              <m:r>
+                                <a:rPr lang="en-US" b="0" i="1" smtClean="0">
+                                  <a:latin typeface="Cambria Math" panose="02040503050406030204" pitchFamily="18" charset="0"/>
+                                </a:rPr>
+                                <m:t>𝑤</m:t>
+                              </m:r>
+                            </m:e>
+                            <m:sub>
+                              <m:r>
+                                <a:rPr lang="en-US" b="0" i="1" smtClean="0">
+                                  <a:latin typeface="Cambria Math" panose="02040503050406030204" pitchFamily="18" charset="0"/>
+                                </a:rPr>
+                                <m:t>𝑖</m:t>
+                              </m:r>
+                            </m:sub>
+                          </m:sSub>
+                          <m:sSub>
+                            <m:sSubPr>
+                              <m:ctrlPr>
+                                <a:rPr lang="en-US" b="0" i="1" smtClean="0">
+                                  <a:latin typeface="Cambria Math" panose="02040503050406030204" pitchFamily="18" charset="0"/>
+                                </a:rPr>
+                              </m:ctrlPr>
+                            </m:sSubPr>
+                            <m:e>
+                              <m:r>
+                                <a:rPr lang="en-US" b="0" i="1" smtClean="0">
+                                  <a:latin typeface="Cambria Math" panose="02040503050406030204" pitchFamily="18" charset="0"/>
+                                </a:rPr>
+                                <m:t>𝑥</m:t>
+                              </m:r>
+                            </m:e>
+                            <m:sub>
+                              <m:r>
+                                <a:rPr lang="en-US" b="0" i="1" smtClean="0">
+                                  <a:latin typeface="Cambria Math" panose="02040503050406030204" pitchFamily="18" charset="0"/>
+                                </a:rPr>
+                                <m:t>𝑖</m:t>
+                              </m:r>
+                            </m:sub>
+                          </m:sSub>
+                        </m:e>
+                      </m:nary>
+                      <m:r>
+                        <a:rPr lang="en-US" b="0" i="1" smtClean="0">
+                          <a:latin typeface="Cambria Math" panose="02040503050406030204" pitchFamily="18" charset="0"/>
+                        </a:rPr>
+                        <m:t>≤</m:t>
+                      </m:r>
+                      <m:r>
+                        <m:rPr>
+                          <m:nor/>
+                        </m:rPr>
+                        <a:rPr lang="en-US" b="0" i="0" smtClean="0">
+                          <a:latin typeface="Cambria Math" panose="02040503050406030204" pitchFamily="18" charset="0"/>
+                        </a:rPr>
+                        <m:t>capacity</m:t>
+                      </m:r>
+                    </m:oMath>
+                  </m:oMathPara>
+                </a14:m>
+                <a:endParaRPr lang="en-US" dirty="0"/>
+              </a:p>
+              <a:p>
+                <a:r>
+                  <a:rPr lang="en-US" dirty="0"/>
+                  <a:t>Obviously, I chose to describe the problem in a way that can be “forced into a knapsack” formulation, for example, the interaction of features cannot be expressed.</a:t>
+                </a:r>
+              </a:p>
+              <a:p>
+                <a:r>
+                  <a:rPr lang="en-US" dirty="0"/>
+                  <a:t>It turns out that MILPs is a rich family – many problems can be approximated.</a:t>
+                </a:r>
+                <a:endParaRPr lang="en-IL" dirty="0"/>
+              </a:p>
+            </p:txBody>
+          </p:sp>
+        </mc:Choice>
+        <mc:Fallback>
+          <p:sp>
+            <p:nvSpPr>
+              <p:cNvPr id="3" name="Content Placeholder 2">
+                <a:extLst>
+                  <a:ext uri="{FF2B5EF4-FFF2-40B4-BE49-F238E27FC236}">
+                    <a16:creationId xmlns:a16="http://schemas.microsoft.com/office/drawing/2014/main" id="{415CD700-6A3A-480D-94B5-B27832BF3943}"/>
+                  </a:ext>
+                </a:extLst>
+              </p:cNvPr>
+              <p:cNvSpPr>
+                <a:spLocks noGrp="1" noRot="1" noChangeAspect="1" noMove="1" noResize="1" noEditPoints="1" noAdjustHandles="1" noChangeArrowheads="1" noChangeShapeType="1" noTextEdit="1"/>
+              </p:cNvSpPr>
+              <p:nvPr>
+                <p:ph idx="1"/>
+              </p:nvPr>
+            </p:nvSpPr>
+            <p:spPr>
+              <a:blipFill>
+                <a:blip r:embed="rId2"/>
+                <a:stretch>
+                  <a:fillRect l="-606" t="-752"/>
+                </a:stretch>
+              </a:blipFill>
+            </p:spPr>
+            <p:txBody>
+              <a:bodyPr/>
+              <a:lstStyle/>
+              <a:p>
+                <a:r>
+                  <a:rPr lang="en-IL">
+                    <a:noFill/>
+                  </a:rPr>
+                  <a:t> </a:t>
+                </a:r>
+              </a:p>
+            </p:txBody>
+          </p:sp>
+        </mc:Fallback>
+      </mc:AlternateContent>
+      <p:sp>
+        <p:nvSpPr>
+          <p:cNvPr id="4" name="Footer Placeholder 3">
+            <a:extLst>
+              <a:ext uri="{FF2B5EF4-FFF2-40B4-BE49-F238E27FC236}">
+                <a16:creationId xmlns:a16="http://schemas.microsoft.com/office/drawing/2014/main" id="{9581F2B5-6984-41C2-AB32-5DE99B827567}"/>
+              </a:ext>
+            </a:extLst>
+          </p:cNvPr>
+          <p:cNvSpPr>
+            <a:spLocks noGrp="1"/>
+          </p:cNvSpPr>
+          <p:nvPr>
+            <p:ph type="ftr" sz="quarter" idx="11"/>
+          </p:nvPr>
+        </p:nvSpPr>
+        <p:spPr/>
+        <p:txBody>
+          <a:bodyPr/>
+          <a:lstStyle/>
+          <a:p>
+            <a:r>
+              <a:rPr lang="en-US"/>
+              <a:t>Materials by Adi Sarid https://adisarid.github.io and http://www.sarid-ins.com</a:t>
+            </a:r>
+            <a:endParaRPr lang="en-US" dirty="0"/>
+          </a:p>
+        </p:txBody>
+      </p:sp>
+      <p:sp>
+        <p:nvSpPr>
+          <p:cNvPr id="5" name="Slide Number Placeholder 4">
+            <a:extLst>
+              <a:ext uri="{FF2B5EF4-FFF2-40B4-BE49-F238E27FC236}">
+                <a16:creationId xmlns:a16="http://schemas.microsoft.com/office/drawing/2014/main" id="{135E6ED9-A1AB-4E14-9DA7-C3D96A37481B}"/>
+              </a:ext>
+            </a:extLst>
+          </p:cNvPr>
+          <p:cNvSpPr>
+            <a:spLocks noGrp="1"/>
+          </p:cNvSpPr>
+          <p:nvPr>
+            <p:ph type="sldNum" sz="quarter" idx="12"/>
+          </p:nvPr>
+        </p:nvSpPr>
+        <p:spPr/>
+        <p:txBody>
+          <a:bodyPr/>
+          <a:lstStyle/>
+          <a:p>
+            <a:fld id="{4FAB73BC-B049-4115-A692-8D63A059BFB8}" type="slidenum">
+              <a:rPr lang="en-US" smtClean="0"/>
+              <a:t>33</a:t>
+            </a:fld>
+            <a:endParaRPr lang="en-US" dirty="0"/>
+          </a:p>
+        </p:txBody>
+      </p:sp>
+      <p:grpSp>
+        <p:nvGrpSpPr>
+          <p:cNvPr id="8" name="Group 7">
+            <a:extLst>
+              <a:ext uri="{FF2B5EF4-FFF2-40B4-BE49-F238E27FC236}">
+                <a16:creationId xmlns:a16="http://schemas.microsoft.com/office/drawing/2014/main" id="{7148F34C-E417-4CCF-BFD1-B527D42DA96A}"/>
+              </a:ext>
+            </a:extLst>
+          </p:cNvPr>
+          <p:cNvGrpSpPr/>
+          <p:nvPr/>
+        </p:nvGrpSpPr>
+        <p:grpSpPr>
+          <a:xfrm>
+            <a:off x="9957084" y="146735"/>
+            <a:ext cx="2002972" cy="1698495"/>
+            <a:chOff x="9476124" y="3771471"/>
+            <a:chExt cx="2599982" cy="2086284"/>
+          </a:xfrm>
+        </p:grpSpPr>
+        <p:pic>
+          <p:nvPicPr>
+            <p:cNvPr id="1026" name="Picture 2">
+              <a:extLst>
+                <a:ext uri="{FF2B5EF4-FFF2-40B4-BE49-F238E27FC236}">
+                  <a16:creationId xmlns:a16="http://schemas.microsoft.com/office/drawing/2014/main" id="{4FF821D1-453C-4BEB-BDE4-CA54CCB24517}"/>
+                </a:ext>
+              </a:extLst>
+            </p:cNvPr>
+            <p:cNvPicPr>
+              <a:picLocks noChangeAspect="1" noChangeArrowheads="1"/>
+            </p:cNvPicPr>
+            <p:nvPr/>
+          </p:nvPicPr>
+          <p:blipFill>
+            <a:blip r:embed="rId3">
+              <a:extLst>
+                <a:ext uri="{28A0092B-C50C-407E-A947-70E740481C1C}">
+                  <a14:useLocalDpi xmlns:a14="http://schemas.microsoft.com/office/drawing/2010/main" val="0"/>
+                </a:ext>
+              </a:extLst>
+            </a:blip>
+            <a:srcRect/>
+            <a:stretch>
+              <a:fillRect/>
+            </a:stretch>
+          </p:blipFill>
+          <p:spPr bwMode="auto">
+            <a:xfrm>
+              <a:off x="10003289" y="4166961"/>
+              <a:ext cx="1947919" cy="1690794"/>
+            </a:xfrm>
+            <a:prstGeom prst="rect">
+              <a:avLst/>
+            </a:prstGeom>
+            <a:noFill/>
+            <a:extLst>
+              <a:ext uri="{909E8E84-426E-40DD-AFC4-6F175D3DCCD1}">
+                <a14:hiddenFill xmlns:a14="http://schemas.microsoft.com/office/drawing/2010/main">
+                  <a:solidFill>
+                    <a:srgbClr val="FFFFFF"/>
+                  </a:solidFill>
+                </a14:hiddenFill>
+              </a:ext>
+            </a:extLst>
+          </p:spPr>
+        </p:pic>
+        <p:sp>
+          <p:nvSpPr>
+            <p:cNvPr id="7" name="TextBox 6">
+              <a:extLst>
+                <a:ext uri="{FF2B5EF4-FFF2-40B4-BE49-F238E27FC236}">
+                  <a16:creationId xmlns:a16="http://schemas.microsoft.com/office/drawing/2014/main" id="{70FB41DA-F38D-4C29-9B0C-AC5881A30DE2}"/>
+                </a:ext>
+              </a:extLst>
+            </p:cNvPr>
+            <p:cNvSpPr txBox="1"/>
+            <p:nvPr/>
+          </p:nvSpPr>
+          <p:spPr>
+            <a:xfrm>
+              <a:off x="9476124" y="3771471"/>
+              <a:ext cx="2599982" cy="340242"/>
+            </a:xfrm>
+            <a:prstGeom prst="rect">
+              <a:avLst/>
+            </a:prstGeom>
+            <a:noFill/>
+          </p:spPr>
+          <p:txBody>
+            <a:bodyPr wrap="square" rtlCol="0">
+              <a:spAutoFit/>
+            </a:bodyPr>
+            <a:lstStyle/>
+            <a:p>
+              <a:r>
+                <a:rPr lang="en-US" sz="1200" dirty="0"/>
+                <a:t>(Wikipedia: </a:t>
+              </a:r>
+              <a:r>
+                <a:rPr lang="en-US" sz="1200" dirty="0">
+                  <a:hlinkClick r:id="rId4"/>
+                </a:rPr>
+                <a:t>knapsack</a:t>
+              </a:r>
+              <a:r>
+                <a:rPr lang="en-US" sz="1200" dirty="0"/>
+                <a:t>)</a:t>
+              </a:r>
+              <a:endParaRPr lang="en-IL" sz="1200" dirty="0"/>
+            </a:p>
+          </p:txBody>
+        </p:sp>
+      </p:grpSp>
+    </p:spTree>
+    <p:extLst>
+      <p:ext uri="{BB962C8B-B14F-4D97-AF65-F5344CB8AC3E}">
+        <p14:creationId xmlns:p14="http://schemas.microsoft.com/office/powerpoint/2010/main" val="4196502234"/>
+      </p:ext>
+    </p:extLst>
+  </p:cSld>
+  <p:clrMapOvr>
+    <a:masterClrMapping/>
+  </p:clrMapOvr>
+</p:sld>
+</file>
+
+<file path=ppt/slides/slide34.xml><?xml version="1.0" encoding="utf-8"?>
+<p:sld xmlns:a="http://schemas.openxmlformats.org/drawingml/2006/main" xmlns:r="http://schemas.openxmlformats.org/officeDocument/2006/relationships" xmlns:p="http://schemas.openxmlformats.org/presentationml/2006/main">
+  <p:cSld>
+    <p:spTree>
+      <p:nvGrpSpPr>
+        <p:cNvPr id="1" name=""/>
+        <p:cNvGrpSpPr/>
+        <p:nvPr/>
+      </p:nvGrpSpPr>
+      <p:grpSpPr>
+        <a:xfrm>
+          <a:off x="0" y="0"/>
+          <a:ext cx="0" cy="0"/>
+          <a:chOff x="0" y="0"/>
+          <a:chExt cx="0" cy="0"/>
+        </a:xfrm>
+      </p:grpSpPr>
+      <p:sp>
+        <p:nvSpPr>
+          <p:cNvPr id="2" name="Title 1">
+            <a:extLst>
+              <a:ext uri="{FF2B5EF4-FFF2-40B4-BE49-F238E27FC236}">
+                <a16:creationId xmlns:a16="http://schemas.microsoft.com/office/drawing/2014/main" id="{2C9823B0-B9E9-4740-A919-80BA73E4D915}"/>
+              </a:ext>
+            </a:extLst>
+          </p:cNvPr>
+          <p:cNvSpPr>
+            <a:spLocks noGrp="1"/>
+          </p:cNvSpPr>
+          <p:nvPr>
+            <p:ph type="title"/>
+          </p:nvPr>
+        </p:nvSpPr>
+        <p:spPr/>
+        <p:txBody>
+          <a:bodyPr/>
+          <a:lstStyle/>
+          <a:p>
+            <a:r>
+              <a:rPr lang="en-US" dirty="0"/>
+              <a:t>Optimization in R</a:t>
+            </a:r>
+            <a:endParaRPr lang="en-IL" dirty="0"/>
+          </a:p>
+        </p:txBody>
+      </p:sp>
+      <p:sp>
+        <p:nvSpPr>
+          <p:cNvPr id="3" name="Content Placeholder 2">
+            <a:extLst>
+              <a:ext uri="{FF2B5EF4-FFF2-40B4-BE49-F238E27FC236}">
+                <a16:creationId xmlns:a16="http://schemas.microsoft.com/office/drawing/2014/main" id="{70174428-A603-4593-874F-53799B68460F}"/>
+              </a:ext>
+            </a:extLst>
+          </p:cNvPr>
+          <p:cNvSpPr>
+            <a:spLocks noGrp="1"/>
+          </p:cNvSpPr>
+          <p:nvPr>
+            <p:ph idx="1"/>
+          </p:nvPr>
+        </p:nvSpPr>
+        <p:spPr/>
+        <p:txBody>
+          <a:bodyPr/>
+          <a:lstStyle/>
+          <a:p>
+            <a:pPr>
+              <a:lnSpc>
+                <a:spcPct val="150000"/>
+              </a:lnSpc>
+            </a:pPr>
+            <a:r>
+              <a:rPr lang="en-US" dirty="0"/>
+              <a:t>There is a </a:t>
+            </a:r>
+            <a:r>
+              <a:rPr lang="en-US" dirty="0">
+                <a:hlinkClick r:id="rId2"/>
+              </a:rPr>
+              <a:t>CRAN task view on optimization</a:t>
+            </a:r>
+            <a:endParaRPr lang="en-US" dirty="0"/>
+          </a:p>
+          <a:p>
+            <a:pPr lvl="1">
+              <a:lnSpc>
+                <a:spcPct val="150000"/>
+              </a:lnSpc>
+            </a:pPr>
+            <a:r>
+              <a:rPr lang="en-US" dirty="0"/>
+              <a:t>Many use cases and algorithms (continuous, integer linear, integer non-linear, dynamic programming, API integration for commercial solvers, etc.).</a:t>
+            </a:r>
+          </a:p>
+          <a:p>
+            <a:pPr>
+              <a:lnSpc>
+                <a:spcPct val="150000"/>
+              </a:lnSpc>
+            </a:pPr>
+            <a:r>
+              <a:rPr lang="en-US" dirty="0"/>
+              <a:t>A full review of methods and algorithms it outside the scope of this course, but it’s good to know that packages exist.</a:t>
+            </a:r>
+          </a:p>
+          <a:p>
+            <a:pPr>
+              <a:lnSpc>
+                <a:spcPct val="150000"/>
+              </a:lnSpc>
+            </a:pPr>
+            <a:r>
+              <a:rPr lang="en-US" dirty="0"/>
+              <a:t>Let’s see the knapsack example:</a:t>
+            </a:r>
+          </a:p>
+          <a:p>
+            <a:pPr>
+              <a:lnSpc>
+                <a:spcPct val="150000"/>
+              </a:lnSpc>
+            </a:pPr>
+            <a:r>
+              <a:rPr lang="en-US" dirty="0">
+                <a:latin typeface="Courier New" panose="02070309020205020404" pitchFamily="49" charset="0"/>
+                <a:cs typeface="Courier New" panose="02070309020205020404" pitchFamily="49" charset="0"/>
+              </a:rPr>
+              <a:t>/class code/04-optimization_knapsack.R</a:t>
+            </a:r>
+            <a:endParaRPr lang="en-IL" dirty="0">
+              <a:latin typeface="Courier New" panose="02070309020205020404" pitchFamily="49" charset="0"/>
+              <a:cs typeface="Courier New" panose="02070309020205020404" pitchFamily="49" charset="0"/>
+            </a:endParaRPr>
+          </a:p>
+        </p:txBody>
+      </p:sp>
+      <p:sp>
+        <p:nvSpPr>
+          <p:cNvPr id="4" name="Footer Placeholder 3">
+            <a:extLst>
+              <a:ext uri="{FF2B5EF4-FFF2-40B4-BE49-F238E27FC236}">
+                <a16:creationId xmlns:a16="http://schemas.microsoft.com/office/drawing/2014/main" id="{B6214FED-371C-4B3D-95CA-810C188A15B4}"/>
+              </a:ext>
+            </a:extLst>
+          </p:cNvPr>
+          <p:cNvSpPr>
+            <a:spLocks noGrp="1"/>
+          </p:cNvSpPr>
+          <p:nvPr>
+            <p:ph type="ftr" sz="quarter" idx="11"/>
+          </p:nvPr>
+        </p:nvSpPr>
+        <p:spPr/>
+        <p:txBody>
+          <a:bodyPr/>
+          <a:lstStyle/>
+          <a:p>
+            <a:r>
+              <a:rPr lang="en-US"/>
+              <a:t>Materials by Adi Sarid https://adisarid.github.io and http://www.sarid-ins.com</a:t>
+            </a:r>
+            <a:endParaRPr lang="en-US" dirty="0"/>
+          </a:p>
+        </p:txBody>
+      </p:sp>
+      <p:sp>
+        <p:nvSpPr>
+          <p:cNvPr id="5" name="Slide Number Placeholder 4">
+            <a:extLst>
+              <a:ext uri="{FF2B5EF4-FFF2-40B4-BE49-F238E27FC236}">
+                <a16:creationId xmlns:a16="http://schemas.microsoft.com/office/drawing/2014/main" id="{F84FCC68-4290-4E1A-9999-655766AE1382}"/>
+              </a:ext>
+            </a:extLst>
+          </p:cNvPr>
+          <p:cNvSpPr>
+            <a:spLocks noGrp="1"/>
+          </p:cNvSpPr>
+          <p:nvPr>
+            <p:ph type="sldNum" sz="quarter" idx="12"/>
+          </p:nvPr>
+        </p:nvSpPr>
+        <p:spPr/>
+        <p:txBody>
+          <a:bodyPr/>
+          <a:lstStyle/>
+          <a:p>
+            <a:fld id="{4FAB73BC-B049-4115-A692-8D63A059BFB8}" type="slidenum">
+              <a:rPr lang="en-US" smtClean="0"/>
+              <a:t>34</a:t>
+            </a:fld>
+            <a:endParaRPr lang="en-US" dirty="0"/>
+          </a:p>
+        </p:txBody>
+      </p:sp>
+      <p:pic>
+        <p:nvPicPr>
+          <p:cNvPr id="6" name="Picture 5">
+            <a:hlinkClick r:id="rId3"/>
+            <a:extLst>
+              <a:ext uri="{FF2B5EF4-FFF2-40B4-BE49-F238E27FC236}">
+                <a16:creationId xmlns:a16="http://schemas.microsoft.com/office/drawing/2014/main" id="{25751411-A856-49C3-8404-9C93B281CFE9}"/>
+              </a:ext>
+            </a:extLst>
+          </p:cNvPr>
+          <p:cNvPicPr>
+            <a:picLocks noChangeAspect="1"/>
+          </p:cNvPicPr>
+          <p:nvPr/>
+        </p:nvPicPr>
+        <p:blipFill>
+          <a:blip r:embed="rId4"/>
+          <a:stretch>
+            <a:fillRect/>
+          </a:stretch>
+        </p:blipFill>
+        <p:spPr>
+          <a:xfrm>
+            <a:off x="8568276" y="4513612"/>
+            <a:ext cx="1067424" cy="903845"/>
+          </a:xfrm>
+          <a:prstGeom prst="rect">
+            <a:avLst/>
+          </a:prstGeom>
+        </p:spPr>
+      </p:pic>
+    </p:spTree>
+    <p:extLst>
+      <p:ext uri="{BB962C8B-B14F-4D97-AF65-F5344CB8AC3E}">
+        <p14:creationId xmlns:p14="http://schemas.microsoft.com/office/powerpoint/2010/main" val="580389727"/>
       </p:ext>
     </p:extLst>
   </p:cSld>
@@ -26565,13 +28290,7 @@
                               <a:rPr lang="en-US" b="0" i="1" dirty="0" smtClean="0">
                                 <a:latin typeface="Cambria Math" panose="02040503050406030204" pitchFamily="18" charset="0"/>
                               </a:rPr>
-                              <m:t>1</m:t>
-                            </m:r>
-                            <m:r>
-                              <a:rPr lang="en-US" b="0" i="1" dirty="0" smtClean="0">
-                                <a:latin typeface="Cambria Math" panose="02040503050406030204" pitchFamily="18" charset="0"/>
-                              </a:rPr>
-                              <m:t>−</m:t>
+                              <m:t>1−</m:t>
                             </m:r>
                             <m:sSub>
                               <m:sSubPr>
@@ -26677,13 +28396,7 @@
                           <a:rPr lang="en-US" b="0" i="1" smtClean="0">
                             <a:latin typeface="Cambria Math" panose="02040503050406030204" pitchFamily="18" charset="0"/>
                           </a:rPr>
-                          <m:t>=</m:t>
-                        </m:r>
-                        <m:r>
-                          <a:rPr lang="en-US" b="0" i="1" smtClean="0">
-                            <a:latin typeface="Cambria Math" panose="02040503050406030204" pitchFamily="18" charset="0"/>
-                          </a:rPr>
-                          <m:t>1</m:t>
+                          <m:t>=1</m:t>
                         </m:r>
                       </m:sub>
                       <m:sup>

</xml_diff>